<commit_message>
Add DN* tooling demo slide
</commit_message>
<xml_diff>
--- a/Getting Started with ASP.NET Core 1.0 in VS Code - SFLCC.pptx
+++ b/Getting Started with ASP.NET Core 1.0 in VS Code - SFLCC.pptx
@@ -5,7 +5,7 @@
     <p:sldMasterId id="2147483677" r:id="rId1"/>
   </p:sldMasterIdLst>
   <p:notesMasterIdLst>
-    <p:notesMasterId r:id="rId24"/>
+    <p:notesMasterId r:id="rId25"/>
   </p:notesMasterIdLst>
   <p:sldIdLst>
     <p:sldId id="256" r:id="rId2"/>
@@ -25,11 +25,12 @@
     <p:sldId id="286" r:id="rId16"/>
     <p:sldId id="287" r:id="rId17"/>
     <p:sldId id="294" r:id="rId18"/>
-    <p:sldId id="295" r:id="rId19"/>
-    <p:sldId id="285" r:id="rId20"/>
-    <p:sldId id="290" r:id="rId21"/>
-    <p:sldId id="260" r:id="rId22"/>
-    <p:sldId id="273" r:id="rId23"/>
+    <p:sldId id="296" r:id="rId19"/>
+    <p:sldId id="295" r:id="rId20"/>
+    <p:sldId id="285" r:id="rId21"/>
+    <p:sldId id="290" r:id="rId22"/>
+    <p:sldId id="260" r:id="rId23"/>
+    <p:sldId id="273" r:id="rId24"/>
   </p:sldIdLst>
   <p:sldSz cx="12192000" cy="6858000"/>
   <p:notesSz cx="6858000" cy="9144000"/>
@@ -4085,7 +4086,7 @@
         <a:lstStyle/>
         <a:p>
           <a:r>
-            <a:rPr lang="en-US" dirty="0" err="1" smtClean="0"/>
+            <a:rPr lang="en-US" dirty="0" smtClean="0"/>
             <a:t>KRuntime</a:t>
           </a:r>
           <a:endParaRPr lang="en-US" dirty="0"/>
@@ -4313,8 +4314,8 @@
     <dgm:cxn modelId="{BE4D6236-A3E0-4057-9A2C-42D4A877D36E}" type="presOf" srcId="{8A45336E-5408-4D62-9EF1-08F486318BFF}" destId="{57863176-DB12-4225-A941-96CD5A6A82CC}" srcOrd="0" destOrd="0" presId="urn:microsoft.com/office/officeart/2005/8/layout/hChevron3"/>
     <dgm:cxn modelId="{1C1D83E0-DB0F-4A9B-A04D-A392BE0DD04C}" type="presOf" srcId="{AFF4B1FA-9A6B-43F7-B8CB-4C91CF1DDBE0}" destId="{6E8A8CB1-126C-4A8D-95E5-7D016B2029F2}" srcOrd="0" destOrd="0" presId="urn:microsoft.com/office/officeart/2005/8/layout/hChevron3"/>
     <dgm:cxn modelId="{DCD6A15A-B19C-4616-9ED1-26DCB2C43285}" srcId="{8A45336E-5408-4D62-9EF1-08F486318BFF}" destId="{8BEAE8CB-A7D8-45E4-BC87-9A18CED7E7CE}" srcOrd="0" destOrd="0" parTransId="{E16CB781-B1BB-4E9E-9C86-96F481B14BFA}" sibTransId="{48747E02-CA4B-4EA6-9401-0110B1D75C1C}"/>
+    <dgm:cxn modelId="{94C1853C-02E7-4C27-A29A-FC84C3187A32}" srcId="{8A45336E-5408-4D62-9EF1-08F486318BFF}" destId="{A917A1F9-17B7-4B88-9FAD-AF41E2910DBD}" srcOrd="3" destOrd="0" parTransId="{FEFD055D-8110-41D2-83FF-BB68E3C24098}" sibTransId="{A2ABC1CA-D4DB-4C0F-83FD-5DAA1C23AAEA}"/>
     <dgm:cxn modelId="{C70A686A-14B0-4CBB-AA56-4BFD6C2C7B89}" type="presOf" srcId="{766D0765-5B45-432B-826E-9A27A845A5A7}" destId="{F0AA213A-C7FF-4409-B147-991ABB26AAB2}" srcOrd="0" destOrd="0" presId="urn:microsoft.com/office/officeart/2005/8/layout/hChevron3"/>
-    <dgm:cxn modelId="{94C1853C-02E7-4C27-A29A-FC84C3187A32}" srcId="{8A45336E-5408-4D62-9EF1-08F486318BFF}" destId="{A917A1F9-17B7-4B88-9FAD-AF41E2910DBD}" srcOrd="3" destOrd="0" parTransId="{FEFD055D-8110-41D2-83FF-BB68E3C24098}" sibTransId="{A2ABC1CA-D4DB-4C0F-83FD-5DAA1C23AAEA}"/>
     <dgm:cxn modelId="{9CC9A370-689E-4C6F-B870-78ECD0BA24BE}" type="presOf" srcId="{A917A1F9-17B7-4B88-9FAD-AF41E2910DBD}" destId="{6655FB27-B27C-4A7B-B55D-EF2C08C6B65E}" srcOrd="0" destOrd="0" presId="urn:microsoft.com/office/officeart/2005/8/layout/hChevron3"/>
     <dgm:cxn modelId="{128E7390-4262-4560-BB4D-C552847BC8AE}" type="presOf" srcId="{8BEAE8CB-A7D8-45E4-BC87-9A18CED7E7CE}" destId="{54F0ADA0-D0DF-4213-9ACF-ED13172B50C7}" srcOrd="0" destOrd="0" presId="urn:microsoft.com/office/officeart/2005/8/layout/hChevron3"/>
     <dgm:cxn modelId="{CB4508D6-DCB1-41A9-9031-BAB1F7FDDC1E}" type="presParOf" srcId="{57863176-DB12-4225-A941-96CD5A6A82CC}" destId="{54F0ADA0-D0DF-4213-9ACF-ED13172B50C7}" srcOrd="0" destOrd="0" presId="urn:microsoft.com/office/officeart/2005/8/layout/hChevron3"/>
@@ -4477,13 +4478,7 @@
             <a:rPr lang="en-US" dirty="0" smtClean="0">
               <a:latin typeface="Consolas" panose="020B0609020204030204" pitchFamily="49" charset="0"/>
             </a:rPr>
-            <a:t> </a:t>
-          </a:r>
-          <a:r>
-            <a:rPr lang="en-US" dirty="0" err="1" smtClean="0">
-              <a:latin typeface="Consolas" panose="020B0609020204030204" pitchFamily="49" charset="0"/>
-            </a:rPr>
-            <a:t>dotnet</a:t>
+            <a:t> dotnet</a:t>
           </a:r>
           <a:endParaRPr lang="en-US" dirty="0">
             <a:latin typeface="Consolas" panose="020B0609020204030204" pitchFamily="49" charset="0"/>
@@ -5905,7 +5900,7 @@
             </a:spcAft>
           </a:pPr>
           <a:r>
-            <a:rPr lang="en-US" sz="3500" kern="1200" dirty="0" err="1" smtClean="0"/>
+            <a:rPr lang="en-US" sz="3500" kern="1200" dirty="0" smtClean="0"/>
             <a:t>KRuntime</a:t>
           </a:r>
           <a:endParaRPr lang="en-US" sz="3500" kern="1200" dirty="0"/>
@@ -6384,13 +6379,7 @@
             <a:rPr lang="en-US" sz="3600" kern="1200" dirty="0" smtClean="0">
               <a:latin typeface="Consolas" panose="020B0609020204030204" pitchFamily="49" charset="0"/>
             </a:rPr>
-            <a:t> </a:t>
-          </a:r>
-          <a:r>
-            <a:rPr lang="en-US" sz="3600" kern="1200" dirty="0" err="1" smtClean="0">
-              <a:latin typeface="Consolas" panose="020B0609020204030204" pitchFamily="49" charset="0"/>
-            </a:rPr>
-            <a:t>dotnet</a:t>
+            <a:t> dotnet</a:t>
           </a:r>
           <a:endParaRPr lang="en-US" sz="3600" kern="1200" dirty="0">
             <a:latin typeface="Consolas" panose="020B0609020204030204" pitchFamily="49" charset="0"/>
@@ -18946,13 +18935,8 @@
           <a:p>
             <a:r>
               <a:rPr lang="en-US" sz="2000" dirty="0" smtClean="0"/>
-              <a:t>@</a:t>
+              <a:t>@Scott_Addie</a:t>
             </a:r>
-            <a:r>
-              <a:rPr lang="en-US" sz="2000" dirty="0" err="1" smtClean="0"/>
-              <a:t>Scott_Addie</a:t>
-            </a:r>
-            <a:endParaRPr lang="en-US" sz="2000" dirty="0" smtClean="0"/>
           </a:p>
         </p:txBody>
       </p:sp>
@@ -19094,8 +19078,8 @@
           </a:p>
         </p:txBody>
       </p:sp>
-      <mc:AlternateContent xmlns:mc="http://schemas.openxmlformats.org/markup-compatibility/2006" xmlns:we="http://schemas.microsoft.com/office/webextensions/webextension/2010/11" xmlns:pca="http://schemas.microsoft.com/office/powerpoint/2013/contentapp">
-        <mc:Choice Requires="we pca">
+      <mc:AlternateContent xmlns:mc="http://schemas.openxmlformats.org/markup-compatibility/2006">
+        <mc:Choice xmlns:we="http://schemas.microsoft.com/office/webextensions/webextension/2010/11" xmlns:pca="http://schemas.microsoft.com/office/powerpoint/2013/contentapp" Requires="we pca">
           <p:graphicFrame>
             <p:nvGraphicFramePr>
               <p:cNvPr id="5" name="Add-in 4" title="Code Presenter Pro"/>
@@ -19121,7 +19105,7 @@
             </a:graphic>
           </p:graphicFrame>
         </mc:Choice>
-        <mc:Fallback xmlns="">
+        <mc:Fallback>
           <p:pic>
             <p:nvPicPr>
               <p:cNvPr id="5" name="Add-in 4" title="Code Presenter Pro"/>
@@ -20567,11 +20551,7 @@
           <a:p>
             <a:r>
               <a:rPr lang="en-US" sz="2400" dirty="0" smtClean="0"/>
-              <a:t>generator-</a:t>
-            </a:r>
-            <a:r>
-              <a:rPr lang="en-US" sz="2400" dirty="0" err="1" smtClean="0"/>
-              <a:t>aspnet</a:t>
+              <a:t>generator-aspnet</a:t>
             </a:r>
             <a:endParaRPr lang="en-US" sz="2400" dirty="0"/>
           </a:p>
@@ -20782,7 +20762,7 @@
           <a:lstStyle/>
           <a:p>
             <a:r>
-              <a:rPr lang="en-US" sz="2400" dirty="0" err="1" smtClean="0"/>
+              <a:rPr lang="en-US" sz="2400" dirty="0" smtClean="0"/>
               <a:t>vscode-yo</a:t>
             </a:r>
             <a:endParaRPr lang="en-US" sz="2400" dirty="0"/>
@@ -20925,6 +20905,186 @@
           <a:chExt cx="0" cy="0"/>
         </a:xfrm>
       </p:grpSpPr>
+      <p:sp>
+        <p:nvSpPr>
+          <p:cNvPr id="5" name="Title 4"/>
+          <p:cNvSpPr>
+            <a:spLocks noGrp="1"/>
+          </p:cNvSpPr>
+          <p:nvPr>
+            <p:ph type="title"/>
+          </p:nvPr>
+        </p:nvSpPr>
+        <p:spPr/>
+        <p:txBody>
+          <a:bodyPr/>
+          <a:lstStyle/>
+          <a:p>
+            <a:r>
+              <a:rPr lang="en-US" b="1" dirty="0" smtClean="0">
+                <a:latin typeface="Consolas" panose="020B0609020204030204" pitchFamily="49" charset="0"/>
+                <a:cs typeface="Consolas" panose="020B0609020204030204" pitchFamily="49" charset="0"/>
+              </a:rPr>
+              <a:t>&gt;</a:t>
+            </a:r>
+            <a:r>
+              <a:rPr lang="en-US" dirty="0" smtClean="0">
+                <a:latin typeface="Consolas" panose="020B0609020204030204" pitchFamily="49" charset="0"/>
+                <a:cs typeface="Consolas" panose="020B0609020204030204" pitchFamily="49" charset="0"/>
+              </a:rPr>
+              <a:t> </a:t>
+            </a:r>
+            <a:r>
+              <a:rPr lang="en-US" dirty="0" smtClean="0">
+                <a:latin typeface="Consolas" panose="020B0609020204030204" pitchFamily="49" charset="0"/>
+                <a:cs typeface="Consolas" panose="020B0609020204030204" pitchFamily="49" charset="0"/>
+              </a:rPr>
+              <a:t>DN* Demo</a:t>
+            </a:r>
+            <a:r>
+              <a:rPr lang="en-US" dirty="0" smtClean="0"/>
+              <a:t> </a:t>
+            </a:r>
+            <a:endParaRPr lang="en-US" dirty="0"/>
+          </a:p>
+        </p:txBody>
+      </p:sp>
+      <p:sp>
+        <p:nvSpPr>
+          <p:cNvPr id="6" name="Text Placeholder 5"/>
+          <p:cNvSpPr>
+            <a:spLocks noGrp="1"/>
+          </p:cNvSpPr>
+          <p:nvPr>
+            <p:ph type="body" idx="1"/>
+          </p:nvPr>
+        </p:nvSpPr>
+        <p:spPr/>
+        <p:txBody>
+          <a:bodyPr/>
+          <a:lstStyle/>
+          <a:p>
+            <a:r>
+              <a:rPr lang="en-US" dirty="0" smtClean="0"/>
+              <a:t>ASP.NET Core Web Application in VS Code</a:t>
+            </a:r>
+            <a:endParaRPr lang="en-US" dirty="0"/>
+          </a:p>
+        </p:txBody>
+      </p:sp>
+      <p:sp>
+        <p:nvSpPr>
+          <p:cNvPr id="4" name="Slide Number Placeholder 3"/>
+          <p:cNvSpPr>
+            <a:spLocks noGrp="1"/>
+          </p:cNvSpPr>
+          <p:nvPr>
+            <p:ph type="sldNum" sz="quarter" idx="12"/>
+          </p:nvPr>
+        </p:nvSpPr>
+        <p:spPr/>
+        <p:txBody>
+          <a:bodyPr/>
+          <a:lstStyle/>
+          <a:p>
+            <a:fld id="{3AE964CF-DFDF-4B9D-8AE5-9B4D54DD768C}" type="slidenum">
+              <a:rPr lang="en-US" smtClean="0"/>
+              <a:t>18</a:t>
+            </a:fld>
+            <a:endParaRPr lang="en-US" dirty="0"/>
+          </a:p>
+        </p:txBody>
+      </p:sp>
+      <p:pic>
+        <p:nvPicPr>
+          <p:cNvPr id="7" name="Picture 6"/>
+          <p:cNvPicPr>
+            <a:picLocks noChangeAspect="1"/>
+          </p:cNvPicPr>
+          <p:nvPr/>
+        </p:nvPicPr>
+        <p:blipFill>
+          <a:blip r:embed="rId2">
+            <a:extLst>
+              <a:ext uri="{28A0092B-C50C-407E-A947-70E740481C1C}">
+                <a14:useLocalDpi xmlns:a14="http://schemas.microsoft.com/office/drawing/2010/main" val="0"/>
+              </a:ext>
+            </a:extLst>
+          </a:blip>
+          <a:stretch>
+            <a:fillRect/>
+          </a:stretch>
+        </p:blipFill>
+        <p:spPr>
+          <a:xfrm>
+            <a:off x="817602" y="5091020"/>
+            <a:ext cx="950342" cy="950342"/>
+          </a:xfrm>
+          <a:prstGeom prst="rect">
+            <a:avLst/>
+          </a:prstGeom>
+        </p:spPr>
+      </p:pic>
+      <p:pic>
+        <p:nvPicPr>
+          <p:cNvPr id="8" name="Picture 7"/>
+          <p:cNvPicPr>
+            <a:picLocks noChangeAspect="1"/>
+          </p:cNvPicPr>
+          <p:nvPr/>
+        </p:nvPicPr>
+        <p:blipFill>
+          <a:blip r:embed="rId3" cstate="print">
+            <a:extLst>
+              <a:ext uri="{28A0092B-C50C-407E-A947-70E740481C1C}">
+                <a14:useLocalDpi xmlns:a14="http://schemas.microsoft.com/office/drawing/2010/main" val="0"/>
+              </a:ext>
+            </a:extLst>
+          </a:blip>
+          <a:stretch>
+            <a:fillRect/>
+          </a:stretch>
+        </p:blipFill>
+        <p:spPr>
+          <a:xfrm>
+            <a:off x="3456602" y="3873934"/>
+            <a:ext cx="568024" cy="568024"/>
+          </a:xfrm>
+          <a:prstGeom prst="rect">
+            <a:avLst/>
+          </a:prstGeom>
+        </p:spPr>
+      </p:pic>
+    </p:spTree>
+    <p:extLst>
+      <p:ext uri="{BB962C8B-B14F-4D97-AF65-F5344CB8AC3E}">
+        <p14:creationId xmlns:p14="http://schemas.microsoft.com/office/powerpoint/2010/main" val="2748897786"/>
+      </p:ext>
+    </p:extLst>
+  </p:cSld>
+  <p:clrMapOvr>
+    <a:masterClrMapping/>
+  </p:clrMapOvr>
+</p:sld>
+</file>
+
+<file path=ppt/slides/slide19.xml><?xml version="1.0" encoding="utf-8"?>
+<p:sld xmlns:a="http://schemas.openxmlformats.org/drawingml/2006/main" xmlns:r="http://schemas.openxmlformats.org/officeDocument/2006/relationships" xmlns:p="http://schemas.openxmlformats.org/presentationml/2006/main">
+  <p:cSld>
+    <p:spTree>
+      <p:nvGrpSpPr>
+        <p:cNvPr id="1" name=""/>
+        <p:cNvGrpSpPr/>
+        <p:nvPr/>
+      </p:nvGrpSpPr>
+      <p:grpSpPr>
+        <a:xfrm>
+          <a:off x="0" y="0"/>
+          <a:ext cx="0" cy="0"/>
+          <a:chOff x="0" y="0"/>
+          <a:chExt cx="0" cy="0"/>
+        </a:xfrm>
+      </p:grpSpPr>
       <p:pic>
         <p:nvPicPr>
           <p:cNvPr id="6" name="Picture 5"/>
@@ -20989,7 +21149,7 @@
           <a:p>
             <a:fld id="{3AE964CF-DFDF-4B9D-8AE5-9B4D54DD768C}" type="slidenum">
               <a:rPr lang="en-US" smtClean="0"/>
-              <a:t>18</a:t>
+              <a:t>19</a:t>
             </a:fld>
             <a:endParaRPr lang="en-US" dirty="0"/>
           </a:p>
@@ -21030,7 +21190,7 @@
 </p:sld>
 </file>
 
-<file path=ppt/slides/slide19.xml><?xml version="1.0" encoding="utf-8"?>
+<file path=ppt/slides/slide2.xml><?xml version="1.0" encoding="utf-8"?>
 <p:sld xmlns:a="http://schemas.openxmlformats.org/drawingml/2006/main" xmlns:r="http://schemas.openxmlformats.org/officeDocument/2006/relationships" xmlns:p="http://schemas.openxmlformats.org/presentationml/2006/main">
   <p:cSld>
     <p:spTree>
@@ -21064,6 +21224,153 @@
           <a:p>
             <a:r>
               <a:rPr lang="en-US" dirty="0" smtClean="0"/>
+              <a:t>New Terminology (&lt;= RC1)</a:t>
+            </a:r>
+            <a:endParaRPr lang="en-US" dirty="0"/>
+          </a:p>
+        </p:txBody>
+      </p:sp>
+      <p:sp>
+        <p:nvSpPr>
+          <p:cNvPr id="5" name="Content Placeholder 4"/>
+          <p:cNvSpPr>
+            <a:spLocks noGrp="1"/>
+          </p:cNvSpPr>
+          <p:nvPr>
+            <p:ph idx="1"/>
+          </p:nvPr>
+        </p:nvSpPr>
+        <p:spPr>
+          <a:xfrm>
+            <a:off x="677334" y="1607821"/>
+            <a:ext cx="8596668" cy="4433542"/>
+          </a:xfrm>
+        </p:spPr>
+        <p:txBody>
+          <a:bodyPr/>
+          <a:lstStyle/>
+          <a:p>
+            <a:r>
+              <a:rPr lang="en-US" sz="2000" dirty="0" smtClean="0"/>
+              <a:t>DNVM (.NET Version Manager)</a:t>
+            </a:r>
+          </a:p>
+          <a:p>
+            <a:r>
+              <a:rPr lang="en-US" sz="2000" dirty="0" smtClean="0"/>
+              <a:t>DNX (.NET Execution Environment)</a:t>
+            </a:r>
+          </a:p>
+          <a:p>
+            <a:r>
+              <a:rPr lang="en-US" sz="2000" dirty="0"/>
+              <a:t>DNU (.NET Development </a:t>
+            </a:r>
+            <a:r>
+              <a:rPr lang="en-US" sz="2000" dirty="0" smtClean="0"/>
+              <a:t>Utility)</a:t>
+            </a:r>
+          </a:p>
+          <a:p>
+            <a:pPr marL="0" indent="0">
+              <a:buNone/>
+            </a:pPr>
+            <a:endParaRPr lang="en-US" sz="2000" dirty="0"/>
+          </a:p>
+          <a:p>
+            <a:endParaRPr lang="en-US" sz="2000" dirty="0" smtClean="0"/>
+          </a:p>
+          <a:p>
+            <a:r>
+              <a:rPr lang="en-US" sz="2000" dirty="0" smtClean="0"/>
+              <a:t>Installation of DN* Tooling: </a:t>
+            </a:r>
+            <a:r>
+              <a:rPr lang="en-US" sz="2000" dirty="0">
+                <a:hlinkClick r:id="rId2"/>
+              </a:rPr>
+              <a:t>http://bit.ly/1YaRWJY</a:t>
+            </a:r>
+            <a:endParaRPr lang="en-US" sz="2000" dirty="0"/>
+          </a:p>
+          <a:p>
+            <a:pPr marL="0" indent="0">
+              <a:buNone/>
+            </a:pPr>
+            <a:endParaRPr lang="en-US" dirty="0"/>
+          </a:p>
+        </p:txBody>
+      </p:sp>
+      <p:sp>
+        <p:nvSpPr>
+          <p:cNvPr id="6" name="Slide Number Placeholder 5"/>
+          <p:cNvSpPr>
+            <a:spLocks noGrp="1"/>
+          </p:cNvSpPr>
+          <p:nvPr>
+            <p:ph type="sldNum" sz="quarter" idx="12"/>
+          </p:nvPr>
+        </p:nvSpPr>
+        <p:spPr/>
+        <p:txBody>
+          <a:bodyPr/>
+          <a:lstStyle/>
+          <a:p>
+            <a:fld id="{3AE964CF-DFDF-4B9D-8AE5-9B4D54DD768C}" type="slidenum">
+              <a:rPr lang="en-US" smtClean="0"/>
+              <a:t>2</a:t>
+            </a:fld>
+            <a:endParaRPr lang="en-US" dirty="0"/>
+          </a:p>
+        </p:txBody>
+      </p:sp>
+    </p:spTree>
+    <p:extLst>
+      <p:ext uri="{BB962C8B-B14F-4D97-AF65-F5344CB8AC3E}">
+        <p14:creationId xmlns:p14="http://schemas.microsoft.com/office/powerpoint/2010/main" val="3301370015"/>
+      </p:ext>
+    </p:extLst>
+  </p:cSld>
+  <p:clrMapOvr>
+    <a:masterClrMapping/>
+  </p:clrMapOvr>
+</p:sld>
+</file>
+
+<file path=ppt/slides/slide20.xml><?xml version="1.0" encoding="utf-8"?>
+<p:sld xmlns:a="http://schemas.openxmlformats.org/drawingml/2006/main" xmlns:r="http://schemas.openxmlformats.org/officeDocument/2006/relationships" xmlns:p="http://schemas.openxmlformats.org/presentationml/2006/main">
+  <p:cSld>
+    <p:spTree>
+      <p:nvGrpSpPr>
+        <p:cNvPr id="1" name=""/>
+        <p:cNvGrpSpPr/>
+        <p:nvPr/>
+      </p:nvGrpSpPr>
+      <p:grpSpPr>
+        <a:xfrm>
+          <a:off x="0" y="0"/>
+          <a:ext cx="0" cy="0"/>
+          <a:chOff x="0" y="0"/>
+          <a:chExt cx="0" cy="0"/>
+        </a:xfrm>
+      </p:grpSpPr>
+      <p:sp>
+        <p:nvSpPr>
+          <p:cNvPr id="2" name="Title 1"/>
+          <p:cNvSpPr>
+            <a:spLocks noGrp="1"/>
+          </p:cNvSpPr>
+          <p:nvPr>
+            <p:ph type="title"/>
+          </p:nvPr>
+        </p:nvSpPr>
+        <p:spPr/>
+        <p:txBody>
+          <a:bodyPr/>
+          <a:lstStyle/>
+          <a:p>
+            <a:r>
+              <a:rPr lang="en-US" dirty="0" smtClean="0"/>
               <a:t>CLI Evolution for RC2</a:t>
             </a:r>
             <a:endParaRPr lang="en-US" dirty="0"/>
@@ -21115,7 +21422,7 @@
           <a:p>
             <a:fld id="{3AE964CF-DFDF-4B9D-8AE5-9B4D54DD768C}" type="slidenum">
               <a:rPr lang="en-US" smtClean="0"/>
-              <a:t>19</a:t>
+              <a:t>20</a:t>
             </a:fld>
             <a:endParaRPr lang="en-US" dirty="0"/>
           </a:p>
@@ -21186,7 +21493,7 @@
 </p:sld>
 </file>
 
-<file path=ppt/slides/slide2.xml><?xml version="1.0" encoding="utf-8"?>
+<file path=ppt/slides/slide21.xml><?xml version="1.0" encoding="utf-8"?>
 <p:sld xmlns:a="http://schemas.openxmlformats.org/drawingml/2006/main" xmlns:r="http://schemas.openxmlformats.org/officeDocument/2006/relationships" xmlns:p="http://schemas.openxmlformats.org/presentationml/2006/main">
   <p:cSld>
     <p:spTree>
@@ -21220,162 +21527,7 @@
           <a:p>
             <a:r>
               <a:rPr lang="en-US" dirty="0" smtClean="0"/>
-              <a:t>New Terminology (&lt;= RC1)</a:t>
-            </a:r>
-            <a:endParaRPr lang="en-US" dirty="0"/>
-          </a:p>
-        </p:txBody>
-      </p:sp>
-      <p:sp>
-        <p:nvSpPr>
-          <p:cNvPr id="5" name="Content Placeholder 4"/>
-          <p:cNvSpPr>
-            <a:spLocks noGrp="1"/>
-          </p:cNvSpPr>
-          <p:nvPr>
-            <p:ph idx="1"/>
-          </p:nvPr>
-        </p:nvSpPr>
-        <p:spPr>
-          <a:xfrm>
-            <a:off x="677334" y="1607821"/>
-            <a:ext cx="8596668" cy="4433542"/>
-          </a:xfrm>
-        </p:spPr>
-        <p:txBody>
-          <a:bodyPr/>
-          <a:lstStyle/>
-          <a:p>
-            <a:r>
-              <a:rPr lang="en-US" sz="2000" dirty="0" smtClean="0"/>
-              <a:t>DNVM (.NET Version Manager)</a:t>
-            </a:r>
-          </a:p>
-          <a:p>
-            <a:r>
-              <a:rPr lang="en-US" sz="2000" dirty="0" smtClean="0"/>
-              <a:t>DNX (.NET Execution Environment)</a:t>
-            </a:r>
-          </a:p>
-          <a:p>
-            <a:r>
-              <a:rPr lang="en-US" sz="2000" dirty="0"/>
-              <a:t>DNU (.NET Development </a:t>
-            </a:r>
-            <a:r>
-              <a:rPr lang="en-US" sz="2000" dirty="0" smtClean="0"/>
-              <a:t>Utility)</a:t>
-            </a:r>
-          </a:p>
-          <a:p>
-            <a:pPr marL="0" indent="0">
-              <a:buNone/>
-            </a:pPr>
-            <a:endParaRPr lang="en-US" sz="2000" dirty="0"/>
-          </a:p>
-          <a:p>
-            <a:endParaRPr lang="en-US" sz="2000" dirty="0" smtClean="0"/>
-          </a:p>
-          <a:p>
-            <a:r>
-              <a:rPr lang="en-US" sz="2000" dirty="0" smtClean="0"/>
-              <a:t>Installation of DN* Tooling: </a:t>
-            </a:r>
-            <a:r>
-              <a:rPr lang="en-US" sz="2000" dirty="0">
-                <a:hlinkClick r:id="rId2"/>
-              </a:rPr>
-              <a:t>http://bit.ly/1YaRWJY</a:t>
-            </a:r>
-            <a:endParaRPr lang="en-US" sz="2000" dirty="0"/>
-          </a:p>
-          <a:p>
-            <a:pPr marL="0" indent="0">
-              <a:buNone/>
-            </a:pPr>
-            <a:endParaRPr lang="en-US" dirty="0"/>
-          </a:p>
-        </p:txBody>
-      </p:sp>
-      <p:sp>
-        <p:nvSpPr>
-          <p:cNvPr id="6" name="Slide Number Placeholder 5"/>
-          <p:cNvSpPr>
-            <a:spLocks noGrp="1"/>
-          </p:cNvSpPr>
-          <p:nvPr>
-            <p:ph type="sldNum" sz="quarter" idx="12"/>
-          </p:nvPr>
-        </p:nvSpPr>
-        <p:spPr/>
-        <p:txBody>
-          <a:bodyPr/>
-          <a:lstStyle/>
-          <a:p>
-            <a:fld id="{3AE964CF-DFDF-4B9D-8AE5-9B4D54DD768C}" type="slidenum">
-              <a:rPr lang="en-US" smtClean="0"/>
-              <a:t>2</a:t>
-            </a:fld>
-            <a:endParaRPr lang="en-US" dirty="0"/>
-          </a:p>
-        </p:txBody>
-      </p:sp>
-    </p:spTree>
-    <p:extLst>
-      <p:ext uri="{BB962C8B-B14F-4D97-AF65-F5344CB8AC3E}">
-        <p14:creationId xmlns:p14="http://schemas.microsoft.com/office/powerpoint/2010/main" val="3301370015"/>
-      </p:ext>
-    </p:extLst>
-  </p:cSld>
-  <p:clrMapOvr>
-    <a:masterClrMapping/>
-  </p:clrMapOvr>
-</p:sld>
-</file>
-
-<file path=ppt/slides/slide20.xml><?xml version="1.0" encoding="utf-8"?>
-<p:sld xmlns:a="http://schemas.openxmlformats.org/drawingml/2006/main" xmlns:r="http://schemas.openxmlformats.org/officeDocument/2006/relationships" xmlns:p="http://schemas.openxmlformats.org/presentationml/2006/main">
-  <p:cSld>
-    <p:spTree>
-      <p:nvGrpSpPr>
-        <p:cNvPr id="1" name=""/>
-        <p:cNvGrpSpPr/>
-        <p:nvPr/>
-      </p:nvGrpSpPr>
-      <p:grpSpPr>
-        <a:xfrm>
-          <a:off x="0" y="0"/>
-          <a:ext cx="0" cy="0"/>
-          <a:chOff x="0" y="0"/>
-          <a:chExt cx="0" cy="0"/>
-        </a:xfrm>
-      </p:grpSpPr>
-      <p:sp>
-        <p:nvSpPr>
-          <p:cNvPr id="2" name="Title 1"/>
-          <p:cNvSpPr>
-            <a:spLocks noGrp="1"/>
-          </p:cNvSpPr>
-          <p:nvPr>
-            <p:ph type="title"/>
-          </p:nvPr>
-        </p:nvSpPr>
-        <p:spPr/>
-        <p:txBody>
-          <a:bodyPr/>
-          <a:lstStyle/>
-          <a:p>
-            <a:r>
-              <a:rPr lang="en-US" dirty="0" smtClean="0"/>
-              <a:t>DNX-to-</a:t>
-            </a:r>
-            <a:r>
-              <a:rPr lang="en-US" dirty="0" err="1" smtClean="0"/>
-              <a:t>dotnet</a:t>
-            </a:r>
-            <a:r>
-              <a:rPr lang="en-US" dirty="0" smtClean="0"/>
-              <a:t> Command Mappings</a:t>
+              <a:t>DNX-to-dotnet Command Mappings</a:t>
             </a:r>
             <a:endParaRPr lang="en-US" dirty="0"/>
           </a:p>
@@ -21464,16 +21616,10 @@
                     <a:lstStyle/>
                     <a:p>
                       <a:r>
-                        <a:rPr lang="en-US" sz="2000" dirty="0" err="1" smtClean="0">
-                          <a:latin typeface="Consolas" panose="020B0609020204030204" pitchFamily="49" charset="0"/>
-                        </a:rPr>
-                        <a:t>dnu</a:t>
-                      </a:r>
-                      <a:r>
                         <a:rPr lang="en-US" sz="2000" dirty="0" smtClean="0">
                           <a:latin typeface="Consolas" panose="020B0609020204030204" pitchFamily="49" charset="0"/>
                         </a:rPr>
-                        <a:t> restore</a:t>
+                        <a:t>dnu restore</a:t>
                       </a:r>
                       <a:endParaRPr lang="en-US" sz="2000" dirty="0">
                         <a:latin typeface="Consolas" panose="020B0609020204030204" pitchFamily="49" charset="0"/>
@@ -21488,16 +21634,10 @@
                     <a:lstStyle/>
                     <a:p>
                       <a:r>
-                        <a:rPr lang="en-US" sz="2000" dirty="0" err="1" smtClean="0">
-                          <a:latin typeface="Consolas" panose="020B0609020204030204" pitchFamily="49" charset="0"/>
-                        </a:rPr>
-                        <a:t>dotnet</a:t>
-                      </a:r>
-                      <a:r>
                         <a:rPr lang="en-US" sz="2000" dirty="0" smtClean="0">
                           <a:latin typeface="Consolas" panose="020B0609020204030204" pitchFamily="49" charset="0"/>
                         </a:rPr>
-                        <a:t> restore</a:t>
+                        <a:t>dotnet restore</a:t>
                       </a:r>
                       <a:endParaRPr lang="en-US" sz="2000" dirty="0">
                         <a:latin typeface="Consolas" panose="020B0609020204030204" pitchFamily="49" charset="0"/>
@@ -21519,16 +21659,10 @@
                     <a:lstStyle/>
                     <a:p>
                       <a:r>
-                        <a:rPr lang="en-US" sz="2000" dirty="0" err="1" smtClean="0">
-                          <a:latin typeface="Consolas" panose="020B0609020204030204" pitchFamily="49" charset="0"/>
-                        </a:rPr>
-                        <a:t>dnu</a:t>
-                      </a:r>
-                      <a:r>
                         <a:rPr lang="en-US" sz="2000" dirty="0" smtClean="0">
                           <a:latin typeface="Consolas" panose="020B0609020204030204" pitchFamily="49" charset="0"/>
                         </a:rPr>
-                        <a:t> pack</a:t>
+                        <a:t>dnu pack</a:t>
                       </a:r>
                       <a:endParaRPr lang="en-US" sz="2000" dirty="0">
                         <a:latin typeface="Consolas" panose="020B0609020204030204" pitchFamily="49" charset="0"/>
@@ -21543,16 +21677,10 @@
                     <a:lstStyle/>
                     <a:p>
                       <a:r>
-                        <a:rPr lang="en-US" sz="2000" dirty="0" err="1" smtClean="0">
-                          <a:latin typeface="Consolas" panose="020B0609020204030204" pitchFamily="49" charset="0"/>
-                        </a:rPr>
-                        <a:t>dotnet</a:t>
-                      </a:r>
-                      <a:r>
                         <a:rPr lang="en-US" sz="2000" dirty="0" smtClean="0">
                           <a:latin typeface="Consolas" panose="020B0609020204030204" pitchFamily="49" charset="0"/>
                         </a:rPr>
-                        <a:t> pack</a:t>
+                        <a:t>dotnet pack</a:t>
                       </a:r>
                       <a:endParaRPr lang="en-US" sz="2000" dirty="0">
                         <a:latin typeface="Consolas" panose="020B0609020204030204" pitchFamily="49" charset="0"/>
@@ -21574,16 +21702,10 @@
                     <a:lstStyle/>
                     <a:p>
                       <a:r>
-                        <a:rPr lang="en-US" sz="2000" dirty="0" err="1" smtClean="0">
-                          <a:latin typeface="Consolas" panose="020B0609020204030204" pitchFamily="49" charset="0"/>
-                        </a:rPr>
-                        <a:t>dnu</a:t>
-                      </a:r>
-                      <a:r>
                         <a:rPr lang="en-US" sz="2000" dirty="0" smtClean="0">
                           <a:latin typeface="Consolas" panose="020B0609020204030204" pitchFamily="49" charset="0"/>
                         </a:rPr>
-                        <a:t> build</a:t>
+                        <a:t>dnu build</a:t>
                       </a:r>
                       <a:endParaRPr lang="en-US" sz="2000" dirty="0">
                         <a:latin typeface="Consolas" panose="020B0609020204030204" pitchFamily="49" charset="0"/>
@@ -21598,16 +21720,10 @@
                     <a:lstStyle/>
                     <a:p>
                       <a:r>
-                        <a:rPr lang="en-US" sz="2000" dirty="0" err="1" smtClean="0">
-                          <a:latin typeface="Consolas" panose="020B0609020204030204" pitchFamily="49" charset="0"/>
-                        </a:rPr>
-                        <a:t>dotnet</a:t>
-                      </a:r>
-                      <a:r>
                         <a:rPr lang="en-US" sz="2000" dirty="0" smtClean="0">
                           <a:latin typeface="Consolas" panose="020B0609020204030204" pitchFamily="49" charset="0"/>
                         </a:rPr>
-                        <a:t> compile/build</a:t>
+                        <a:t>dotnet compile/build</a:t>
                       </a:r>
                       <a:endParaRPr lang="en-US" sz="2000" dirty="0">
                         <a:latin typeface="Consolas" panose="020B0609020204030204" pitchFamily="49" charset="0"/>
@@ -21629,16 +21745,10 @@
                     <a:lstStyle/>
                     <a:p>
                       <a:r>
-                        <a:rPr lang="en-US" sz="2000" dirty="0" err="1" smtClean="0">
-                          <a:latin typeface="Consolas" panose="020B0609020204030204" pitchFamily="49" charset="0"/>
-                        </a:rPr>
-                        <a:t>dnu</a:t>
-                      </a:r>
-                      <a:r>
                         <a:rPr lang="en-US" sz="2000" dirty="0" smtClean="0">
                           <a:latin typeface="Consolas" panose="020B0609020204030204" pitchFamily="49" charset="0"/>
                         </a:rPr>
-                        <a:t> publish</a:t>
+                        <a:t>dnu publish</a:t>
                       </a:r>
                       <a:endParaRPr lang="en-US" sz="2000" dirty="0">
                         <a:latin typeface="Consolas" panose="020B0609020204030204" pitchFamily="49" charset="0"/>
@@ -21653,7 +21763,7 @@
                     <a:lstStyle/>
                     <a:p>
                       <a:r>
-                        <a:rPr lang="en-US" sz="2000" dirty="0" err="1" smtClean="0">
+                        <a:rPr lang="en-US" sz="2000" dirty="0" smtClean="0">
                           <a:latin typeface="Consolas" panose="020B0609020204030204" pitchFamily="49" charset="0"/>
                         </a:rPr>
                         <a:t>dotnet</a:t>
@@ -21684,16 +21794,10 @@
                     <a:lstStyle/>
                     <a:p>
                       <a:r>
-                        <a:rPr lang="en-US" sz="2000" dirty="0" err="1" smtClean="0">
-                          <a:latin typeface="Consolas" panose="020B0609020204030204" pitchFamily="49" charset="0"/>
-                        </a:rPr>
-                        <a:t>dnu</a:t>
-                      </a:r>
-                      <a:r>
                         <a:rPr lang="en-US" sz="2000" dirty="0" smtClean="0">
                           <a:latin typeface="Consolas" panose="020B0609020204030204" pitchFamily="49" charset="0"/>
                         </a:rPr>
-                        <a:t> run</a:t>
+                        <a:t>dnu run</a:t>
                       </a:r>
                       <a:endParaRPr lang="en-US" sz="2000" dirty="0">
                         <a:latin typeface="Consolas" panose="020B0609020204030204" pitchFamily="49" charset="0"/>
@@ -21708,16 +21812,10 @@
                     <a:lstStyle/>
                     <a:p>
                       <a:r>
-                        <a:rPr lang="en-US" sz="2000" dirty="0" err="1" smtClean="0">
-                          <a:latin typeface="Consolas" panose="020B0609020204030204" pitchFamily="49" charset="0"/>
-                        </a:rPr>
-                        <a:t>dotnet</a:t>
-                      </a:r>
-                      <a:r>
                         <a:rPr lang="en-US" sz="2000" dirty="0" smtClean="0">
                           <a:latin typeface="Consolas" panose="020B0609020204030204" pitchFamily="49" charset="0"/>
                         </a:rPr>
-                        <a:t> run</a:t>
+                        <a:t>dotnet run</a:t>
                       </a:r>
                       <a:endParaRPr lang="en-US" sz="2000" dirty="0">
                         <a:latin typeface="Consolas" panose="020B0609020204030204" pitchFamily="49" charset="0"/>
@@ -21739,16 +21837,10 @@
                     <a:lstStyle/>
                     <a:p>
                       <a:r>
-                        <a:rPr lang="en-US" sz="2000" dirty="0" err="1" smtClean="0">
-                          <a:latin typeface="Consolas" panose="020B0609020204030204" pitchFamily="49" charset="0"/>
-                        </a:rPr>
-                        <a:t>dnx</a:t>
-                      </a:r>
-                      <a:r>
                         <a:rPr lang="en-US" sz="2000" dirty="0" smtClean="0">
                           <a:latin typeface="Consolas" panose="020B0609020204030204" pitchFamily="49" charset="0"/>
                         </a:rPr>
-                        <a:t>-watch</a:t>
+                        <a:t>dnx-watch</a:t>
                       </a:r>
                       <a:endParaRPr lang="en-US" sz="2000" dirty="0">
                         <a:latin typeface="Consolas" panose="020B0609020204030204" pitchFamily="49" charset="0"/>
@@ -21763,16 +21855,10 @@
                     <a:lstStyle/>
                     <a:p>
                       <a:r>
-                        <a:rPr lang="en-US" sz="2000" dirty="0" err="1" smtClean="0">
-                          <a:latin typeface="Consolas" panose="020B0609020204030204" pitchFamily="49" charset="0"/>
-                        </a:rPr>
-                        <a:t>dotnet</a:t>
-                      </a:r>
-                      <a:r>
                         <a:rPr lang="en-US" sz="2000" dirty="0" smtClean="0">
                           <a:latin typeface="Consolas" panose="020B0609020204030204" pitchFamily="49" charset="0"/>
                         </a:rPr>
-                        <a:t> watch</a:t>
+                        <a:t>dotnet watch</a:t>
                       </a:r>
                       <a:endParaRPr lang="en-US" sz="2000" dirty="0">
                         <a:latin typeface="Consolas" panose="020B0609020204030204" pitchFamily="49" charset="0"/>
@@ -21794,7 +21880,7 @@
                     <a:lstStyle/>
                     <a:p>
                       <a:r>
-                        <a:rPr lang="en-US" sz="2000" dirty="0" err="1" smtClean="0">
+                        <a:rPr lang="en-US" sz="2000" dirty="0" smtClean="0">
                           <a:latin typeface="Consolas" panose="020B0609020204030204" pitchFamily="49" charset="0"/>
                         </a:rPr>
                         <a:t>dnx</a:t>
@@ -21803,13 +21889,7 @@
                         <a:rPr lang="en-US" sz="2000" baseline="0" dirty="0" smtClean="0">
                           <a:latin typeface="Consolas" panose="020B0609020204030204" pitchFamily="49" charset="0"/>
                         </a:rPr>
-                        <a:t> </a:t>
-                      </a:r>
-                      <a:r>
-                        <a:rPr lang="en-US" sz="2000" baseline="0" dirty="0" err="1" smtClean="0">
-                          <a:latin typeface="Consolas" panose="020B0609020204030204" pitchFamily="49" charset="0"/>
-                        </a:rPr>
-                        <a:t>ef</a:t>
+                        <a:t> ef</a:t>
                       </a:r>
                       <a:endParaRPr lang="en-US" sz="2000" dirty="0">
                         <a:latin typeface="Consolas" panose="020B0609020204030204" pitchFamily="49" charset="0"/>
@@ -21824,22 +21904,10 @@
                     <a:lstStyle/>
                     <a:p>
                       <a:r>
-                        <a:rPr lang="en-US" sz="2000" dirty="0" err="1" smtClean="0">
-                          <a:latin typeface="Consolas" panose="020B0609020204030204" pitchFamily="49" charset="0"/>
-                        </a:rPr>
-                        <a:t>dotnet</a:t>
-                      </a:r>
-                      <a:r>
                         <a:rPr lang="en-US" sz="2000" dirty="0" smtClean="0">
                           <a:latin typeface="Consolas" panose="020B0609020204030204" pitchFamily="49" charset="0"/>
                         </a:rPr>
-                        <a:t> </a:t>
-                      </a:r>
-                      <a:r>
-                        <a:rPr lang="en-US" sz="2000" dirty="0" err="1" smtClean="0">
-                          <a:latin typeface="Consolas" panose="020B0609020204030204" pitchFamily="49" charset="0"/>
-                        </a:rPr>
-                        <a:t>ef</a:t>
+                        <a:t>dotnet ef</a:t>
                       </a:r>
                       <a:endParaRPr lang="en-US" sz="2000" dirty="0">
                         <a:latin typeface="Consolas" panose="020B0609020204030204" pitchFamily="49" charset="0"/>
@@ -21861,16 +21929,10 @@
                     <a:lstStyle/>
                     <a:p>
                       <a:r>
-                        <a:rPr lang="en-US" sz="2000" dirty="0" err="1" smtClean="0">
-                          <a:latin typeface="Consolas" panose="020B0609020204030204" pitchFamily="49" charset="0"/>
-                        </a:rPr>
-                        <a:t>dnx</a:t>
-                      </a:r>
-                      <a:r>
                         <a:rPr lang="en-US" sz="2000" dirty="0" smtClean="0">
                           <a:latin typeface="Consolas" panose="020B0609020204030204" pitchFamily="49" charset="0"/>
                         </a:rPr>
-                        <a:t> test</a:t>
+                        <a:t>dnx test</a:t>
                       </a:r>
                       <a:endParaRPr lang="en-US" sz="2000" dirty="0">
                         <a:latin typeface="Consolas" panose="020B0609020204030204" pitchFamily="49" charset="0"/>
@@ -21885,16 +21947,10 @@
                     <a:lstStyle/>
                     <a:p>
                       <a:r>
-                        <a:rPr lang="en-US" sz="2000" dirty="0" err="1" smtClean="0">
-                          <a:latin typeface="Consolas" panose="020B0609020204030204" pitchFamily="49" charset="0"/>
-                        </a:rPr>
-                        <a:t>dotnet</a:t>
-                      </a:r>
-                      <a:r>
                         <a:rPr lang="en-US" sz="2000" dirty="0" smtClean="0">
                           <a:latin typeface="Consolas" panose="020B0609020204030204" pitchFamily="49" charset="0"/>
                         </a:rPr>
-                        <a:t> test</a:t>
+                        <a:t>dotnet test</a:t>
                       </a:r>
                       <a:endParaRPr lang="en-US" sz="2000" dirty="0">
                         <a:latin typeface="Consolas" panose="020B0609020204030204" pitchFamily="49" charset="0"/>
@@ -21934,16 +21990,10 @@
                     <a:lstStyle/>
                     <a:p>
                       <a:r>
-                        <a:rPr lang="en-US" sz="2000" dirty="0" err="1" smtClean="0">
-                          <a:latin typeface="Consolas" panose="020B0609020204030204" pitchFamily="49" charset="0"/>
-                        </a:rPr>
-                        <a:t>dotnet</a:t>
-                      </a:r>
-                      <a:r>
                         <a:rPr lang="en-US" sz="2000" dirty="0" smtClean="0">
                           <a:latin typeface="Consolas" panose="020B0609020204030204" pitchFamily="49" charset="0"/>
                         </a:rPr>
-                        <a:t> user-secrets</a:t>
+                        <a:t>dotnet user-secrets</a:t>
                       </a:r>
                       <a:endParaRPr lang="en-US" sz="2000" dirty="0">
                         <a:latin typeface="Consolas" panose="020B0609020204030204" pitchFamily="49" charset="0"/>
@@ -21979,7 +22029,7 @@
           <a:p>
             <a:fld id="{3AE964CF-DFDF-4B9D-8AE5-9B4D54DD768C}" type="slidenum">
               <a:rPr lang="en-US" smtClean="0"/>
-              <a:t>20</a:t>
+              <a:t>21</a:t>
             </a:fld>
             <a:endParaRPr lang="en-US" dirty="0"/>
           </a:p>
@@ -21998,7 +22048,7 @@
 </p:sld>
 </file>
 
-<file path=ppt/slides/slide21.xml><?xml version="1.0" encoding="utf-8"?>
+<file path=ppt/slides/slide22.xml><?xml version="1.0" encoding="utf-8"?>
 <p:sld xmlns:a="http://schemas.openxmlformats.org/drawingml/2006/main" xmlns:r="http://schemas.openxmlformats.org/officeDocument/2006/relationships" xmlns:p="http://schemas.openxmlformats.org/presentationml/2006/main">
   <p:cSld>
     <p:spTree>
@@ -22042,21 +22092,7 @@
                 <a:latin typeface="Consolas" panose="020B0609020204030204" pitchFamily="49" charset="0"/>
                 <a:cs typeface="Consolas" panose="020B0609020204030204" pitchFamily="49" charset="0"/>
               </a:rPr>
-              <a:t> </a:t>
-            </a:r>
-            <a:r>
-              <a:rPr lang="en-US" dirty="0" err="1" smtClean="0">
-                <a:latin typeface="Consolas" panose="020B0609020204030204" pitchFamily="49" charset="0"/>
-                <a:cs typeface="Consolas" panose="020B0609020204030204" pitchFamily="49" charset="0"/>
-              </a:rPr>
-              <a:t>dotnet</a:t>
-            </a:r>
-            <a:r>
-              <a:rPr lang="en-US" dirty="0" smtClean="0">
-                <a:latin typeface="Consolas" panose="020B0609020204030204" pitchFamily="49" charset="0"/>
-                <a:cs typeface="Consolas" panose="020B0609020204030204" pitchFamily="49" charset="0"/>
-              </a:rPr>
-              <a:t> CLI Demo</a:t>
+              <a:t> dotnet CLI Demo</a:t>
             </a:r>
             <a:r>
               <a:rPr lang="en-US" dirty="0" smtClean="0"/>
@@ -22106,7 +22142,7 @@
           <a:p>
             <a:fld id="{3AE964CF-DFDF-4B9D-8AE5-9B4D54DD768C}" type="slidenum">
               <a:rPr lang="en-US" smtClean="0"/>
-              <a:t>21</a:t>
+              <a:t>22</a:t>
             </a:fld>
             <a:endParaRPr lang="en-US" dirty="0"/>
           </a:p>
@@ -22185,7 +22221,7 @@
 </p:sld>
 </file>
 
-<file path=ppt/slides/slide22.xml><?xml version="1.0" encoding="utf-8"?>
+<file path=ppt/slides/slide23.xml><?xml version="1.0" encoding="utf-8"?>
 <p:sld xmlns:a="http://schemas.openxmlformats.org/drawingml/2006/main" xmlns:r="http://schemas.openxmlformats.org/officeDocument/2006/relationships" xmlns:p="http://schemas.openxmlformats.org/presentationml/2006/main">
   <p:cSld>
     <p:spTree>
@@ -22308,7 +22344,7 @@
         </p:nvSpPr>
         <p:spPr>
           <a:xfrm>
-            <a:off x="4804758" y="2160589"/>
+            <a:off x="4804758" y="1641778"/>
             <a:ext cx="5182306" cy="3880773"/>
           </a:xfrm>
         </p:spPr>
@@ -22321,10 +22357,6 @@
             <a:pPr marL="0" indent="0" algn="ctr">
               <a:buNone/>
             </a:pPr>
-            <a:r>
-              <a:rPr lang="en-US" sz="2000" b="1" u="sng" dirty="0" smtClean="0"/>
-              <a:t>Contact</a:t>
-            </a:r>
             <a:endParaRPr lang="en-US" sz="2000" b="1" u="sng" dirty="0"/>
           </a:p>
         </p:txBody>
@@ -22346,7 +22378,7 @@
           <a:p>
             <a:fld id="{3AE964CF-DFDF-4B9D-8AE5-9B4D54DD768C}" type="slidenum">
               <a:rPr lang="en-US" smtClean="0"/>
-              <a:t>22</a:t>
+              <a:t>23</a:t>
             </a:fld>
             <a:endParaRPr lang="en-US" dirty="0"/>
           </a:p>
@@ -22362,7 +22394,7 @@
         </p:nvSpPr>
         <p:spPr>
           <a:xfrm>
-            <a:off x="4877439" y="2863044"/>
+            <a:off x="4877439" y="2344233"/>
             <a:ext cx="5256186" cy="3880773"/>
           </a:xfrm>
           <a:prstGeom prst="rect">
@@ -22609,25 +22641,7 @@
                 </a:solidFill>
                 <a:hlinkClick r:id="rId3"/>
               </a:rPr>
-              <a:t>GitHub.com/</a:t>
-            </a:r>
-            <a:r>
-              <a:rPr lang="en-US" sz="1800" dirty="0" err="1" smtClean="0">
-                <a:solidFill>
-                  <a:srgbClr val="FF0000"/>
-                </a:solidFill>
-                <a:hlinkClick r:id="rId3"/>
-              </a:rPr>
-              <a:t>scottaddie</a:t>
-            </a:r>
-            <a:r>
-              <a:rPr lang="en-US" sz="1800" dirty="0" smtClean="0">
-                <a:solidFill>
-                  <a:srgbClr val="FF0000"/>
-                </a:solidFill>
-                <a:hlinkClick r:id="rId3"/>
-              </a:rPr>
-              <a:t>/vscode-aspnet5</a:t>
+              <a:t>GitHub.com/scottaddie/vscode-aspnet5</a:t>
             </a:r>
             <a:endParaRPr lang="en-US" sz="1800" dirty="0" smtClean="0">
               <a:solidFill>
@@ -22664,13 +22678,7 @@
               <a:rPr lang="en-US" sz="1800" dirty="0" smtClean="0">
                 <a:hlinkClick r:id="rId5"/>
               </a:rPr>
-              <a:t>@</a:t>
-            </a:r>
-            <a:r>
-              <a:rPr lang="en-US" sz="1800" dirty="0" err="1" smtClean="0">
-                <a:hlinkClick r:id="rId5"/>
-              </a:rPr>
-              <a:t>Scott_Addie</a:t>
+              <a:t>@Scott_Addie</a:t>
             </a:r>
             <a:endParaRPr lang="en-US" sz="1800" dirty="0" smtClean="0"/>
           </a:p>
@@ -22686,13 +22694,7 @@
               <a:rPr lang="en-US" sz="1800" dirty="0" smtClean="0">
                 <a:hlinkClick r:id="rId6"/>
               </a:rPr>
-              <a:t>LinkedIn.com/in/</a:t>
-            </a:r>
-            <a:r>
-              <a:rPr lang="en-US" sz="1800" dirty="0" err="1" smtClean="0">
-                <a:hlinkClick r:id="rId6"/>
-              </a:rPr>
-              <a:t>scottaddie</a:t>
+              <a:t>LinkedIn.com/in/scottaddie</a:t>
             </a:r>
             <a:endParaRPr lang="en-US" sz="1800" dirty="0" smtClean="0"/>
           </a:p>
@@ -22720,7 +22722,7 @@
         </p:blipFill>
         <p:spPr>
           <a:xfrm>
-            <a:off x="4979904" y="4391259"/>
+            <a:off x="4979904" y="3872448"/>
             <a:ext cx="682893" cy="555188"/>
           </a:xfrm>
           <a:prstGeom prst="rect">
@@ -22750,7 +22752,7 @@
         </p:blipFill>
         <p:spPr>
           <a:xfrm>
-            <a:off x="4968012" y="5126096"/>
+            <a:off x="4968012" y="4607285"/>
             <a:ext cx="658867" cy="658867"/>
           </a:xfrm>
           <a:prstGeom prst="rect">
@@ -22780,7 +22782,7 @@
         </p:blipFill>
         <p:spPr>
           <a:xfrm>
-            <a:off x="4867945" y="3540172"/>
+            <a:off x="4867945" y="3021361"/>
             <a:ext cx="868219" cy="663932"/>
           </a:xfrm>
           <a:prstGeom prst="rect">
@@ -22810,7 +22812,7 @@
         </p:blipFill>
         <p:spPr>
           <a:xfrm>
-            <a:off x="4893569" y="2632855"/>
+            <a:off x="4893569" y="2114044"/>
             <a:ext cx="817673" cy="817673"/>
           </a:xfrm>
           <a:prstGeom prst="rect">
@@ -24191,15 +24193,7 @@
             <a:pPr lvl="2"/>
             <a:r>
               <a:rPr lang="en-US" sz="1700" dirty="0" smtClean="0"/>
-              <a:t>.NET Core, .NET </a:t>
-            </a:r>
-            <a:r>
-              <a:rPr lang="en-US" sz="1700" dirty="0" err="1" smtClean="0"/>
-              <a:t>Fx</a:t>
-            </a:r>
-            <a:r>
-              <a:rPr lang="en-US" sz="1700" dirty="0" smtClean="0"/>
-              <a:t>, Mono, etc.</a:t>
+              <a:t>.NET Core, .NET Fx, Mono, etc.</a:t>
             </a:r>
             <a:endParaRPr lang="en-US" sz="1700" dirty="0"/>
           </a:p>
@@ -24968,8 +24962,8 @@
           </a:prstGeom>
         </p:spPr>
       </p:pic>
-      <mc:AlternateContent xmlns:mc="http://schemas.openxmlformats.org/markup-compatibility/2006" xmlns:we="http://schemas.microsoft.com/office/webextensions/webextension/2010/11" xmlns:pca="http://schemas.microsoft.com/office/powerpoint/2013/contentapp">
-        <mc:Choice Requires="we pca">
+      <mc:AlternateContent xmlns:mc="http://schemas.openxmlformats.org/markup-compatibility/2006">
+        <mc:Choice xmlns:we="http://schemas.microsoft.com/office/webextensions/webextension/2010/11" xmlns:pca="http://schemas.microsoft.com/office/powerpoint/2013/contentapp" Requires="we pca">
           <p:graphicFrame>
             <p:nvGraphicFramePr>
               <p:cNvPr id="7" name="Add-in 6" title="Code Presenter Pro"/>
@@ -24995,7 +24989,7 @@
             </a:graphic>
           </p:graphicFrame>
         </mc:Choice>
-        <mc:Fallback xmlns="">
+        <mc:Fallback>
           <p:pic>
             <p:nvPicPr>
               <p:cNvPr id="7" name="Add-in 6" title="Code Presenter Pro"/>

</xml_diff>

<commit_message>
Add animations to slides
</commit_message>
<xml_diff>
--- a/Getting Started with ASP.NET Core 1.0 in VS Code - SFLCC.pptx
+++ b/Getting Started with ASP.NET Core 1.0 in VS Code - SFLCC.pptx
@@ -4314,8 +4314,8 @@
     <dgm:cxn modelId="{BE4D6236-A3E0-4057-9A2C-42D4A877D36E}" type="presOf" srcId="{8A45336E-5408-4D62-9EF1-08F486318BFF}" destId="{57863176-DB12-4225-A941-96CD5A6A82CC}" srcOrd="0" destOrd="0" presId="urn:microsoft.com/office/officeart/2005/8/layout/hChevron3"/>
     <dgm:cxn modelId="{1C1D83E0-DB0F-4A9B-A04D-A392BE0DD04C}" type="presOf" srcId="{AFF4B1FA-9A6B-43F7-B8CB-4C91CF1DDBE0}" destId="{6E8A8CB1-126C-4A8D-95E5-7D016B2029F2}" srcOrd="0" destOrd="0" presId="urn:microsoft.com/office/officeart/2005/8/layout/hChevron3"/>
     <dgm:cxn modelId="{DCD6A15A-B19C-4616-9ED1-26DCB2C43285}" srcId="{8A45336E-5408-4D62-9EF1-08F486318BFF}" destId="{8BEAE8CB-A7D8-45E4-BC87-9A18CED7E7CE}" srcOrd="0" destOrd="0" parTransId="{E16CB781-B1BB-4E9E-9C86-96F481B14BFA}" sibTransId="{48747E02-CA4B-4EA6-9401-0110B1D75C1C}"/>
+    <dgm:cxn modelId="{C70A686A-14B0-4CBB-AA56-4BFD6C2C7B89}" type="presOf" srcId="{766D0765-5B45-432B-826E-9A27A845A5A7}" destId="{F0AA213A-C7FF-4409-B147-991ABB26AAB2}" srcOrd="0" destOrd="0" presId="urn:microsoft.com/office/officeart/2005/8/layout/hChevron3"/>
     <dgm:cxn modelId="{94C1853C-02E7-4C27-A29A-FC84C3187A32}" srcId="{8A45336E-5408-4D62-9EF1-08F486318BFF}" destId="{A917A1F9-17B7-4B88-9FAD-AF41E2910DBD}" srcOrd="3" destOrd="0" parTransId="{FEFD055D-8110-41D2-83FF-BB68E3C24098}" sibTransId="{A2ABC1CA-D4DB-4C0F-83FD-5DAA1C23AAEA}"/>
-    <dgm:cxn modelId="{C70A686A-14B0-4CBB-AA56-4BFD6C2C7B89}" type="presOf" srcId="{766D0765-5B45-432B-826E-9A27A845A5A7}" destId="{F0AA213A-C7FF-4409-B147-991ABB26AAB2}" srcOrd="0" destOrd="0" presId="urn:microsoft.com/office/officeart/2005/8/layout/hChevron3"/>
     <dgm:cxn modelId="{9CC9A370-689E-4C6F-B870-78ECD0BA24BE}" type="presOf" srcId="{A917A1F9-17B7-4B88-9FAD-AF41E2910DBD}" destId="{6655FB27-B27C-4A7B-B55D-EF2C08C6B65E}" srcOrd="0" destOrd="0" presId="urn:microsoft.com/office/officeart/2005/8/layout/hChevron3"/>
     <dgm:cxn modelId="{128E7390-4262-4560-BB4D-C552847BC8AE}" type="presOf" srcId="{8BEAE8CB-A7D8-45E4-BC87-9A18CED7E7CE}" destId="{54F0ADA0-D0DF-4213-9ACF-ED13172B50C7}" srcOrd="0" destOrd="0" presId="urn:microsoft.com/office/officeart/2005/8/layout/hChevron3"/>
     <dgm:cxn modelId="{CB4508D6-DCB1-41A9-9031-BAB1F7FDDC1E}" type="presParOf" srcId="{57863176-DB12-4225-A941-96CD5A6A82CC}" destId="{54F0ADA0-D0DF-4213-9ACF-ED13172B50C7}" srcOrd="0" destOrd="0" presId="urn:microsoft.com/office/officeart/2005/8/layout/hChevron3"/>
@@ -20932,14 +20932,7 @@
                 <a:latin typeface="Consolas" panose="020B0609020204030204" pitchFamily="49" charset="0"/>
                 <a:cs typeface="Consolas" panose="020B0609020204030204" pitchFamily="49" charset="0"/>
               </a:rPr>
-              <a:t> </a:t>
-            </a:r>
-            <a:r>
-              <a:rPr lang="en-US" dirty="0" smtClean="0">
-                <a:latin typeface="Consolas" panose="020B0609020204030204" pitchFamily="49" charset="0"/>
-                <a:cs typeface="Consolas" panose="020B0609020204030204" pitchFamily="49" charset="0"/>
-              </a:rPr>
-              <a:t>DN* Demo</a:t>
+              <a:t> DN* Demo</a:t>
             </a:r>
             <a:r>
               <a:rPr lang="en-US" dirty="0" smtClean="0"/>
@@ -23870,6 +23863,130 @@
   <p:clrMapOvr>
     <a:masterClrMapping/>
   </p:clrMapOvr>
+  <p:timing>
+    <p:tnLst>
+      <p:par>
+        <p:cTn id="1" dur="indefinite" restart="never" nodeType="tmRoot">
+          <p:childTnLst>
+            <p:seq concurrent="1" nextAc="seek">
+              <p:cTn id="2" dur="indefinite" nodeType="mainSeq">
+                <p:childTnLst>
+                  <p:par>
+                    <p:cTn id="3" fill="hold">
+                      <p:stCondLst>
+                        <p:cond delay="indefinite"/>
+                      </p:stCondLst>
+                      <p:childTnLst>
+                        <p:par>
+                          <p:cTn id="4" fill="hold">
+                            <p:stCondLst>
+                              <p:cond delay="0"/>
+                            </p:stCondLst>
+                            <p:childTnLst>
+                              <p:par>
+                                <p:cTn id="5" presetID="1" presetClass="entr" presetSubtype="0" fill="hold" nodeType="clickEffect">
+                                  <p:stCondLst>
+                                    <p:cond delay="0"/>
+                                  </p:stCondLst>
+                                  <p:childTnLst>
+                                    <p:set>
+                                      <p:cBhvr>
+                                        <p:cTn id="6" dur="1" fill="hold">
+                                          <p:stCondLst>
+                                            <p:cond delay="0"/>
+                                          </p:stCondLst>
+                                        </p:cTn>
+                                        <p:tgtEl>
+                                          <p:spTgt spid="3">
+                                            <p:txEl>
+                                              <p:pRg st="0" end="0"/>
+                                            </p:txEl>
+                                          </p:spTgt>
+                                        </p:tgtEl>
+                                        <p:attrNameLst>
+                                          <p:attrName>style.visibility</p:attrName>
+                                        </p:attrNameLst>
+                                      </p:cBhvr>
+                                      <p:to>
+                                        <p:strVal val="visible"/>
+                                      </p:to>
+                                    </p:set>
+                                  </p:childTnLst>
+                                </p:cTn>
+                              </p:par>
+                            </p:childTnLst>
+                          </p:cTn>
+                        </p:par>
+                      </p:childTnLst>
+                    </p:cTn>
+                  </p:par>
+                  <p:par>
+                    <p:cTn id="7" fill="hold">
+                      <p:stCondLst>
+                        <p:cond delay="indefinite"/>
+                      </p:stCondLst>
+                      <p:childTnLst>
+                        <p:par>
+                          <p:cTn id="8" fill="hold">
+                            <p:stCondLst>
+                              <p:cond delay="0"/>
+                            </p:stCondLst>
+                            <p:childTnLst>
+                              <p:par>
+                                <p:cTn id="9" presetID="1" presetClass="entr" presetSubtype="0" fill="hold" nodeType="clickEffect">
+                                  <p:stCondLst>
+                                    <p:cond delay="0"/>
+                                  </p:stCondLst>
+                                  <p:childTnLst>
+                                    <p:set>
+                                      <p:cBhvr>
+                                        <p:cTn id="10" dur="1" fill="hold">
+                                          <p:stCondLst>
+                                            <p:cond delay="0"/>
+                                          </p:stCondLst>
+                                        </p:cTn>
+                                        <p:tgtEl>
+                                          <p:spTgt spid="7"/>
+                                        </p:tgtEl>
+                                        <p:attrNameLst>
+                                          <p:attrName>style.visibility</p:attrName>
+                                        </p:attrNameLst>
+                                      </p:cBhvr>
+                                      <p:to>
+                                        <p:strVal val="visible"/>
+                                      </p:to>
+                                    </p:set>
+                                  </p:childTnLst>
+                                </p:cTn>
+                              </p:par>
+                            </p:childTnLst>
+                          </p:cTn>
+                        </p:par>
+                      </p:childTnLst>
+                    </p:cTn>
+                  </p:par>
+                </p:childTnLst>
+              </p:cTn>
+              <p:prevCondLst>
+                <p:cond evt="onPrev" delay="0">
+                  <p:tgtEl>
+                    <p:sldTgt/>
+                  </p:tgtEl>
+                </p:cond>
+              </p:prevCondLst>
+              <p:nextCondLst>
+                <p:cond evt="onNext" delay="0">
+                  <p:tgtEl>
+                    <p:sldTgt/>
+                  </p:tgtEl>
+                </p:cond>
+              </p:nextCondLst>
+            </p:seq>
+          </p:childTnLst>
+        </p:cTn>
+      </p:par>
+    </p:tnLst>
+  </p:timing>
 </p:sld>
 </file>
 
@@ -24083,6 +24200,224 @@
   <p:clrMapOvr>
     <a:masterClrMapping/>
   </p:clrMapOvr>
+  <p:timing>
+    <p:tnLst>
+      <p:par>
+        <p:cTn id="1" dur="indefinite" restart="never" nodeType="tmRoot">
+          <p:childTnLst>
+            <p:seq concurrent="1" nextAc="seek">
+              <p:cTn id="2" dur="indefinite" nodeType="mainSeq">
+                <p:childTnLst>
+                  <p:par>
+                    <p:cTn id="3" fill="hold">
+                      <p:stCondLst>
+                        <p:cond delay="indefinite"/>
+                      </p:stCondLst>
+                      <p:childTnLst>
+                        <p:par>
+                          <p:cTn id="4" fill="hold">
+                            <p:stCondLst>
+                              <p:cond delay="0"/>
+                            </p:stCondLst>
+                            <p:childTnLst>
+                              <p:par>
+                                <p:cTn id="5" presetID="1" presetClass="entr" presetSubtype="0" fill="hold" nodeType="clickEffect">
+                                  <p:stCondLst>
+                                    <p:cond delay="0"/>
+                                  </p:stCondLst>
+                                  <p:childTnLst>
+                                    <p:set>
+                                      <p:cBhvr>
+                                        <p:cTn id="6" dur="1" fill="hold">
+                                          <p:stCondLst>
+                                            <p:cond delay="0"/>
+                                          </p:stCondLst>
+                                        </p:cTn>
+                                        <p:tgtEl>
+                                          <p:spTgt spid="3">
+                                            <p:txEl>
+                                              <p:pRg st="0" end="0"/>
+                                            </p:txEl>
+                                          </p:spTgt>
+                                        </p:tgtEl>
+                                        <p:attrNameLst>
+                                          <p:attrName>style.visibility</p:attrName>
+                                        </p:attrNameLst>
+                                      </p:cBhvr>
+                                      <p:to>
+                                        <p:strVal val="visible"/>
+                                      </p:to>
+                                    </p:set>
+                                  </p:childTnLst>
+                                </p:cTn>
+                              </p:par>
+                            </p:childTnLst>
+                          </p:cTn>
+                        </p:par>
+                      </p:childTnLst>
+                    </p:cTn>
+                  </p:par>
+                  <p:par>
+                    <p:cTn id="7" fill="hold">
+                      <p:stCondLst>
+                        <p:cond delay="indefinite"/>
+                      </p:stCondLst>
+                      <p:childTnLst>
+                        <p:par>
+                          <p:cTn id="8" fill="hold">
+                            <p:stCondLst>
+                              <p:cond delay="0"/>
+                            </p:stCondLst>
+                            <p:childTnLst>
+                              <p:par>
+                                <p:cTn id="9" presetID="1" presetClass="entr" presetSubtype="0" fill="hold" nodeType="clickEffect">
+                                  <p:stCondLst>
+                                    <p:cond delay="0"/>
+                                  </p:stCondLst>
+                                  <p:childTnLst>
+                                    <p:set>
+                                      <p:cBhvr>
+                                        <p:cTn id="10" dur="1" fill="hold">
+                                          <p:stCondLst>
+                                            <p:cond delay="0"/>
+                                          </p:stCondLst>
+                                        </p:cTn>
+                                        <p:tgtEl>
+                                          <p:spTgt spid="7"/>
+                                        </p:tgtEl>
+                                        <p:attrNameLst>
+                                          <p:attrName>style.visibility</p:attrName>
+                                        </p:attrNameLst>
+                                      </p:cBhvr>
+                                      <p:to>
+                                        <p:strVal val="visible"/>
+                                      </p:to>
+                                    </p:set>
+                                  </p:childTnLst>
+                                </p:cTn>
+                              </p:par>
+                            </p:childTnLst>
+                          </p:cTn>
+                        </p:par>
+                      </p:childTnLst>
+                    </p:cTn>
+                  </p:par>
+                  <p:par>
+                    <p:cTn id="11" fill="hold">
+                      <p:stCondLst>
+                        <p:cond delay="indefinite"/>
+                      </p:stCondLst>
+                      <p:childTnLst>
+                        <p:par>
+                          <p:cTn id="12" fill="hold">
+                            <p:stCondLst>
+                              <p:cond delay="0"/>
+                            </p:stCondLst>
+                            <p:childTnLst>
+                              <p:par>
+                                <p:cTn id="13" presetID="1" presetClass="entr" presetSubtype="0" fill="hold" nodeType="clickEffect">
+                                  <p:stCondLst>
+                                    <p:cond delay="0"/>
+                                  </p:stCondLst>
+                                  <p:childTnLst>
+                                    <p:set>
+                                      <p:cBhvr>
+                                        <p:cTn id="14" dur="1" fill="hold">
+                                          <p:stCondLst>
+                                            <p:cond delay="0"/>
+                                          </p:stCondLst>
+                                        </p:cTn>
+                                        <p:tgtEl>
+                                          <p:spTgt spid="3">
+                                            <p:txEl>
+                                              <p:pRg st="5" end="5"/>
+                                            </p:txEl>
+                                          </p:spTgt>
+                                        </p:tgtEl>
+                                        <p:attrNameLst>
+                                          <p:attrName>style.visibility</p:attrName>
+                                        </p:attrNameLst>
+                                      </p:cBhvr>
+                                      <p:to>
+                                        <p:strVal val="visible"/>
+                                      </p:to>
+                                    </p:set>
+                                  </p:childTnLst>
+                                </p:cTn>
+                              </p:par>
+                            </p:childTnLst>
+                          </p:cTn>
+                        </p:par>
+                      </p:childTnLst>
+                    </p:cTn>
+                  </p:par>
+                  <p:par>
+                    <p:cTn id="15" fill="hold">
+                      <p:stCondLst>
+                        <p:cond delay="indefinite"/>
+                      </p:stCondLst>
+                      <p:childTnLst>
+                        <p:par>
+                          <p:cTn id="16" fill="hold">
+                            <p:stCondLst>
+                              <p:cond delay="0"/>
+                            </p:stCondLst>
+                            <p:childTnLst>
+                              <p:par>
+                                <p:cTn id="17" presetID="1" presetClass="entr" presetSubtype="0" fill="hold" nodeType="clickEffect">
+                                  <p:stCondLst>
+                                    <p:cond delay="0"/>
+                                  </p:stCondLst>
+                                  <p:childTnLst>
+                                    <p:set>
+                                      <p:cBhvr>
+                                        <p:cTn id="18" dur="1" fill="hold">
+                                          <p:stCondLst>
+                                            <p:cond delay="0"/>
+                                          </p:stCondLst>
+                                        </p:cTn>
+                                        <p:tgtEl>
+                                          <p:spTgt spid="8"/>
+                                        </p:tgtEl>
+                                        <p:attrNameLst>
+                                          <p:attrName>style.visibility</p:attrName>
+                                        </p:attrNameLst>
+                                      </p:cBhvr>
+                                      <p:to>
+                                        <p:strVal val="visible"/>
+                                      </p:to>
+                                    </p:set>
+                                  </p:childTnLst>
+                                </p:cTn>
+                              </p:par>
+                            </p:childTnLst>
+                          </p:cTn>
+                        </p:par>
+                      </p:childTnLst>
+                    </p:cTn>
+                  </p:par>
+                </p:childTnLst>
+              </p:cTn>
+              <p:prevCondLst>
+                <p:cond evt="onPrev" delay="0">
+                  <p:tgtEl>
+                    <p:sldTgt/>
+                  </p:tgtEl>
+                </p:cond>
+              </p:prevCondLst>
+              <p:nextCondLst>
+                <p:cond evt="onNext" delay="0">
+                  <p:tgtEl>
+                    <p:sldTgt/>
+                  </p:tgtEl>
+                </p:cond>
+              </p:nextCondLst>
+            </p:seq>
+          </p:childTnLst>
+        </p:cTn>
+      </p:par>
+    </p:tnLst>
+  </p:timing>
 </p:sld>
 </file>
 

</xml_diff>

<commit_message>
Update animated gif to use VS Code 0.10.8
</commit_message>
<xml_diff>
--- a/Getting Started with ASP.NET Core 1.0 in VS Code - SFLCC.pptx
+++ b/Getting Started with ASP.NET Core 1.0 in VS Code - SFLCC.pptx
@@ -4314,8 +4314,8 @@
     <dgm:cxn modelId="{BE4D6236-A3E0-4057-9A2C-42D4A877D36E}" type="presOf" srcId="{8A45336E-5408-4D62-9EF1-08F486318BFF}" destId="{57863176-DB12-4225-A941-96CD5A6A82CC}" srcOrd="0" destOrd="0" presId="urn:microsoft.com/office/officeart/2005/8/layout/hChevron3"/>
     <dgm:cxn modelId="{1C1D83E0-DB0F-4A9B-A04D-A392BE0DD04C}" type="presOf" srcId="{AFF4B1FA-9A6B-43F7-B8CB-4C91CF1DDBE0}" destId="{6E8A8CB1-126C-4A8D-95E5-7D016B2029F2}" srcOrd="0" destOrd="0" presId="urn:microsoft.com/office/officeart/2005/8/layout/hChevron3"/>
     <dgm:cxn modelId="{DCD6A15A-B19C-4616-9ED1-26DCB2C43285}" srcId="{8A45336E-5408-4D62-9EF1-08F486318BFF}" destId="{8BEAE8CB-A7D8-45E4-BC87-9A18CED7E7CE}" srcOrd="0" destOrd="0" parTransId="{E16CB781-B1BB-4E9E-9C86-96F481B14BFA}" sibTransId="{48747E02-CA4B-4EA6-9401-0110B1D75C1C}"/>
+    <dgm:cxn modelId="{94C1853C-02E7-4C27-A29A-FC84C3187A32}" srcId="{8A45336E-5408-4D62-9EF1-08F486318BFF}" destId="{A917A1F9-17B7-4B88-9FAD-AF41E2910DBD}" srcOrd="3" destOrd="0" parTransId="{FEFD055D-8110-41D2-83FF-BB68E3C24098}" sibTransId="{A2ABC1CA-D4DB-4C0F-83FD-5DAA1C23AAEA}"/>
     <dgm:cxn modelId="{C70A686A-14B0-4CBB-AA56-4BFD6C2C7B89}" type="presOf" srcId="{766D0765-5B45-432B-826E-9A27A845A5A7}" destId="{F0AA213A-C7FF-4409-B147-991ABB26AAB2}" srcOrd="0" destOrd="0" presId="urn:microsoft.com/office/officeart/2005/8/layout/hChevron3"/>
-    <dgm:cxn modelId="{94C1853C-02E7-4C27-A29A-FC84C3187A32}" srcId="{8A45336E-5408-4D62-9EF1-08F486318BFF}" destId="{A917A1F9-17B7-4B88-9FAD-AF41E2910DBD}" srcOrd="3" destOrd="0" parTransId="{FEFD055D-8110-41D2-83FF-BB68E3C24098}" sibTransId="{A2ABC1CA-D4DB-4C0F-83FD-5DAA1C23AAEA}"/>
     <dgm:cxn modelId="{9CC9A370-689E-4C6F-B870-78ECD0BA24BE}" type="presOf" srcId="{A917A1F9-17B7-4B88-9FAD-AF41E2910DBD}" destId="{6655FB27-B27C-4A7B-B55D-EF2C08C6B65E}" srcOrd="0" destOrd="0" presId="urn:microsoft.com/office/officeart/2005/8/layout/hChevron3"/>
     <dgm:cxn modelId="{128E7390-4262-4560-BB4D-C552847BC8AE}" type="presOf" srcId="{8BEAE8CB-A7D8-45E4-BC87-9A18CED7E7CE}" destId="{54F0ADA0-D0DF-4213-9ACF-ED13172B50C7}" srcOrd="0" destOrd="0" presId="urn:microsoft.com/office/officeart/2005/8/layout/hChevron3"/>
     <dgm:cxn modelId="{CB4508D6-DCB1-41A9-9031-BAB1F7FDDC1E}" type="presParOf" srcId="{57863176-DB12-4225-A941-96CD5A6A82CC}" destId="{54F0ADA0-D0DF-4213-9ACF-ED13172B50C7}" srcOrd="0" destOrd="0" presId="urn:microsoft.com/office/officeart/2005/8/layout/hChevron3"/>
@@ -19078,8 +19078,8 @@
           </a:p>
         </p:txBody>
       </p:sp>
-      <mc:AlternateContent xmlns:mc="http://schemas.openxmlformats.org/markup-compatibility/2006">
-        <mc:Choice xmlns:we="http://schemas.microsoft.com/office/webextensions/webextension/2010/11" xmlns:pca="http://schemas.microsoft.com/office/powerpoint/2013/contentapp" Requires="we pca">
+      <mc:AlternateContent xmlns:mc="http://schemas.openxmlformats.org/markup-compatibility/2006" xmlns:we="http://schemas.microsoft.com/office/webextensions/webextension/2010/11" xmlns:pca="http://schemas.microsoft.com/office/powerpoint/2013/contentapp">
+        <mc:Choice Requires="we pca">
           <p:graphicFrame>
             <p:nvGraphicFramePr>
               <p:cNvPr id="5" name="Add-in 4" title="Code Presenter Pro"/>
@@ -19105,7 +19105,7 @@
             </a:graphic>
           </p:graphicFrame>
         </mc:Choice>
-        <mc:Fallback>
+        <mc:Fallback xmlns="">
           <p:pic>
             <p:nvPicPr>
               <p:cNvPr id="5" name="Add-in 4" title="Code Presenter Pro"/>
@@ -20847,7 +20847,7 @@
       </p:sp>
       <p:pic>
         <p:nvPicPr>
-          <p:cNvPr id="2" name="Picture 1"/>
+          <p:cNvPr id="3" name="Picture 2"/>
           <p:cNvPicPr>
             <a:picLocks noChangeAspect="1"/>
           </p:cNvPicPr>
@@ -25297,8 +25297,8 @@
           </a:prstGeom>
         </p:spPr>
       </p:pic>
-      <mc:AlternateContent xmlns:mc="http://schemas.openxmlformats.org/markup-compatibility/2006">
-        <mc:Choice xmlns:we="http://schemas.microsoft.com/office/webextensions/webextension/2010/11" xmlns:pca="http://schemas.microsoft.com/office/powerpoint/2013/contentapp" Requires="we pca">
+      <mc:AlternateContent xmlns:mc="http://schemas.openxmlformats.org/markup-compatibility/2006" xmlns:we="http://schemas.microsoft.com/office/webextensions/webextension/2010/11" xmlns:pca="http://schemas.microsoft.com/office/powerpoint/2013/contentapp">
+        <mc:Choice Requires="we pca">
           <p:graphicFrame>
             <p:nvGraphicFramePr>
               <p:cNvPr id="7" name="Add-in 6" title="Code Presenter Pro"/>
@@ -25324,7 +25324,7 @@
             </a:graphic>
           </p:graphicFrame>
         </mc:Choice>
-        <mc:Fallback>
+        <mc:Fallback xmlns="">
           <p:pic>
             <p:nvPicPr>
               <p:cNvPr id="7" name="Add-in 6" title="Code Presenter Pro"/>

</xml_diff>

<commit_message>
Update DN* tooling install link
</commit_message>
<xml_diff>
--- a/Getting Started with ASP.NET Core 1.0 in VS Code - SFLCC.pptx
+++ b/Getting Started with ASP.NET Core 1.0 in VS Code - SFLCC.pptx
@@ -4314,8 +4314,8 @@
     <dgm:cxn modelId="{BE4D6236-A3E0-4057-9A2C-42D4A877D36E}" type="presOf" srcId="{8A45336E-5408-4D62-9EF1-08F486318BFF}" destId="{57863176-DB12-4225-A941-96CD5A6A82CC}" srcOrd="0" destOrd="0" presId="urn:microsoft.com/office/officeart/2005/8/layout/hChevron3"/>
     <dgm:cxn modelId="{1C1D83E0-DB0F-4A9B-A04D-A392BE0DD04C}" type="presOf" srcId="{AFF4B1FA-9A6B-43F7-B8CB-4C91CF1DDBE0}" destId="{6E8A8CB1-126C-4A8D-95E5-7D016B2029F2}" srcOrd="0" destOrd="0" presId="urn:microsoft.com/office/officeart/2005/8/layout/hChevron3"/>
     <dgm:cxn modelId="{DCD6A15A-B19C-4616-9ED1-26DCB2C43285}" srcId="{8A45336E-5408-4D62-9EF1-08F486318BFF}" destId="{8BEAE8CB-A7D8-45E4-BC87-9A18CED7E7CE}" srcOrd="0" destOrd="0" parTransId="{E16CB781-B1BB-4E9E-9C86-96F481B14BFA}" sibTransId="{48747E02-CA4B-4EA6-9401-0110B1D75C1C}"/>
+    <dgm:cxn modelId="{C70A686A-14B0-4CBB-AA56-4BFD6C2C7B89}" type="presOf" srcId="{766D0765-5B45-432B-826E-9A27A845A5A7}" destId="{F0AA213A-C7FF-4409-B147-991ABB26AAB2}" srcOrd="0" destOrd="0" presId="urn:microsoft.com/office/officeart/2005/8/layout/hChevron3"/>
     <dgm:cxn modelId="{94C1853C-02E7-4C27-A29A-FC84C3187A32}" srcId="{8A45336E-5408-4D62-9EF1-08F486318BFF}" destId="{A917A1F9-17B7-4B88-9FAD-AF41E2910DBD}" srcOrd="3" destOrd="0" parTransId="{FEFD055D-8110-41D2-83FF-BB68E3C24098}" sibTransId="{A2ABC1CA-D4DB-4C0F-83FD-5DAA1C23AAEA}"/>
-    <dgm:cxn modelId="{C70A686A-14B0-4CBB-AA56-4BFD6C2C7B89}" type="presOf" srcId="{766D0765-5B45-432B-826E-9A27A845A5A7}" destId="{F0AA213A-C7FF-4409-B147-991ABB26AAB2}" srcOrd="0" destOrd="0" presId="urn:microsoft.com/office/officeart/2005/8/layout/hChevron3"/>
     <dgm:cxn modelId="{9CC9A370-689E-4C6F-B870-78ECD0BA24BE}" type="presOf" srcId="{A917A1F9-17B7-4B88-9FAD-AF41E2910DBD}" destId="{6655FB27-B27C-4A7B-B55D-EF2C08C6B65E}" srcOrd="0" destOrd="0" presId="urn:microsoft.com/office/officeart/2005/8/layout/hChevron3"/>
     <dgm:cxn modelId="{128E7390-4262-4560-BB4D-C552847BC8AE}" type="presOf" srcId="{8BEAE8CB-A7D8-45E4-BC87-9A18CED7E7CE}" destId="{54F0ADA0-D0DF-4213-9ACF-ED13172B50C7}" srcOrd="0" destOrd="0" presId="urn:microsoft.com/office/officeart/2005/8/layout/hChevron3"/>
     <dgm:cxn modelId="{CB4508D6-DCB1-41A9-9031-BAB1F7FDDC1E}" type="presParOf" srcId="{57863176-DB12-4225-A941-96CD5A6A82CC}" destId="{54F0ADA0-D0DF-4213-9ACF-ED13172B50C7}" srcOrd="0" destOrd="0" presId="urn:microsoft.com/office/officeart/2005/8/layout/hChevron3"/>
@@ -12813,7 +12813,7 @@
           <a:p>
             <a:fld id="{DFB3EBE0-77A0-4731-B691-855A17DBDF42}" type="datetimeFigureOut">
               <a:rPr lang="en-US" smtClean="0"/>
-              <a:t>2/8/2016</a:t>
+              <a:t>2/9/2016</a:t>
             </a:fld>
             <a:endParaRPr lang="en-US" dirty="0"/>
           </a:p>
@@ -13910,7 +13910,7 @@
           <a:p>
             <a:fld id="{184BFEAB-C714-4D5C-A87B-1F5F147C2568}" type="datetime1">
               <a:rPr lang="en-US" smtClean="0"/>
-              <a:t>2/8/2016</a:t>
+              <a:t>2/9/2016</a:t>
             </a:fld>
             <a:endParaRPr lang="en-US" dirty="0"/>
           </a:p>
@@ -14161,7 +14161,7 @@
           <a:p>
             <a:fld id="{9A92CE8C-71B3-4605-911C-C2357D36982A}" type="datetime1">
               <a:rPr lang="en-US" smtClean="0"/>
-              <a:t>2/8/2016</a:t>
+              <a:t>2/9/2016</a:t>
             </a:fld>
             <a:endParaRPr lang="en-US" dirty="0"/>
           </a:p>
@@ -14475,7 +14475,7 @@
           <a:p>
             <a:fld id="{015B728D-6EF1-44C1-BE74-A3569BAB8718}" type="datetime1">
               <a:rPr lang="en-US" smtClean="0"/>
-              <a:t>2/8/2016</a:t>
+              <a:t>2/9/2016</a:t>
             </a:fld>
             <a:endParaRPr lang="en-US" dirty="0"/>
           </a:p>
@@ -14808,7 +14808,7 @@
           <a:p>
             <a:fld id="{60F7EA30-F0F4-4B8A-BDF6-A084B0E8ACEE}" type="datetime1">
               <a:rPr lang="en-US" smtClean="0"/>
-              <a:t>2/8/2016</a:t>
+              <a:t>2/9/2016</a:t>
             </a:fld>
             <a:endParaRPr lang="en-US" dirty="0"/>
           </a:p>
@@ -15122,7 +15122,7 @@
           <a:p>
             <a:fld id="{F0EF549A-B982-48AE-849E-ED681B3F14FB}" type="datetime1">
               <a:rPr lang="en-US" smtClean="0"/>
-              <a:t>2/8/2016</a:t>
+              <a:t>2/9/2016</a:t>
             </a:fld>
             <a:endParaRPr lang="en-US" dirty="0"/>
           </a:p>
@@ -15515,7 +15515,7 @@
           <a:p>
             <a:fld id="{4A5FF696-44D7-45D2-8329-B53AF65ECE1F}" type="datetime1">
               <a:rPr lang="en-US" smtClean="0"/>
-              <a:t>2/8/2016</a:t>
+              <a:t>2/9/2016</a:t>
             </a:fld>
             <a:endParaRPr lang="en-US" dirty="0"/>
           </a:p>
@@ -15685,7 +15685,7 @@
           <a:p>
             <a:fld id="{D4E746AE-4EBB-48DA-A9A3-3CF4B615F483}" type="datetime1">
               <a:rPr lang="en-US" smtClean="0"/>
-              <a:t>2/8/2016</a:t>
+              <a:t>2/9/2016</a:t>
             </a:fld>
             <a:endParaRPr lang="en-US" dirty="0"/>
           </a:p>
@@ -15865,7 +15865,7 @@
           <a:p>
             <a:fld id="{5B1FEA50-B64E-45AF-A77E-1C43A8E7D5C1}" type="datetime1">
               <a:rPr lang="en-US" smtClean="0"/>
-              <a:t>2/8/2016</a:t>
+              <a:t>2/9/2016</a:t>
             </a:fld>
             <a:endParaRPr lang="en-US" dirty="0"/>
           </a:p>
@@ -16035,7 +16035,7 @@
           <a:p>
             <a:fld id="{5EE2A00C-C0A5-41E4-A254-0933BFC59600}" type="datetime1">
               <a:rPr lang="en-US" smtClean="0"/>
-              <a:t>2/8/2016</a:t>
+              <a:t>2/9/2016</a:t>
             </a:fld>
             <a:endParaRPr lang="en-US" dirty="0"/>
           </a:p>
@@ -16282,7 +16282,7 @@
           <a:p>
             <a:fld id="{C0C43579-370D-44CE-9989-325065EBA03B}" type="datetime1">
               <a:rPr lang="en-US" smtClean="0"/>
-              <a:t>2/8/2016</a:t>
+              <a:t>2/9/2016</a:t>
             </a:fld>
             <a:endParaRPr lang="en-US" dirty="0"/>
           </a:p>
@@ -16514,7 +16514,7 @@
           <a:p>
             <a:fld id="{29D814BD-9B18-4EA5-94F4-F1600C017603}" type="datetime1">
               <a:rPr lang="en-US" smtClean="0"/>
-              <a:t>2/8/2016</a:t>
+              <a:t>2/9/2016</a:t>
             </a:fld>
             <a:endParaRPr lang="en-US" dirty="0"/>
           </a:p>
@@ -16888,7 +16888,7 @@
           <a:p>
             <a:fld id="{CE8DCA57-17F0-4F45-8BC0-620199D29CBA}" type="datetime1">
               <a:rPr lang="en-US" smtClean="0"/>
-              <a:t>2/8/2016</a:t>
+              <a:t>2/9/2016</a:t>
             </a:fld>
             <a:endParaRPr lang="en-US" dirty="0"/>
           </a:p>
@@ -17011,7 +17011,7 @@
           <a:p>
             <a:fld id="{5507D437-E8BB-44EC-A888-137BD165F5EF}" type="datetime1">
               <a:rPr lang="en-US" smtClean="0"/>
-              <a:t>2/8/2016</a:t>
+              <a:t>2/9/2016</a:t>
             </a:fld>
             <a:endParaRPr lang="en-US" dirty="0"/>
           </a:p>
@@ -17106,7 +17106,7 @@
           <a:p>
             <a:fld id="{CBF48491-12CB-4315-A294-ECCB7042AE60}" type="datetime1">
               <a:rPr lang="en-US" smtClean="0"/>
-              <a:t>2/8/2016</a:t>
+              <a:t>2/9/2016</a:t>
             </a:fld>
             <a:endParaRPr lang="en-US" dirty="0"/>
           </a:p>
@@ -17361,7 +17361,7 @@
           <a:p>
             <a:fld id="{71547693-6F8C-49B3-B3CF-B2F3832F2060}" type="datetime1">
               <a:rPr lang="en-US" smtClean="0"/>
-              <a:t>2/8/2016</a:t>
+              <a:t>2/9/2016</a:t>
             </a:fld>
             <a:endParaRPr lang="en-US" dirty="0"/>
           </a:p>
@@ -17666,7 +17666,7 @@
           <a:p>
             <a:fld id="{891130D9-17AA-473C-8916-496E81563AE5}" type="datetime1">
               <a:rPr lang="en-US" smtClean="0"/>
-              <a:t>2/8/2016</a:t>
+              <a:t>2/9/2016</a:t>
             </a:fld>
             <a:endParaRPr lang="en-US" dirty="0"/>
           </a:p>
@@ -18368,7 +18368,7 @@
           <a:p>
             <a:fld id="{D84A2DE9-5A38-4CE7-AE12-F8EA769E5C95}" type="datetime1">
               <a:rPr lang="en-US" smtClean="0"/>
-              <a:t>2/8/2016</a:t>
+              <a:t>2/9/2016</a:t>
             </a:fld>
             <a:endParaRPr lang="en-US" dirty="0"/>
           </a:p>
@@ -19078,8 +19078,8 @@
           </a:p>
         </p:txBody>
       </p:sp>
-      <mc:AlternateContent xmlns:mc="http://schemas.openxmlformats.org/markup-compatibility/2006" xmlns:we="http://schemas.microsoft.com/office/webextensions/webextension/2010/11" xmlns:pca="http://schemas.microsoft.com/office/powerpoint/2013/contentapp">
-        <mc:Choice Requires="we pca">
+      <mc:AlternateContent xmlns:mc="http://schemas.openxmlformats.org/markup-compatibility/2006">
+        <mc:Choice xmlns:we="http://schemas.microsoft.com/office/webextensions/webextension/2010/11" xmlns:pca="http://schemas.microsoft.com/office/powerpoint/2013/contentapp" Requires="we pca">
           <p:graphicFrame>
             <p:nvGraphicFramePr>
               <p:cNvPr id="5" name="Add-in 4" title="Code Presenter Pro"/>
@@ -19105,7 +19105,7 @@
             </a:graphic>
           </p:graphicFrame>
         </mc:Choice>
-        <mc:Fallback xmlns="">
+        <mc:Fallback>
           <p:pic>
             <p:nvPicPr>
               <p:cNvPr id="5" name="Add-in 4" title="Code Presenter Pro"/>
@@ -21276,13 +21276,17 @@
           <a:p>
             <a:r>
               <a:rPr lang="en-US" sz="2000" dirty="0" smtClean="0"/>
-              <a:t>Installation of DN* Tooling: </a:t>
+              <a:t>Installation of DN* Tooling</a:t>
+            </a:r>
+            <a:r>
+              <a:rPr lang="en-US" sz="2000" dirty="0"/>
+              <a:t>: </a:t>
             </a:r>
             <a:r>
               <a:rPr lang="en-US" sz="2000" dirty="0">
                 <a:hlinkClick r:id="rId2"/>
               </a:rPr>
-              <a:t>http://bit.ly/1YaRWJY</a:t>
+              <a:t>https://get.asp.net/</a:t>
             </a:r>
             <a:endParaRPr lang="en-US" sz="2000" dirty="0"/>
           </a:p>
@@ -25297,8 +25301,8 @@
           </a:prstGeom>
         </p:spPr>
       </p:pic>
-      <mc:AlternateContent xmlns:mc="http://schemas.openxmlformats.org/markup-compatibility/2006" xmlns:we="http://schemas.microsoft.com/office/webextensions/webextension/2010/11" xmlns:pca="http://schemas.microsoft.com/office/powerpoint/2013/contentapp">
-        <mc:Choice Requires="we pca">
+      <mc:AlternateContent xmlns:mc="http://schemas.openxmlformats.org/markup-compatibility/2006">
+        <mc:Choice xmlns:we="http://schemas.microsoft.com/office/webextensions/webextension/2010/11" xmlns:pca="http://schemas.microsoft.com/office/powerpoint/2013/contentapp" Requires="we pca">
           <p:graphicFrame>
             <p:nvGraphicFramePr>
               <p:cNvPr id="7" name="Add-in 6" title="Code Presenter Pro"/>
@@ -25324,7 +25328,7 @@
             </a:graphic>
           </p:graphicFrame>
         </mc:Choice>
-        <mc:Fallback xmlns="">
+        <mc:Fallback>
           <p:pic>
             <p:nvPicPr>
               <p:cNvPr id="7" name="Add-in 6" title="Code Presenter Pro"/>

</xml_diff>

<commit_message>
Minor tweaks to SFLCC slide deck
</commit_message>
<xml_diff>
--- a/Getting Started with ASP.NET Core 1.0 in VS Code - SFLCC.pptx
+++ b/Getting Started with ASP.NET Core 1.0 in VS Code - SFLCC.pptx
@@ -896,18 +896,18 @@
 </file>
 
 <file path=ppt/diagrams/colors2.xml><?xml version="1.0" encoding="utf-8"?>
-<dgm:colorsDef xmlns:dgm="http://schemas.openxmlformats.org/drawingml/2006/diagram" xmlns:a="http://schemas.openxmlformats.org/drawingml/2006/main" uniqueId="urn:microsoft.com/office/officeart/2005/8/colors/accent1_2">
+<dgm:colorsDef xmlns:dgm="http://schemas.openxmlformats.org/drawingml/2006/diagram" xmlns:a="http://schemas.openxmlformats.org/drawingml/2006/main" uniqueId="urn:microsoft.com/office/officeart/2005/8/colors/accent0_3">
   <dgm:title val=""/>
   <dgm:desc val=""/>
   <dgm:catLst>
-    <dgm:cat type="accent1" pri="11200"/>
+    <dgm:cat type="mainScheme" pri="10300"/>
   </dgm:catLst>
   <dgm:styleLbl name="node0">
     <dgm:fillClrLst meth="repeat">
-      <a:schemeClr val="accent1"/>
+      <a:schemeClr val="dk2"/>
     </dgm:fillClrLst>
     <dgm:linClrLst meth="repeat">
-      <a:schemeClr val="lt1"/>
+      <a:schemeClr val="lt2"/>
     </dgm:linClrLst>
     <dgm:effectClrLst/>
     <dgm:txLinClrLst/>
@@ -916,10 +916,10 @@
   </dgm:styleLbl>
   <dgm:styleLbl name="alignNode1">
     <dgm:fillClrLst meth="repeat">
-      <a:schemeClr val="accent1"/>
+      <a:schemeClr val="dk2"/>
     </dgm:fillClrLst>
     <dgm:linClrLst meth="repeat">
-      <a:schemeClr val="accent1"/>
+      <a:schemeClr val="dk2"/>
     </dgm:linClrLst>
     <dgm:effectClrLst/>
     <dgm:txLinClrLst/>
@@ -928,10 +928,10 @@
   </dgm:styleLbl>
   <dgm:styleLbl name="node1">
     <dgm:fillClrLst meth="repeat">
-      <a:schemeClr val="accent1"/>
+      <a:schemeClr val="dk2"/>
     </dgm:fillClrLst>
     <dgm:linClrLst meth="repeat">
-      <a:schemeClr val="lt1"/>
+      <a:schemeClr val="lt2"/>
     </dgm:linClrLst>
     <dgm:effectClrLst/>
     <dgm:txLinClrLst/>
@@ -940,10 +940,10 @@
   </dgm:styleLbl>
   <dgm:styleLbl name="lnNode1">
     <dgm:fillClrLst meth="repeat">
-      <a:schemeClr val="accent1"/>
+      <a:schemeClr val="dk2"/>
     </dgm:fillClrLst>
     <dgm:linClrLst meth="repeat">
-      <a:schemeClr val="lt1"/>
+      <a:schemeClr val="lt2"/>
     </dgm:linClrLst>
     <dgm:effectClrLst/>
     <dgm:txLinClrLst/>
@@ -952,12 +952,12 @@
   </dgm:styleLbl>
   <dgm:styleLbl name="vennNode1">
     <dgm:fillClrLst meth="repeat">
-      <a:schemeClr val="accent1">
+      <a:schemeClr val="dk2">
         <a:alpha val="50000"/>
       </a:schemeClr>
     </dgm:fillClrLst>
     <dgm:linClrLst meth="repeat">
-      <a:schemeClr val="lt1"/>
+      <a:schemeClr val="lt2"/>
     </dgm:linClrLst>
     <dgm:effectClrLst/>
     <dgm:txLinClrLst/>
@@ -966,10 +966,10 @@
   </dgm:styleLbl>
   <dgm:styleLbl name="node2">
     <dgm:fillClrLst meth="repeat">
-      <a:schemeClr val="accent1"/>
+      <a:schemeClr val="dk2"/>
     </dgm:fillClrLst>
     <dgm:linClrLst meth="repeat">
-      <a:schemeClr val="lt1"/>
+      <a:schemeClr val="lt2"/>
     </dgm:linClrLst>
     <dgm:effectClrLst/>
     <dgm:txLinClrLst/>
@@ -978,10 +978,10 @@
   </dgm:styleLbl>
   <dgm:styleLbl name="node3">
     <dgm:fillClrLst meth="repeat">
-      <a:schemeClr val="accent1"/>
+      <a:schemeClr val="dk2"/>
     </dgm:fillClrLst>
     <dgm:linClrLst meth="repeat">
-      <a:schemeClr val="lt1"/>
+      <a:schemeClr val="lt2"/>
     </dgm:linClrLst>
     <dgm:effectClrLst/>
     <dgm:txLinClrLst/>
@@ -990,10 +990,10 @@
   </dgm:styleLbl>
   <dgm:styleLbl name="node4">
     <dgm:fillClrLst meth="repeat">
-      <a:schemeClr val="accent1"/>
+      <a:schemeClr val="dk2"/>
     </dgm:fillClrLst>
     <dgm:linClrLst meth="repeat">
-      <a:schemeClr val="lt1"/>
+      <a:schemeClr val="lt2"/>
     </dgm:linClrLst>
     <dgm:effectClrLst/>
     <dgm:txLinClrLst/>
@@ -1002,60 +1002,64 @@
   </dgm:styleLbl>
   <dgm:styleLbl name="fgImgPlace1">
     <dgm:fillClrLst meth="repeat">
-      <a:schemeClr val="accent1">
+      <a:schemeClr val="dk2">
         <a:tint val="50000"/>
       </a:schemeClr>
     </dgm:fillClrLst>
     <dgm:linClrLst meth="repeat">
-      <a:schemeClr val="lt1"/>
+      <a:schemeClr val="lt2"/>
     </dgm:linClrLst>
     <dgm:effectClrLst/>
     <dgm:txLinClrLst/>
     <dgm:txFillClrLst meth="repeat">
-      <a:schemeClr val="lt1"/>
+      <a:schemeClr val="lt2"/>
     </dgm:txFillClrLst>
     <dgm:txEffectClrLst/>
   </dgm:styleLbl>
   <dgm:styleLbl name="alignImgPlace1">
     <dgm:fillClrLst meth="repeat">
-      <a:schemeClr val="accent1">
+      <a:schemeClr val="dk2">
         <a:tint val="50000"/>
       </a:schemeClr>
     </dgm:fillClrLst>
     <dgm:linClrLst meth="repeat">
-      <a:schemeClr val="lt1"/>
+      <a:schemeClr val="dk2">
+        <a:shade val="80000"/>
+      </a:schemeClr>
     </dgm:linClrLst>
     <dgm:effectClrLst/>
     <dgm:txLinClrLst/>
     <dgm:txFillClrLst meth="repeat">
-      <a:schemeClr val="lt1"/>
+      <a:schemeClr val="lt2"/>
     </dgm:txFillClrLst>
     <dgm:txEffectClrLst/>
   </dgm:styleLbl>
   <dgm:styleLbl name="bgImgPlace1">
     <dgm:fillClrLst meth="repeat">
-      <a:schemeClr val="accent1">
+      <a:schemeClr val="dk2">
         <a:tint val="50000"/>
       </a:schemeClr>
     </dgm:fillClrLst>
     <dgm:linClrLst meth="repeat">
-      <a:schemeClr val="lt1"/>
+      <a:schemeClr val="dk2">
+        <a:shade val="80000"/>
+      </a:schemeClr>
     </dgm:linClrLst>
     <dgm:effectClrLst/>
     <dgm:txLinClrLst/>
     <dgm:txFillClrLst meth="repeat">
-      <a:schemeClr val="lt1"/>
+      <a:schemeClr val="lt2"/>
     </dgm:txFillClrLst>
     <dgm:txEffectClrLst/>
   </dgm:styleLbl>
   <dgm:styleLbl name="sibTrans2D1">
     <dgm:fillClrLst meth="repeat">
-      <a:schemeClr val="accent1">
+      <a:schemeClr val="dk2">
         <a:tint val="60000"/>
       </a:schemeClr>
     </dgm:fillClrLst>
     <dgm:linClrLst meth="repeat">
-      <a:schemeClr val="accent1">
+      <a:schemeClr val="dk2">
         <a:tint val="60000"/>
       </a:schemeClr>
     </dgm:linClrLst>
@@ -1066,12 +1070,12 @@
   </dgm:styleLbl>
   <dgm:styleLbl name="fgSibTrans2D1">
     <dgm:fillClrLst meth="repeat">
-      <a:schemeClr val="accent1">
+      <a:schemeClr val="dk2">
         <a:tint val="60000"/>
       </a:schemeClr>
     </dgm:fillClrLst>
     <dgm:linClrLst meth="repeat">
-      <a:schemeClr val="accent1">
+      <a:schemeClr val="dk2">
         <a:tint val="60000"/>
       </a:schemeClr>
     </dgm:linClrLst>
@@ -1082,12 +1086,12 @@
   </dgm:styleLbl>
   <dgm:styleLbl name="bgSibTrans2D1">
     <dgm:fillClrLst meth="repeat">
-      <a:schemeClr val="accent1">
+      <a:schemeClr val="dk2">
         <a:tint val="60000"/>
       </a:schemeClr>
     </dgm:fillClrLst>
     <dgm:linClrLst meth="repeat">
-      <a:schemeClr val="accent1">
+      <a:schemeClr val="dk2">
         <a:tint val="60000"/>
       </a:schemeClr>
     </dgm:linClrLst>
@@ -1098,40 +1102,40 @@
   </dgm:styleLbl>
   <dgm:styleLbl name="sibTrans1D1">
     <dgm:fillClrLst meth="repeat">
-      <a:schemeClr val="accent1"/>
+      <a:schemeClr val="dk2"/>
     </dgm:fillClrLst>
     <dgm:linClrLst meth="repeat">
-      <a:schemeClr val="accent1"/>
+      <a:schemeClr val="dk2"/>
     </dgm:linClrLst>
     <dgm:effectClrLst/>
     <dgm:txLinClrLst/>
     <dgm:txFillClrLst meth="repeat">
-      <a:schemeClr val="tx1"/>
+      <a:schemeClr val="lt2"/>
     </dgm:txFillClrLst>
     <dgm:txEffectClrLst/>
   </dgm:styleLbl>
   <dgm:styleLbl name="callout">
     <dgm:fillClrLst meth="repeat">
-      <a:schemeClr val="accent1"/>
+      <a:schemeClr val="dk2"/>
     </dgm:fillClrLst>
     <dgm:linClrLst meth="repeat">
-      <a:schemeClr val="accent1">
+      <a:schemeClr val="dk2">
         <a:tint val="50000"/>
       </a:schemeClr>
     </dgm:linClrLst>
     <dgm:effectClrLst/>
     <dgm:txLinClrLst/>
     <dgm:txFillClrLst meth="repeat">
-      <a:schemeClr val="tx1"/>
+      <a:schemeClr val="lt2"/>
     </dgm:txFillClrLst>
     <dgm:txEffectClrLst/>
   </dgm:styleLbl>
   <dgm:styleLbl name="asst0">
     <dgm:fillClrLst meth="repeat">
-      <a:schemeClr val="accent1"/>
+      <a:schemeClr val="dk2"/>
     </dgm:fillClrLst>
     <dgm:linClrLst meth="repeat">
-      <a:schemeClr val="lt1"/>
+      <a:schemeClr val="lt2"/>
     </dgm:linClrLst>
     <dgm:effectClrLst/>
     <dgm:txLinClrLst/>
@@ -1140,10 +1144,10 @@
   </dgm:styleLbl>
   <dgm:styleLbl name="asst1">
     <dgm:fillClrLst meth="repeat">
-      <a:schemeClr val="accent1"/>
+      <a:schemeClr val="dk2"/>
     </dgm:fillClrLst>
     <dgm:linClrLst meth="repeat">
-      <a:schemeClr val="lt1"/>
+      <a:schemeClr val="lt2"/>
     </dgm:linClrLst>
     <dgm:effectClrLst/>
     <dgm:txLinClrLst/>
@@ -1152,10 +1156,10 @@
   </dgm:styleLbl>
   <dgm:styleLbl name="asst2">
     <dgm:fillClrLst meth="repeat">
-      <a:schemeClr val="accent1"/>
+      <a:schemeClr val="dk2"/>
     </dgm:fillClrLst>
     <dgm:linClrLst meth="repeat">
-      <a:schemeClr val="lt1"/>
+      <a:schemeClr val="lt2"/>
     </dgm:linClrLst>
     <dgm:effectClrLst/>
     <dgm:txLinClrLst/>
@@ -1164,10 +1168,10 @@
   </dgm:styleLbl>
   <dgm:styleLbl name="asst3">
     <dgm:fillClrLst meth="repeat">
-      <a:schemeClr val="accent1"/>
+      <a:schemeClr val="dk2"/>
     </dgm:fillClrLst>
     <dgm:linClrLst meth="repeat">
-      <a:schemeClr val="lt1"/>
+      <a:schemeClr val="lt2"/>
     </dgm:linClrLst>
     <dgm:effectClrLst/>
     <dgm:txLinClrLst/>
@@ -1176,10 +1180,10 @@
   </dgm:styleLbl>
   <dgm:styleLbl name="asst4">
     <dgm:fillClrLst meth="repeat">
-      <a:schemeClr val="accent1"/>
+      <a:schemeClr val="dk2"/>
     </dgm:fillClrLst>
     <dgm:linClrLst meth="repeat">
-      <a:schemeClr val="lt1"/>
+      <a:schemeClr val="lt2"/>
     </dgm:linClrLst>
     <dgm:effectClrLst/>
     <dgm:txLinClrLst/>
@@ -1188,70 +1192,70 @@
   </dgm:styleLbl>
   <dgm:styleLbl name="parChTrans2D1">
     <dgm:fillClrLst meth="repeat">
-      <a:schemeClr val="accent1">
+      <a:schemeClr val="dk2">
         <a:tint val="60000"/>
       </a:schemeClr>
     </dgm:fillClrLst>
     <dgm:linClrLst meth="repeat">
-      <a:schemeClr val="accent1">
+      <a:schemeClr val="dk2">
         <a:tint val="60000"/>
       </a:schemeClr>
     </dgm:linClrLst>
     <dgm:effectClrLst/>
     <dgm:txLinClrLst/>
     <dgm:txFillClrLst meth="repeat">
-      <a:schemeClr val="lt1"/>
+      <a:schemeClr val="lt2"/>
     </dgm:txFillClrLst>
     <dgm:txEffectClrLst/>
   </dgm:styleLbl>
   <dgm:styleLbl name="parChTrans2D2">
     <dgm:fillClrLst meth="repeat">
-      <a:schemeClr val="accent1"/>
+      <a:schemeClr val="dk2"/>
     </dgm:fillClrLst>
     <dgm:linClrLst meth="repeat">
-      <a:schemeClr val="accent1"/>
+      <a:schemeClr val="dk2"/>
     </dgm:linClrLst>
     <dgm:effectClrLst/>
     <dgm:txLinClrLst/>
     <dgm:txFillClrLst meth="repeat">
-      <a:schemeClr val="lt1"/>
+      <a:schemeClr val="lt2"/>
     </dgm:txFillClrLst>
     <dgm:txEffectClrLst/>
   </dgm:styleLbl>
   <dgm:styleLbl name="parChTrans2D3">
     <dgm:fillClrLst meth="repeat">
-      <a:schemeClr val="accent1"/>
+      <a:schemeClr val="dk2"/>
     </dgm:fillClrLst>
     <dgm:linClrLst meth="repeat">
-      <a:schemeClr val="accent1"/>
+      <a:schemeClr val="dk2"/>
     </dgm:linClrLst>
     <dgm:effectClrLst/>
     <dgm:txLinClrLst/>
     <dgm:txFillClrLst meth="repeat">
-      <a:schemeClr val="lt1"/>
+      <a:schemeClr val="lt2"/>
     </dgm:txFillClrLst>
     <dgm:txEffectClrLst/>
   </dgm:styleLbl>
   <dgm:styleLbl name="parChTrans2D4">
     <dgm:fillClrLst meth="repeat">
-      <a:schemeClr val="accent1"/>
+      <a:schemeClr val="dk2"/>
     </dgm:fillClrLst>
     <dgm:linClrLst meth="repeat">
-      <a:schemeClr val="accent1"/>
+      <a:schemeClr val="dk2"/>
     </dgm:linClrLst>
     <dgm:effectClrLst/>
     <dgm:txLinClrLst/>
     <dgm:txFillClrLst meth="repeat">
-      <a:schemeClr val="lt1"/>
+      <a:schemeClr val="lt2"/>
     </dgm:txFillClrLst>
     <dgm:txEffectClrLst/>
   </dgm:styleLbl>
   <dgm:styleLbl name="parChTrans1D1">
     <dgm:fillClrLst meth="repeat">
-      <a:schemeClr val="accent1"/>
+      <a:schemeClr val="dk2"/>
     </dgm:fillClrLst>
     <dgm:linClrLst meth="repeat">
-      <a:schemeClr val="accent1">
+      <a:schemeClr val="dk2">
         <a:shade val="60000"/>
       </a:schemeClr>
     </dgm:linClrLst>
@@ -1264,10 +1268,10 @@
   </dgm:styleLbl>
   <dgm:styleLbl name="parChTrans1D2">
     <dgm:fillClrLst meth="repeat">
-      <a:schemeClr val="accent1"/>
+      <a:schemeClr val="dk2"/>
     </dgm:fillClrLst>
     <dgm:linClrLst meth="repeat">
-      <a:schemeClr val="accent1">
+      <a:schemeClr val="dk2">
         <a:shade val="60000"/>
       </a:schemeClr>
     </dgm:linClrLst>
@@ -1280,10 +1284,10 @@
   </dgm:styleLbl>
   <dgm:styleLbl name="parChTrans1D3">
     <dgm:fillClrLst meth="repeat">
-      <a:schemeClr val="accent1"/>
+      <a:schemeClr val="dk2"/>
     </dgm:fillClrLst>
     <dgm:linClrLst meth="repeat">
-      <a:schemeClr val="accent1">
+      <a:schemeClr val="dk2">
         <a:shade val="80000"/>
       </a:schemeClr>
     </dgm:linClrLst>
@@ -1296,10 +1300,10 @@
   </dgm:styleLbl>
   <dgm:styleLbl name="parChTrans1D4">
     <dgm:fillClrLst meth="repeat">
-      <a:schemeClr val="accent1"/>
+      <a:schemeClr val="dk2"/>
     </dgm:fillClrLst>
     <dgm:linClrLst meth="repeat">
-      <a:schemeClr val="accent1">
+      <a:schemeClr val="dk2">
         <a:shade val="80000"/>
       </a:schemeClr>
     </dgm:linClrLst>
@@ -1312,12 +1316,12 @@
   </dgm:styleLbl>
   <dgm:styleLbl name="fgAcc1">
     <dgm:fillClrLst meth="repeat">
-      <a:schemeClr val="lt1">
+      <a:schemeClr val="lt2">
         <a:alpha val="90000"/>
       </a:schemeClr>
     </dgm:fillClrLst>
     <dgm:linClrLst meth="repeat">
-      <a:schemeClr val="accent1"/>
+      <a:schemeClr val="dk2"/>
     </dgm:linClrLst>
     <dgm:effectClrLst/>
     <dgm:txLinClrLst/>
@@ -1328,12 +1332,12 @@
   </dgm:styleLbl>
   <dgm:styleLbl name="conFgAcc1">
     <dgm:fillClrLst meth="repeat">
-      <a:schemeClr val="lt1">
+      <a:schemeClr val="lt2">
         <a:alpha val="90000"/>
       </a:schemeClr>
     </dgm:fillClrLst>
     <dgm:linClrLst meth="repeat">
-      <a:schemeClr val="accent1"/>
+      <a:schemeClr val="dk2"/>
     </dgm:linClrLst>
     <dgm:effectClrLst/>
     <dgm:txLinClrLst/>
@@ -1344,12 +1348,12 @@
   </dgm:styleLbl>
   <dgm:styleLbl name="alignAcc1">
     <dgm:fillClrLst meth="repeat">
-      <a:schemeClr val="lt1">
+      <a:schemeClr val="lt2">
         <a:alpha val="90000"/>
       </a:schemeClr>
     </dgm:fillClrLst>
     <dgm:linClrLst meth="repeat">
-      <a:schemeClr val="accent1"/>
+      <a:schemeClr val="dk2"/>
     </dgm:linClrLst>
     <dgm:effectClrLst/>
     <dgm:txLinClrLst/>
@@ -1360,12 +1364,12 @@
   </dgm:styleLbl>
   <dgm:styleLbl name="trAlignAcc1">
     <dgm:fillClrLst meth="repeat">
-      <a:schemeClr val="lt1">
+      <a:schemeClr val="lt2">
         <a:alpha val="40000"/>
       </a:schemeClr>
     </dgm:fillClrLst>
     <dgm:linClrLst meth="repeat">
-      <a:schemeClr val="accent1"/>
+      <a:schemeClr val="dk2"/>
     </dgm:linClrLst>
     <dgm:effectClrLst/>
     <dgm:txLinClrLst/>
@@ -1376,12 +1380,12 @@
   </dgm:styleLbl>
   <dgm:styleLbl name="bgAcc1">
     <dgm:fillClrLst meth="repeat">
-      <a:schemeClr val="lt1">
+      <a:schemeClr val="lt2">
         <a:alpha val="90000"/>
       </a:schemeClr>
     </dgm:fillClrLst>
     <dgm:linClrLst meth="repeat">
-      <a:schemeClr val="accent1"/>
+      <a:schemeClr val="dk2"/>
     </dgm:linClrLst>
     <dgm:effectClrLst/>
     <dgm:txLinClrLst/>
@@ -1392,10 +1396,10 @@
   </dgm:styleLbl>
   <dgm:styleLbl name="solidFgAcc1">
     <dgm:fillClrLst meth="repeat">
-      <a:schemeClr val="lt1"/>
+      <a:schemeClr val="lt2"/>
     </dgm:fillClrLst>
     <dgm:linClrLst meth="repeat">
-      <a:schemeClr val="accent1"/>
+      <a:schemeClr val="dk2"/>
     </dgm:linClrLst>
     <dgm:effectClrLst/>
     <dgm:txLinClrLst/>
@@ -1406,10 +1410,10 @@
   </dgm:styleLbl>
   <dgm:styleLbl name="solidAlignAcc1">
     <dgm:fillClrLst meth="repeat">
-      <a:schemeClr val="lt1"/>
+      <a:schemeClr val="lt2"/>
     </dgm:fillClrLst>
     <dgm:linClrLst meth="repeat">
-      <a:schemeClr val="accent1"/>
+      <a:schemeClr val="dk2"/>
     </dgm:linClrLst>
     <dgm:effectClrLst/>
     <dgm:txLinClrLst/>
@@ -1420,10 +1424,10 @@
   </dgm:styleLbl>
   <dgm:styleLbl name="solidBgAcc1">
     <dgm:fillClrLst meth="repeat">
-      <a:schemeClr val="lt1"/>
+      <a:schemeClr val="lt2"/>
     </dgm:fillClrLst>
     <dgm:linClrLst meth="repeat">
-      <a:schemeClr val="accent1"/>
+      <a:schemeClr val="dk2"/>
     </dgm:linClrLst>
     <dgm:effectClrLst/>
     <dgm:txLinClrLst/>
@@ -1434,13 +1438,13 @@
   </dgm:styleLbl>
   <dgm:styleLbl name="fgAccFollowNode1">
     <dgm:fillClrLst meth="repeat">
-      <a:schemeClr val="accent1">
+      <a:schemeClr val="dk2">
         <a:alpha val="90000"/>
         <a:tint val="40000"/>
       </a:schemeClr>
     </dgm:fillClrLst>
     <dgm:linClrLst meth="repeat">
-      <a:schemeClr val="accent1">
+      <a:schemeClr val="dk2">
         <a:alpha val="90000"/>
         <a:tint val="40000"/>
       </a:schemeClr>
@@ -1454,13 +1458,13 @@
   </dgm:styleLbl>
   <dgm:styleLbl name="alignAccFollowNode1">
     <dgm:fillClrLst meth="repeat">
-      <a:schemeClr val="accent1">
+      <a:schemeClr val="dk2">
         <a:alpha val="90000"/>
         <a:tint val="40000"/>
       </a:schemeClr>
     </dgm:fillClrLst>
     <dgm:linClrLst meth="repeat">
-      <a:schemeClr val="accent1">
+      <a:schemeClr val="dk2">
         <a:alpha val="90000"/>
         <a:tint val="40000"/>
       </a:schemeClr>
@@ -1474,13 +1478,13 @@
   </dgm:styleLbl>
   <dgm:styleLbl name="bgAccFollowNode1">
     <dgm:fillClrLst meth="repeat">
-      <a:schemeClr val="accent1">
+      <a:schemeClr val="dk2">
         <a:alpha val="90000"/>
         <a:tint val="40000"/>
       </a:schemeClr>
     </dgm:fillClrLst>
     <dgm:linClrLst meth="repeat">
-      <a:schemeClr val="accent1">
+      <a:schemeClr val="dk2">
         <a:alpha val="90000"/>
         <a:tint val="40000"/>
       </a:schemeClr>
@@ -1494,12 +1498,12 @@
   </dgm:styleLbl>
   <dgm:styleLbl name="fgAcc0">
     <dgm:fillClrLst meth="repeat">
-      <a:schemeClr val="lt1">
+      <a:schemeClr val="lt2">
         <a:alpha val="90000"/>
       </a:schemeClr>
     </dgm:fillClrLst>
     <dgm:linClrLst meth="repeat">
-      <a:schemeClr val="accent1"/>
+      <a:schemeClr val="dk2"/>
     </dgm:linClrLst>
     <dgm:effectClrLst/>
     <dgm:txLinClrLst/>
@@ -1510,12 +1514,12 @@
   </dgm:styleLbl>
   <dgm:styleLbl name="fgAcc2">
     <dgm:fillClrLst meth="repeat">
-      <a:schemeClr val="lt1">
+      <a:schemeClr val="lt2">
         <a:alpha val="90000"/>
       </a:schemeClr>
     </dgm:fillClrLst>
     <dgm:linClrLst meth="repeat">
-      <a:schemeClr val="accent1"/>
+      <a:schemeClr val="dk2"/>
     </dgm:linClrLst>
     <dgm:effectClrLst/>
     <dgm:txLinClrLst/>
@@ -1526,12 +1530,12 @@
   </dgm:styleLbl>
   <dgm:styleLbl name="fgAcc3">
     <dgm:fillClrLst meth="repeat">
-      <a:schemeClr val="lt1">
+      <a:schemeClr val="lt2">
         <a:alpha val="90000"/>
       </a:schemeClr>
     </dgm:fillClrLst>
     <dgm:linClrLst meth="repeat">
-      <a:schemeClr val="accent1"/>
+      <a:schemeClr val="dk2"/>
     </dgm:linClrLst>
     <dgm:effectClrLst/>
     <dgm:txLinClrLst/>
@@ -1542,12 +1546,12 @@
   </dgm:styleLbl>
   <dgm:styleLbl name="fgAcc4">
     <dgm:fillClrLst meth="repeat">
-      <a:schemeClr val="lt1">
+      <a:schemeClr val="lt2">
         <a:alpha val="90000"/>
       </a:schemeClr>
     </dgm:fillClrLst>
     <dgm:linClrLst meth="repeat">
-      <a:schemeClr val="accent1"/>
+      <a:schemeClr val="dk2"/>
     </dgm:linClrLst>
     <dgm:effectClrLst/>
     <dgm:txLinClrLst/>
@@ -1558,12 +1562,12 @@
   </dgm:styleLbl>
   <dgm:styleLbl name="bgShp">
     <dgm:fillClrLst meth="repeat">
-      <a:schemeClr val="accent1">
+      <a:schemeClr val="dk2">
         <a:tint val="40000"/>
       </a:schemeClr>
     </dgm:fillClrLst>
     <dgm:linClrLst meth="repeat">
-      <a:schemeClr val="accent1"/>
+      <a:schemeClr val="dk2"/>
     </dgm:linClrLst>
     <dgm:effectClrLst/>
     <dgm:txLinClrLst/>
@@ -1574,12 +1578,12 @@
   </dgm:styleLbl>
   <dgm:styleLbl name="dkBgShp">
     <dgm:fillClrLst meth="repeat">
-      <a:schemeClr val="accent1">
+      <a:schemeClr val="dk2">
         <a:shade val="80000"/>
       </a:schemeClr>
     </dgm:fillClrLst>
     <dgm:linClrLst meth="repeat">
-      <a:schemeClr val="accent1"/>
+      <a:schemeClr val="dk2"/>
     </dgm:linClrLst>
     <dgm:effectClrLst/>
     <dgm:txLinClrLst/>
@@ -1590,13 +1594,13 @@
   </dgm:styleLbl>
   <dgm:styleLbl name="trBgShp">
     <dgm:fillClrLst meth="repeat">
-      <a:schemeClr val="accent1">
+      <a:schemeClr val="dk2">
         <a:tint val="50000"/>
         <a:alpha val="40000"/>
       </a:schemeClr>
     </dgm:fillClrLst>
     <dgm:linClrLst meth="repeat">
-      <a:schemeClr val="accent1"/>
+      <a:schemeClr val="dk2"/>
     </dgm:linClrLst>
     <dgm:effectClrLst/>
     <dgm:txLinClrLst/>
@@ -1607,12 +1611,12 @@
   </dgm:styleLbl>
   <dgm:styleLbl name="fgShp">
     <dgm:fillClrLst meth="repeat">
-      <a:schemeClr val="accent1">
+      <a:schemeClr val="dk2">
         <a:tint val="60000"/>
       </a:schemeClr>
     </dgm:fillClrLst>
     <dgm:linClrLst meth="repeat">
-      <a:schemeClr val="lt1"/>
+      <a:schemeClr val="lt2"/>
     </dgm:linClrLst>
     <dgm:effectClrLst/>
     <dgm:txLinClrLst/>
@@ -1623,7 +1627,7 @@
   </dgm:styleLbl>
   <dgm:styleLbl name="revTx">
     <dgm:fillClrLst meth="repeat">
-      <a:schemeClr val="lt1">
+      <a:schemeClr val="lt2">
         <a:alpha val="0"/>
       </a:schemeClr>
     </dgm:fillClrLst>
@@ -2518,18 +2522,18 @@
 </file>
 
 <file path=ppt/diagrams/colors4.xml><?xml version="1.0" encoding="utf-8"?>
-<dgm:colorsDef xmlns:dgm="http://schemas.openxmlformats.org/drawingml/2006/diagram" xmlns:a="http://schemas.openxmlformats.org/drawingml/2006/main" uniqueId="urn:microsoft.com/office/officeart/2005/8/colors/accent1_2">
+<dgm:colorsDef xmlns:dgm="http://schemas.openxmlformats.org/drawingml/2006/diagram" xmlns:a="http://schemas.openxmlformats.org/drawingml/2006/main" uniqueId="urn:microsoft.com/office/officeart/2005/8/colors/accent0_3">
   <dgm:title val=""/>
   <dgm:desc val=""/>
   <dgm:catLst>
-    <dgm:cat type="accent1" pri="11200"/>
+    <dgm:cat type="mainScheme" pri="10300"/>
   </dgm:catLst>
   <dgm:styleLbl name="node0">
     <dgm:fillClrLst meth="repeat">
-      <a:schemeClr val="accent1"/>
+      <a:schemeClr val="dk2"/>
     </dgm:fillClrLst>
     <dgm:linClrLst meth="repeat">
-      <a:schemeClr val="lt1"/>
+      <a:schemeClr val="lt2"/>
     </dgm:linClrLst>
     <dgm:effectClrLst/>
     <dgm:txLinClrLst/>
@@ -2538,10 +2542,10 @@
   </dgm:styleLbl>
   <dgm:styleLbl name="alignNode1">
     <dgm:fillClrLst meth="repeat">
-      <a:schemeClr val="accent1"/>
+      <a:schemeClr val="dk2"/>
     </dgm:fillClrLst>
     <dgm:linClrLst meth="repeat">
-      <a:schemeClr val="accent1"/>
+      <a:schemeClr val="dk2"/>
     </dgm:linClrLst>
     <dgm:effectClrLst/>
     <dgm:txLinClrLst/>
@@ -2550,10 +2554,10 @@
   </dgm:styleLbl>
   <dgm:styleLbl name="node1">
     <dgm:fillClrLst meth="repeat">
-      <a:schemeClr val="accent1"/>
+      <a:schemeClr val="dk2"/>
     </dgm:fillClrLst>
     <dgm:linClrLst meth="repeat">
-      <a:schemeClr val="lt1"/>
+      <a:schemeClr val="lt2"/>
     </dgm:linClrLst>
     <dgm:effectClrLst/>
     <dgm:txLinClrLst/>
@@ -2562,10 +2566,10 @@
   </dgm:styleLbl>
   <dgm:styleLbl name="lnNode1">
     <dgm:fillClrLst meth="repeat">
-      <a:schemeClr val="accent1"/>
+      <a:schemeClr val="dk2"/>
     </dgm:fillClrLst>
     <dgm:linClrLst meth="repeat">
-      <a:schemeClr val="lt1"/>
+      <a:schemeClr val="lt2"/>
     </dgm:linClrLst>
     <dgm:effectClrLst/>
     <dgm:txLinClrLst/>
@@ -2574,12 +2578,12 @@
   </dgm:styleLbl>
   <dgm:styleLbl name="vennNode1">
     <dgm:fillClrLst meth="repeat">
-      <a:schemeClr val="accent1">
+      <a:schemeClr val="dk2">
         <a:alpha val="50000"/>
       </a:schemeClr>
     </dgm:fillClrLst>
     <dgm:linClrLst meth="repeat">
-      <a:schemeClr val="lt1"/>
+      <a:schemeClr val="lt2"/>
     </dgm:linClrLst>
     <dgm:effectClrLst/>
     <dgm:txLinClrLst/>
@@ -2588,10 +2592,10 @@
   </dgm:styleLbl>
   <dgm:styleLbl name="node2">
     <dgm:fillClrLst meth="repeat">
-      <a:schemeClr val="accent1"/>
+      <a:schemeClr val="dk2"/>
     </dgm:fillClrLst>
     <dgm:linClrLst meth="repeat">
-      <a:schemeClr val="lt1"/>
+      <a:schemeClr val="lt2"/>
     </dgm:linClrLst>
     <dgm:effectClrLst/>
     <dgm:txLinClrLst/>
@@ -2600,10 +2604,10 @@
   </dgm:styleLbl>
   <dgm:styleLbl name="node3">
     <dgm:fillClrLst meth="repeat">
-      <a:schemeClr val="accent1"/>
+      <a:schemeClr val="dk2"/>
     </dgm:fillClrLst>
     <dgm:linClrLst meth="repeat">
-      <a:schemeClr val="lt1"/>
+      <a:schemeClr val="lt2"/>
     </dgm:linClrLst>
     <dgm:effectClrLst/>
     <dgm:txLinClrLst/>
@@ -2612,10 +2616,10 @@
   </dgm:styleLbl>
   <dgm:styleLbl name="node4">
     <dgm:fillClrLst meth="repeat">
-      <a:schemeClr val="accent1"/>
+      <a:schemeClr val="dk2"/>
     </dgm:fillClrLst>
     <dgm:linClrLst meth="repeat">
-      <a:schemeClr val="lt1"/>
+      <a:schemeClr val="lt2"/>
     </dgm:linClrLst>
     <dgm:effectClrLst/>
     <dgm:txLinClrLst/>
@@ -2624,60 +2628,64 @@
   </dgm:styleLbl>
   <dgm:styleLbl name="fgImgPlace1">
     <dgm:fillClrLst meth="repeat">
-      <a:schemeClr val="accent1">
+      <a:schemeClr val="dk2">
         <a:tint val="50000"/>
       </a:schemeClr>
     </dgm:fillClrLst>
     <dgm:linClrLst meth="repeat">
-      <a:schemeClr val="lt1"/>
+      <a:schemeClr val="lt2"/>
     </dgm:linClrLst>
     <dgm:effectClrLst/>
     <dgm:txLinClrLst/>
     <dgm:txFillClrLst meth="repeat">
-      <a:schemeClr val="lt1"/>
+      <a:schemeClr val="lt2"/>
     </dgm:txFillClrLst>
     <dgm:txEffectClrLst/>
   </dgm:styleLbl>
   <dgm:styleLbl name="alignImgPlace1">
     <dgm:fillClrLst meth="repeat">
-      <a:schemeClr val="accent1">
+      <a:schemeClr val="dk2">
         <a:tint val="50000"/>
       </a:schemeClr>
     </dgm:fillClrLst>
     <dgm:linClrLst meth="repeat">
-      <a:schemeClr val="lt1"/>
+      <a:schemeClr val="dk2">
+        <a:shade val="80000"/>
+      </a:schemeClr>
     </dgm:linClrLst>
     <dgm:effectClrLst/>
     <dgm:txLinClrLst/>
     <dgm:txFillClrLst meth="repeat">
-      <a:schemeClr val="lt1"/>
+      <a:schemeClr val="lt2"/>
     </dgm:txFillClrLst>
     <dgm:txEffectClrLst/>
   </dgm:styleLbl>
   <dgm:styleLbl name="bgImgPlace1">
     <dgm:fillClrLst meth="repeat">
-      <a:schemeClr val="accent1">
+      <a:schemeClr val="dk2">
         <a:tint val="50000"/>
       </a:schemeClr>
     </dgm:fillClrLst>
     <dgm:linClrLst meth="repeat">
-      <a:schemeClr val="lt1"/>
+      <a:schemeClr val="dk2">
+        <a:shade val="80000"/>
+      </a:schemeClr>
     </dgm:linClrLst>
     <dgm:effectClrLst/>
     <dgm:txLinClrLst/>
     <dgm:txFillClrLst meth="repeat">
-      <a:schemeClr val="lt1"/>
+      <a:schemeClr val="lt2"/>
     </dgm:txFillClrLst>
     <dgm:txEffectClrLst/>
   </dgm:styleLbl>
   <dgm:styleLbl name="sibTrans2D1">
     <dgm:fillClrLst meth="repeat">
-      <a:schemeClr val="accent1">
+      <a:schemeClr val="dk2">
         <a:tint val="60000"/>
       </a:schemeClr>
     </dgm:fillClrLst>
     <dgm:linClrLst meth="repeat">
-      <a:schemeClr val="accent1">
+      <a:schemeClr val="dk2">
         <a:tint val="60000"/>
       </a:schemeClr>
     </dgm:linClrLst>
@@ -2688,12 +2696,12 @@
   </dgm:styleLbl>
   <dgm:styleLbl name="fgSibTrans2D1">
     <dgm:fillClrLst meth="repeat">
-      <a:schemeClr val="accent1">
+      <a:schemeClr val="dk2">
         <a:tint val="60000"/>
       </a:schemeClr>
     </dgm:fillClrLst>
     <dgm:linClrLst meth="repeat">
-      <a:schemeClr val="accent1">
+      <a:schemeClr val="dk2">
         <a:tint val="60000"/>
       </a:schemeClr>
     </dgm:linClrLst>
@@ -2704,12 +2712,12 @@
   </dgm:styleLbl>
   <dgm:styleLbl name="bgSibTrans2D1">
     <dgm:fillClrLst meth="repeat">
-      <a:schemeClr val="accent1">
+      <a:schemeClr val="dk2">
         <a:tint val="60000"/>
       </a:schemeClr>
     </dgm:fillClrLst>
     <dgm:linClrLst meth="repeat">
-      <a:schemeClr val="accent1">
+      <a:schemeClr val="dk2">
         <a:tint val="60000"/>
       </a:schemeClr>
     </dgm:linClrLst>
@@ -2720,40 +2728,40 @@
   </dgm:styleLbl>
   <dgm:styleLbl name="sibTrans1D1">
     <dgm:fillClrLst meth="repeat">
-      <a:schemeClr val="accent1"/>
+      <a:schemeClr val="dk2"/>
     </dgm:fillClrLst>
     <dgm:linClrLst meth="repeat">
-      <a:schemeClr val="accent1"/>
+      <a:schemeClr val="dk2"/>
     </dgm:linClrLst>
     <dgm:effectClrLst/>
     <dgm:txLinClrLst/>
     <dgm:txFillClrLst meth="repeat">
-      <a:schemeClr val="tx1"/>
+      <a:schemeClr val="lt2"/>
     </dgm:txFillClrLst>
     <dgm:txEffectClrLst/>
   </dgm:styleLbl>
   <dgm:styleLbl name="callout">
     <dgm:fillClrLst meth="repeat">
-      <a:schemeClr val="accent1"/>
+      <a:schemeClr val="dk2"/>
     </dgm:fillClrLst>
     <dgm:linClrLst meth="repeat">
-      <a:schemeClr val="accent1">
+      <a:schemeClr val="dk2">
         <a:tint val="50000"/>
       </a:schemeClr>
     </dgm:linClrLst>
     <dgm:effectClrLst/>
     <dgm:txLinClrLst/>
     <dgm:txFillClrLst meth="repeat">
-      <a:schemeClr val="tx1"/>
+      <a:schemeClr val="lt2"/>
     </dgm:txFillClrLst>
     <dgm:txEffectClrLst/>
   </dgm:styleLbl>
   <dgm:styleLbl name="asst0">
     <dgm:fillClrLst meth="repeat">
-      <a:schemeClr val="accent1"/>
+      <a:schemeClr val="dk2"/>
     </dgm:fillClrLst>
     <dgm:linClrLst meth="repeat">
-      <a:schemeClr val="lt1"/>
+      <a:schemeClr val="lt2"/>
     </dgm:linClrLst>
     <dgm:effectClrLst/>
     <dgm:txLinClrLst/>
@@ -2762,10 +2770,10 @@
   </dgm:styleLbl>
   <dgm:styleLbl name="asst1">
     <dgm:fillClrLst meth="repeat">
-      <a:schemeClr val="accent1"/>
+      <a:schemeClr val="dk2"/>
     </dgm:fillClrLst>
     <dgm:linClrLst meth="repeat">
-      <a:schemeClr val="lt1"/>
+      <a:schemeClr val="lt2"/>
     </dgm:linClrLst>
     <dgm:effectClrLst/>
     <dgm:txLinClrLst/>
@@ -2774,10 +2782,10 @@
   </dgm:styleLbl>
   <dgm:styleLbl name="asst2">
     <dgm:fillClrLst meth="repeat">
-      <a:schemeClr val="accent1"/>
+      <a:schemeClr val="dk2"/>
     </dgm:fillClrLst>
     <dgm:linClrLst meth="repeat">
-      <a:schemeClr val="lt1"/>
+      <a:schemeClr val="lt2"/>
     </dgm:linClrLst>
     <dgm:effectClrLst/>
     <dgm:txLinClrLst/>
@@ -2786,10 +2794,10 @@
   </dgm:styleLbl>
   <dgm:styleLbl name="asst3">
     <dgm:fillClrLst meth="repeat">
-      <a:schemeClr val="accent1"/>
+      <a:schemeClr val="dk2"/>
     </dgm:fillClrLst>
     <dgm:linClrLst meth="repeat">
-      <a:schemeClr val="lt1"/>
+      <a:schemeClr val="lt2"/>
     </dgm:linClrLst>
     <dgm:effectClrLst/>
     <dgm:txLinClrLst/>
@@ -2798,10 +2806,10 @@
   </dgm:styleLbl>
   <dgm:styleLbl name="asst4">
     <dgm:fillClrLst meth="repeat">
-      <a:schemeClr val="accent1"/>
+      <a:schemeClr val="dk2"/>
     </dgm:fillClrLst>
     <dgm:linClrLst meth="repeat">
-      <a:schemeClr val="lt1"/>
+      <a:schemeClr val="lt2"/>
     </dgm:linClrLst>
     <dgm:effectClrLst/>
     <dgm:txLinClrLst/>
@@ -2810,70 +2818,70 @@
   </dgm:styleLbl>
   <dgm:styleLbl name="parChTrans2D1">
     <dgm:fillClrLst meth="repeat">
-      <a:schemeClr val="accent1">
+      <a:schemeClr val="dk2">
         <a:tint val="60000"/>
       </a:schemeClr>
     </dgm:fillClrLst>
     <dgm:linClrLst meth="repeat">
-      <a:schemeClr val="accent1">
+      <a:schemeClr val="dk2">
         <a:tint val="60000"/>
       </a:schemeClr>
     </dgm:linClrLst>
     <dgm:effectClrLst/>
     <dgm:txLinClrLst/>
     <dgm:txFillClrLst meth="repeat">
-      <a:schemeClr val="lt1"/>
+      <a:schemeClr val="lt2"/>
     </dgm:txFillClrLst>
     <dgm:txEffectClrLst/>
   </dgm:styleLbl>
   <dgm:styleLbl name="parChTrans2D2">
     <dgm:fillClrLst meth="repeat">
-      <a:schemeClr val="accent1"/>
+      <a:schemeClr val="dk2"/>
     </dgm:fillClrLst>
     <dgm:linClrLst meth="repeat">
-      <a:schemeClr val="accent1"/>
+      <a:schemeClr val="dk2"/>
     </dgm:linClrLst>
     <dgm:effectClrLst/>
     <dgm:txLinClrLst/>
     <dgm:txFillClrLst meth="repeat">
-      <a:schemeClr val="lt1"/>
+      <a:schemeClr val="lt2"/>
     </dgm:txFillClrLst>
     <dgm:txEffectClrLst/>
   </dgm:styleLbl>
   <dgm:styleLbl name="parChTrans2D3">
     <dgm:fillClrLst meth="repeat">
-      <a:schemeClr val="accent1"/>
+      <a:schemeClr val="dk2"/>
     </dgm:fillClrLst>
     <dgm:linClrLst meth="repeat">
-      <a:schemeClr val="accent1"/>
+      <a:schemeClr val="dk2"/>
     </dgm:linClrLst>
     <dgm:effectClrLst/>
     <dgm:txLinClrLst/>
     <dgm:txFillClrLst meth="repeat">
-      <a:schemeClr val="lt1"/>
+      <a:schemeClr val="lt2"/>
     </dgm:txFillClrLst>
     <dgm:txEffectClrLst/>
   </dgm:styleLbl>
   <dgm:styleLbl name="parChTrans2D4">
     <dgm:fillClrLst meth="repeat">
-      <a:schemeClr val="accent1"/>
+      <a:schemeClr val="dk2"/>
     </dgm:fillClrLst>
     <dgm:linClrLst meth="repeat">
-      <a:schemeClr val="accent1"/>
+      <a:schemeClr val="dk2"/>
     </dgm:linClrLst>
     <dgm:effectClrLst/>
     <dgm:txLinClrLst/>
     <dgm:txFillClrLst meth="repeat">
-      <a:schemeClr val="lt1"/>
+      <a:schemeClr val="lt2"/>
     </dgm:txFillClrLst>
     <dgm:txEffectClrLst/>
   </dgm:styleLbl>
   <dgm:styleLbl name="parChTrans1D1">
     <dgm:fillClrLst meth="repeat">
-      <a:schemeClr val="accent1"/>
+      <a:schemeClr val="dk2"/>
     </dgm:fillClrLst>
     <dgm:linClrLst meth="repeat">
-      <a:schemeClr val="accent1">
+      <a:schemeClr val="dk2">
         <a:shade val="60000"/>
       </a:schemeClr>
     </dgm:linClrLst>
@@ -2886,10 +2894,10 @@
   </dgm:styleLbl>
   <dgm:styleLbl name="parChTrans1D2">
     <dgm:fillClrLst meth="repeat">
-      <a:schemeClr val="accent1"/>
+      <a:schemeClr val="dk2"/>
     </dgm:fillClrLst>
     <dgm:linClrLst meth="repeat">
-      <a:schemeClr val="accent1">
+      <a:schemeClr val="dk2">
         <a:shade val="60000"/>
       </a:schemeClr>
     </dgm:linClrLst>
@@ -2902,10 +2910,10 @@
   </dgm:styleLbl>
   <dgm:styleLbl name="parChTrans1D3">
     <dgm:fillClrLst meth="repeat">
-      <a:schemeClr val="accent1"/>
+      <a:schemeClr val="dk2"/>
     </dgm:fillClrLst>
     <dgm:linClrLst meth="repeat">
-      <a:schemeClr val="accent1">
+      <a:schemeClr val="dk2">
         <a:shade val="80000"/>
       </a:schemeClr>
     </dgm:linClrLst>
@@ -2918,10 +2926,10 @@
   </dgm:styleLbl>
   <dgm:styleLbl name="parChTrans1D4">
     <dgm:fillClrLst meth="repeat">
-      <a:schemeClr val="accent1"/>
+      <a:schemeClr val="dk2"/>
     </dgm:fillClrLst>
     <dgm:linClrLst meth="repeat">
-      <a:schemeClr val="accent1">
+      <a:schemeClr val="dk2">
         <a:shade val="80000"/>
       </a:schemeClr>
     </dgm:linClrLst>
@@ -2934,12 +2942,12 @@
   </dgm:styleLbl>
   <dgm:styleLbl name="fgAcc1">
     <dgm:fillClrLst meth="repeat">
-      <a:schemeClr val="lt1">
+      <a:schemeClr val="lt2">
         <a:alpha val="90000"/>
       </a:schemeClr>
     </dgm:fillClrLst>
     <dgm:linClrLst meth="repeat">
-      <a:schemeClr val="accent1"/>
+      <a:schemeClr val="dk2"/>
     </dgm:linClrLst>
     <dgm:effectClrLst/>
     <dgm:txLinClrLst/>
@@ -2950,12 +2958,12 @@
   </dgm:styleLbl>
   <dgm:styleLbl name="conFgAcc1">
     <dgm:fillClrLst meth="repeat">
-      <a:schemeClr val="lt1">
+      <a:schemeClr val="lt2">
         <a:alpha val="90000"/>
       </a:schemeClr>
     </dgm:fillClrLst>
     <dgm:linClrLst meth="repeat">
-      <a:schemeClr val="accent1"/>
+      <a:schemeClr val="dk2"/>
     </dgm:linClrLst>
     <dgm:effectClrLst/>
     <dgm:txLinClrLst/>
@@ -2966,12 +2974,12 @@
   </dgm:styleLbl>
   <dgm:styleLbl name="alignAcc1">
     <dgm:fillClrLst meth="repeat">
-      <a:schemeClr val="lt1">
+      <a:schemeClr val="lt2">
         <a:alpha val="90000"/>
       </a:schemeClr>
     </dgm:fillClrLst>
     <dgm:linClrLst meth="repeat">
-      <a:schemeClr val="accent1"/>
+      <a:schemeClr val="dk2"/>
     </dgm:linClrLst>
     <dgm:effectClrLst/>
     <dgm:txLinClrLst/>
@@ -2982,12 +2990,12 @@
   </dgm:styleLbl>
   <dgm:styleLbl name="trAlignAcc1">
     <dgm:fillClrLst meth="repeat">
-      <a:schemeClr val="lt1">
+      <a:schemeClr val="lt2">
         <a:alpha val="40000"/>
       </a:schemeClr>
     </dgm:fillClrLst>
     <dgm:linClrLst meth="repeat">
-      <a:schemeClr val="accent1"/>
+      <a:schemeClr val="dk2"/>
     </dgm:linClrLst>
     <dgm:effectClrLst/>
     <dgm:txLinClrLst/>
@@ -2998,12 +3006,12 @@
   </dgm:styleLbl>
   <dgm:styleLbl name="bgAcc1">
     <dgm:fillClrLst meth="repeat">
-      <a:schemeClr val="lt1">
+      <a:schemeClr val="lt2">
         <a:alpha val="90000"/>
       </a:schemeClr>
     </dgm:fillClrLst>
     <dgm:linClrLst meth="repeat">
-      <a:schemeClr val="accent1"/>
+      <a:schemeClr val="dk2"/>
     </dgm:linClrLst>
     <dgm:effectClrLst/>
     <dgm:txLinClrLst/>
@@ -3014,10 +3022,10 @@
   </dgm:styleLbl>
   <dgm:styleLbl name="solidFgAcc1">
     <dgm:fillClrLst meth="repeat">
-      <a:schemeClr val="lt1"/>
+      <a:schemeClr val="lt2"/>
     </dgm:fillClrLst>
     <dgm:linClrLst meth="repeat">
-      <a:schemeClr val="accent1"/>
+      <a:schemeClr val="dk2"/>
     </dgm:linClrLst>
     <dgm:effectClrLst/>
     <dgm:txLinClrLst/>
@@ -3028,10 +3036,10 @@
   </dgm:styleLbl>
   <dgm:styleLbl name="solidAlignAcc1">
     <dgm:fillClrLst meth="repeat">
-      <a:schemeClr val="lt1"/>
+      <a:schemeClr val="lt2"/>
     </dgm:fillClrLst>
     <dgm:linClrLst meth="repeat">
-      <a:schemeClr val="accent1"/>
+      <a:schemeClr val="dk2"/>
     </dgm:linClrLst>
     <dgm:effectClrLst/>
     <dgm:txLinClrLst/>
@@ -3042,10 +3050,10 @@
   </dgm:styleLbl>
   <dgm:styleLbl name="solidBgAcc1">
     <dgm:fillClrLst meth="repeat">
-      <a:schemeClr val="lt1"/>
+      <a:schemeClr val="lt2"/>
     </dgm:fillClrLst>
     <dgm:linClrLst meth="repeat">
-      <a:schemeClr val="accent1"/>
+      <a:schemeClr val="dk2"/>
     </dgm:linClrLst>
     <dgm:effectClrLst/>
     <dgm:txLinClrLst/>
@@ -3056,13 +3064,13 @@
   </dgm:styleLbl>
   <dgm:styleLbl name="fgAccFollowNode1">
     <dgm:fillClrLst meth="repeat">
-      <a:schemeClr val="accent1">
+      <a:schemeClr val="dk2">
         <a:alpha val="90000"/>
         <a:tint val="40000"/>
       </a:schemeClr>
     </dgm:fillClrLst>
     <dgm:linClrLst meth="repeat">
-      <a:schemeClr val="accent1">
+      <a:schemeClr val="dk2">
         <a:alpha val="90000"/>
         <a:tint val="40000"/>
       </a:schemeClr>
@@ -3076,13 +3084,13 @@
   </dgm:styleLbl>
   <dgm:styleLbl name="alignAccFollowNode1">
     <dgm:fillClrLst meth="repeat">
-      <a:schemeClr val="accent1">
+      <a:schemeClr val="dk2">
         <a:alpha val="90000"/>
         <a:tint val="40000"/>
       </a:schemeClr>
     </dgm:fillClrLst>
     <dgm:linClrLst meth="repeat">
-      <a:schemeClr val="accent1">
+      <a:schemeClr val="dk2">
         <a:alpha val="90000"/>
         <a:tint val="40000"/>
       </a:schemeClr>
@@ -3096,13 +3104,13 @@
   </dgm:styleLbl>
   <dgm:styleLbl name="bgAccFollowNode1">
     <dgm:fillClrLst meth="repeat">
-      <a:schemeClr val="accent1">
+      <a:schemeClr val="dk2">
         <a:alpha val="90000"/>
         <a:tint val="40000"/>
       </a:schemeClr>
     </dgm:fillClrLst>
     <dgm:linClrLst meth="repeat">
-      <a:schemeClr val="accent1">
+      <a:schemeClr val="dk2">
         <a:alpha val="90000"/>
         <a:tint val="40000"/>
       </a:schemeClr>
@@ -3116,12 +3124,12 @@
   </dgm:styleLbl>
   <dgm:styleLbl name="fgAcc0">
     <dgm:fillClrLst meth="repeat">
-      <a:schemeClr val="lt1">
+      <a:schemeClr val="lt2">
         <a:alpha val="90000"/>
       </a:schemeClr>
     </dgm:fillClrLst>
     <dgm:linClrLst meth="repeat">
-      <a:schemeClr val="accent1"/>
+      <a:schemeClr val="dk2"/>
     </dgm:linClrLst>
     <dgm:effectClrLst/>
     <dgm:txLinClrLst/>
@@ -3132,12 +3140,12 @@
   </dgm:styleLbl>
   <dgm:styleLbl name="fgAcc2">
     <dgm:fillClrLst meth="repeat">
-      <a:schemeClr val="lt1">
+      <a:schemeClr val="lt2">
         <a:alpha val="90000"/>
       </a:schemeClr>
     </dgm:fillClrLst>
     <dgm:linClrLst meth="repeat">
-      <a:schemeClr val="accent1"/>
+      <a:schemeClr val="dk2"/>
     </dgm:linClrLst>
     <dgm:effectClrLst/>
     <dgm:txLinClrLst/>
@@ -3148,12 +3156,12 @@
   </dgm:styleLbl>
   <dgm:styleLbl name="fgAcc3">
     <dgm:fillClrLst meth="repeat">
-      <a:schemeClr val="lt1">
+      <a:schemeClr val="lt2">
         <a:alpha val="90000"/>
       </a:schemeClr>
     </dgm:fillClrLst>
     <dgm:linClrLst meth="repeat">
-      <a:schemeClr val="accent1"/>
+      <a:schemeClr val="dk2"/>
     </dgm:linClrLst>
     <dgm:effectClrLst/>
     <dgm:txLinClrLst/>
@@ -3164,12 +3172,12 @@
   </dgm:styleLbl>
   <dgm:styleLbl name="fgAcc4">
     <dgm:fillClrLst meth="repeat">
-      <a:schemeClr val="lt1">
+      <a:schemeClr val="lt2">
         <a:alpha val="90000"/>
       </a:schemeClr>
     </dgm:fillClrLst>
     <dgm:linClrLst meth="repeat">
-      <a:schemeClr val="accent1"/>
+      <a:schemeClr val="dk2"/>
     </dgm:linClrLst>
     <dgm:effectClrLst/>
     <dgm:txLinClrLst/>
@@ -3180,12 +3188,12 @@
   </dgm:styleLbl>
   <dgm:styleLbl name="bgShp">
     <dgm:fillClrLst meth="repeat">
-      <a:schemeClr val="accent1">
+      <a:schemeClr val="dk2">
         <a:tint val="40000"/>
       </a:schemeClr>
     </dgm:fillClrLst>
     <dgm:linClrLst meth="repeat">
-      <a:schemeClr val="accent1"/>
+      <a:schemeClr val="dk2"/>
     </dgm:linClrLst>
     <dgm:effectClrLst/>
     <dgm:txLinClrLst/>
@@ -3196,12 +3204,12 @@
   </dgm:styleLbl>
   <dgm:styleLbl name="dkBgShp">
     <dgm:fillClrLst meth="repeat">
-      <a:schemeClr val="accent1">
+      <a:schemeClr val="dk2">
         <a:shade val="80000"/>
       </a:schemeClr>
     </dgm:fillClrLst>
     <dgm:linClrLst meth="repeat">
-      <a:schemeClr val="accent1"/>
+      <a:schemeClr val="dk2"/>
     </dgm:linClrLst>
     <dgm:effectClrLst/>
     <dgm:txLinClrLst/>
@@ -3212,13 +3220,13 @@
   </dgm:styleLbl>
   <dgm:styleLbl name="trBgShp">
     <dgm:fillClrLst meth="repeat">
-      <a:schemeClr val="accent1">
+      <a:schemeClr val="dk2">
         <a:tint val="50000"/>
         <a:alpha val="40000"/>
       </a:schemeClr>
     </dgm:fillClrLst>
     <dgm:linClrLst meth="repeat">
-      <a:schemeClr val="accent1"/>
+      <a:schemeClr val="dk2"/>
     </dgm:linClrLst>
     <dgm:effectClrLst/>
     <dgm:txLinClrLst/>
@@ -3229,12 +3237,12 @@
   </dgm:styleLbl>
   <dgm:styleLbl name="fgShp">
     <dgm:fillClrLst meth="repeat">
-      <a:schemeClr val="accent1">
+      <a:schemeClr val="dk2">
         <a:tint val="60000"/>
       </a:schemeClr>
     </dgm:fillClrLst>
     <dgm:linClrLst meth="repeat">
-      <a:schemeClr val="lt1"/>
+      <a:schemeClr val="lt2"/>
     </dgm:linClrLst>
     <dgm:effectClrLst/>
     <dgm:txLinClrLst/>
@@ -3245,7 +3253,7 @@
   </dgm:styleLbl>
   <dgm:styleLbl name="revTx">
     <dgm:fillClrLst meth="repeat">
-      <a:schemeClr val="lt1">
+      <a:schemeClr val="lt2">
         <a:alpha val="0"/>
       </a:schemeClr>
     </dgm:fillClrLst>
@@ -3834,7 +3842,7 @@
 <dgm:dataModel xmlns:dgm="http://schemas.openxmlformats.org/drawingml/2006/diagram" xmlns:a="http://schemas.openxmlformats.org/drawingml/2006/main">
   <dgm:ptLst>
     <dgm:pt modelId="{9F8F2B18-D282-4819-BEC3-BC06A6637AB0}" type="doc">
-      <dgm:prSet loTypeId="urn:microsoft.com/office/officeart/2005/8/layout/equation1" loCatId="relationship" qsTypeId="urn:microsoft.com/office/officeart/2005/8/quickstyle/simple1" qsCatId="simple" csTypeId="urn:microsoft.com/office/officeart/2005/8/colors/accent1_2" csCatId="accent1" phldr="1"/>
+      <dgm:prSet loTypeId="urn:microsoft.com/office/officeart/2005/8/layout/equation1" loCatId="relationship" qsTypeId="urn:microsoft.com/office/officeart/2005/8/quickstyle/simple1" qsCatId="simple" csTypeId="urn:microsoft.com/office/officeart/2005/8/colors/accent0_3" csCatId="mainScheme" phldr="1"/>
       <dgm:spPr/>
     </dgm:pt>
     <dgm:pt modelId="{CB3AAD02-4F9D-481B-9869-2849601792C8}">
@@ -4314,8 +4322,8 @@
     <dgm:cxn modelId="{BE4D6236-A3E0-4057-9A2C-42D4A877D36E}" type="presOf" srcId="{8A45336E-5408-4D62-9EF1-08F486318BFF}" destId="{57863176-DB12-4225-A941-96CD5A6A82CC}" srcOrd="0" destOrd="0" presId="urn:microsoft.com/office/officeart/2005/8/layout/hChevron3"/>
     <dgm:cxn modelId="{1C1D83E0-DB0F-4A9B-A04D-A392BE0DD04C}" type="presOf" srcId="{AFF4B1FA-9A6B-43F7-B8CB-4C91CF1DDBE0}" destId="{6E8A8CB1-126C-4A8D-95E5-7D016B2029F2}" srcOrd="0" destOrd="0" presId="urn:microsoft.com/office/officeart/2005/8/layout/hChevron3"/>
     <dgm:cxn modelId="{DCD6A15A-B19C-4616-9ED1-26DCB2C43285}" srcId="{8A45336E-5408-4D62-9EF1-08F486318BFF}" destId="{8BEAE8CB-A7D8-45E4-BC87-9A18CED7E7CE}" srcOrd="0" destOrd="0" parTransId="{E16CB781-B1BB-4E9E-9C86-96F481B14BFA}" sibTransId="{48747E02-CA4B-4EA6-9401-0110B1D75C1C}"/>
+    <dgm:cxn modelId="{94C1853C-02E7-4C27-A29A-FC84C3187A32}" srcId="{8A45336E-5408-4D62-9EF1-08F486318BFF}" destId="{A917A1F9-17B7-4B88-9FAD-AF41E2910DBD}" srcOrd="3" destOrd="0" parTransId="{FEFD055D-8110-41D2-83FF-BB68E3C24098}" sibTransId="{A2ABC1CA-D4DB-4C0F-83FD-5DAA1C23AAEA}"/>
     <dgm:cxn modelId="{C70A686A-14B0-4CBB-AA56-4BFD6C2C7B89}" type="presOf" srcId="{766D0765-5B45-432B-826E-9A27A845A5A7}" destId="{F0AA213A-C7FF-4409-B147-991ABB26AAB2}" srcOrd="0" destOrd="0" presId="urn:microsoft.com/office/officeart/2005/8/layout/hChevron3"/>
-    <dgm:cxn modelId="{94C1853C-02E7-4C27-A29A-FC84C3187A32}" srcId="{8A45336E-5408-4D62-9EF1-08F486318BFF}" destId="{A917A1F9-17B7-4B88-9FAD-AF41E2910DBD}" srcOrd="3" destOrd="0" parTransId="{FEFD055D-8110-41D2-83FF-BB68E3C24098}" sibTransId="{A2ABC1CA-D4DB-4C0F-83FD-5DAA1C23AAEA}"/>
     <dgm:cxn modelId="{9CC9A370-689E-4C6F-B870-78ECD0BA24BE}" type="presOf" srcId="{A917A1F9-17B7-4B88-9FAD-AF41E2910DBD}" destId="{6655FB27-B27C-4A7B-B55D-EF2C08C6B65E}" srcOrd="0" destOrd="0" presId="urn:microsoft.com/office/officeart/2005/8/layout/hChevron3"/>
     <dgm:cxn modelId="{128E7390-4262-4560-BB4D-C552847BC8AE}" type="presOf" srcId="{8BEAE8CB-A7D8-45E4-BC87-9A18CED7E7CE}" destId="{54F0ADA0-D0DF-4213-9ACF-ED13172B50C7}" srcOrd="0" destOrd="0" presId="urn:microsoft.com/office/officeart/2005/8/layout/hChevron3"/>
     <dgm:cxn modelId="{CB4508D6-DCB1-41A9-9031-BAB1F7FDDC1E}" type="presParOf" srcId="{57863176-DB12-4225-A941-96CD5A6A82CC}" destId="{54F0ADA0-D0DF-4213-9ACF-ED13172B50C7}" srcOrd="0" destOrd="0" presId="urn:microsoft.com/office/officeart/2005/8/layout/hChevron3"/>
@@ -4340,7 +4348,7 @@
 <dgm:dataModel xmlns:dgm="http://schemas.openxmlformats.org/drawingml/2006/diagram" xmlns:a="http://schemas.openxmlformats.org/drawingml/2006/main">
   <dgm:ptLst>
     <dgm:pt modelId="{E5CE24D6-BB13-4FEA-83CB-7B761924780A}" type="doc">
-      <dgm:prSet loTypeId="urn:microsoft.com/office/officeart/2005/8/layout/funnel1" loCatId="relationship" qsTypeId="urn:microsoft.com/office/officeart/2005/8/quickstyle/simple1" qsCatId="simple" csTypeId="urn:microsoft.com/office/officeart/2005/8/colors/accent1_2" csCatId="accent1" phldr="1"/>
+      <dgm:prSet loTypeId="urn:microsoft.com/office/officeart/2005/8/layout/funnel1" loCatId="relationship" qsTypeId="urn:microsoft.com/office/officeart/2005/8/quickstyle/simple1" qsCatId="simple" csTypeId="urn:microsoft.com/office/officeart/2005/8/colors/accent0_3" csCatId="mainScheme" phldr="1"/>
       <dgm:spPr/>
       <dgm:t>
         <a:bodyPr/>
@@ -4527,10 +4535,24 @@
     <dgm:pt modelId="{A1B8E387-8D9B-44C2-8C10-A0878F4BCBA5}" type="pres">
       <dgm:prSet presAssocID="{E5CE24D6-BB13-4FEA-83CB-7B761924780A}" presName="ellipse" presStyleLbl="trBgShp" presStyleIdx="0" presStyleCnt="1"/>
       <dgm:spPr/>
+      <dgm:t>
+        <a:bodyPr/>
+        <a:lstStyle/>
+        <a:p>
+          <a:endParaRPr lang="en-US"/>
+        </a:p>
+      </dgm:t>
     </dgm:pt>
     <dgm:pt modelId="{0E603398-1A32-447A-A475-9378CFFE704C}" type="pres">
       <dgm:prSet presAssocID="{E5CE24D6-BB13-4FEA-83CB-7B761924780A}" presName="arrow1" presStyleLbl="fgShp" presStyleIdx="0" presStyleCnt="1"/>
       <dgm:spPr/>
+      <dgm:t>
+        <a:bodyPr/>
+        <a:lstStyle/>
+        <a:p>
+          <a:endParaRPr lang="en-US"/>
+        </a:p>
+      </dgm:t>
     </dgm:pt>
     <dgm:pt modelId="{7064439C-79BF-4007-8305-264DEF8B33A8}" type="pres">
       <dgm:prSet presAssocID="{E5CE24D6-BB13-4FEA-83CB-7B761924780A}" presName="rectangle" presStyleLbl="revTx" presStyleIdx="0" presStyleCnt="1" custLinFactNeighborX="-1404" custLinFactNeighborY="-17500">
@@ -4594,9 +4616,7 @@
     </dgm:pt>
     <dgm:pt modelId="{012112E1-3F87-4D99-A816-1C48948C5C0D}" type="pres">
       <dgm:prSet presAssocID="{E5CE24D6-BB13-4FEA-83CB-7B761924780A}" presName="funnel" presStyleLbl="trAlignAcc1" presStyleIdx="0" presStyleCnt="1"/>
-      <dgm:spPr>
-        <a:ln w="38100"/>
-      </dgm:spPr>
+      <dgm:spPr/>
       <dgm:t>
         <a:bodyPr/>
         <a:lstStyle/>
@@ -5447,7 +5467,7 @@
           <a:avLst/>
         </a:prstGeom>
         <a:solidFill>
-          <a:schemeClr val="accent1">
+          <a:schemeClr val="dk2">
             <a:hueOff val="0"/>
             <a:satOff val="0"/>
             <a:lumOff val="0"/>
@@ -5456,7 +5476,7 @@
         </a:solidFill>
         <a:ln w="19050" cap="rnd" cmpd="sng" algn="ctr">
           <a:solidFill>
-            <a:schemeClr val="lt1">
+            <a:schemeClr val="lt2">
               <a:hueOff val="0"/>
               <a:satOff val="0"/>
               <a:lumOff val="0"/>
@@ -5524,7 +5544,7 @@
           <a:avLst/>
         </a:prstGeom>
         <a:solidFill>
-          <a:schemeClr val="accent1">
+          <a:schemeClr val="dk2">
             <a:tint val="60000"/>
             <a:hueOff val="0"/>
             <a:satOff val="0"/>
@@ -5590,7 +5610,7 @@
           <a:avLst/>
         </a:prstGeom>
         <a:solidFill>
-          <a:schemeClr val="accent1">
+          <a:schemeClr val="dk2">
             <a:hueOff val="0"/>
             <a:satOff val="0"/>
             <a:lumOff val="0"/>
@@ -5599,7 +5619,7 @@
         </a:solidFill>
         <a:ln w="19050" cap="rnd" cmpd="sng" algn="ctr">
           <a:solidFill>
-            <a:schemeClr val="lt1">
+            <a:schemeClr val="lt2">
               <a:hueOff val="0"/>
               <a:satOff val="0"/>
               <a:lumOff val="0"/>
@@ -5667,7 +5687,7 @@
           <a:avLst/>
         </a:prstGeom>
         <a:solidFill>
-          <a:schemeClr val="accent1">
+          <a:schemeClr val="dk2">
             <a:tint val="60000"/>
             <a:hueOff val="0"/>
             <a:satOff val="0"/>
@@ -5733,7 +5753,7 @@
           <a:avLst/>
         </a:prstGeom>
         <a:solidFill>
-          <a:schemeClr val="accent1">
+          <a:schemeClr val="dk2">
             <a:hueOff val="0"/>
             <a:satOff val="0"/>
             <a:lumOff val="0"/>
@@ -5742,7 +5762,7 @@
         </a:solidFill>
         <a:ln w="19050" cap="rnd" cmpd="sng" algn="ctr">
           <a:solidFill>
-            <a:schemeClr val="lt1">
+            <a:schemeClr val="lt2">
               <a:hueOff val="0"/>
               <a:satOff val="0"/>
               <a:lumOff val="0"/>
@@ -6246,7 +6266,7 @@
           <a:avLst/>
         </a:prstGeom>
         <a:solidFill>
-          <a:schemeClr val="accent1">
+          <a:schemeClr val="dk2">
             <a:tint val="50000"/>
             <a:alpha val="40000"/>
             <a:hueOff val="0"/>
@@ -6287,7 +6307,7 @@
           <a:avLst/>
         </a:prstGeom>
         <a:solidFill>
-          <a:schemeClr val="accent1">
+          <a:schemeClr val="dk2">
             <a:tint val="60000"/>
             <a:hueOff val="0"/>
             <a:satOff val="0"/>
@@ -6297,7 +6317,7 @@
         </a:solidFill>
         <a:ln w="19050" cap="rnd" cmpd="sng" algn="ctr">
           <a:solidFill>
-            <a:schemeClr val="lt1">
+            <a:schemeClr val="lt2">
               <a:hueOff val="0"/>
               <a:satOff val="0"/>
               <a:lumOff val="0"/>
@@ -6405,7 +6425,7 @@
           <a:avLst/>
         </a:prstGeom>
         <a:solidFill>
-          <a:schemeClr val="accent1">
+          <a:schemeClr val="dk2">
             <a:hueOff val="0"/>
             <a:satOff val="0"/>
             <a:lumOff val="0"/>
@@ -6414,7 +6434,7 @@
         </a:solidFill>
         <a:ln w="19050" cap="rnd" cmpd="sng" algn="ctr">
           <a:solidFill>
-            <a:schemeClr val="lt1">
+            <a:schemeClr val="lt2">
               <a:hueOff val="0"/>
               <a:satOff val="0"/>
               <a:lumOff val="0"/>
@@ -6482,7 +6502,7 @@
           <a:avLst/>
         </a:prstGeom>
         <a:solidFill>
-          <a:schemeClr val="accent1">
+          <a:schemeClr val="dk2">
             <a:hueOff val="0"/>
             <a:satOff val="0"/>
             <a:lumOff val="0"/>
@@ -6491,7 +6511,7 @@
         </a:solidFill>
         <a:ln w="19050" cap="rnd" cmpd="sng" algn="ctr">
           <a:solidFill>
-            <a:schemeClr val="lt1">
+            <a:schemeClr val="lt2">
               <a:hueOff val="0"/>
               <a:satOff val="0"/>
               <a:lumOff val="0"/>
@@ -6559,7 +6579,7 @@
           <a:avLst/>
         </a:prstGeom>
         <a:solidFill>
-          <a:schemeClr val="accent1">
+          <a:schemeClr val="dk2">
             <a:hueOff val="0"/>
             <a:satOff val="0"/>
             <a:lumOff val="0"/>
@@ -6568,7 +6588,7 @@
         </a:solidFill>
         <a:ln w="19050" cap="rnd" cmpd="sng" algn="ctr">
           <a:solidFill>
-            <a:schemeClr val="lt1">
+            <a:schemeClr val="lt2">
               <a:hueOff val="0"/>
               <a:satOff val="0"/>
               <a:lumOff val="0"/>
@@ -6636,7 +6656,7 @@
           <a:avLst/>
         </a:prstGeom>
         <a:solidFill>
-          <a:schemeClr val="lt1">
+          <a:schemeClr val="lt2">
             <a:alpha val="40000"/>
             <a:hueOff val="0"/>
             <a:satOff val="0"/>
@@ -6644,9 +6664,14 @@
             <a:alphaOff val="0"/>
           </a:schemeClr>
         </a:solidFill>
-        <a:ln w="38100" cap="rnd" cmpd="sng" algn="ctr">
+        <a:ln w="12700" cap="rnd" cmpd="sng" algn="ctr">
           <a:solidFill>
-            <a:scrgbClr r="0" g="0" b="0"/>
+            <a:schemeClr val="dk2">
+              <a:hueOff val="0"/>
+              <a:satOff val="0"/>
+              <a:lumOff val="0"/>
+              <a:alphaOff val="0"/>
+            </a:schemeClr>
           </a:solidFill>
           <a:prstDash val="solid"/>
         </a:ln>
@@ -12813,7 +12838,7 @@
           <a:p>
             <a:fld id="{DFB3EBE0-77A0-4731-B691-855A17DBDF42}" type="datetimeFigureOut">
               <a:rPr lang="en-US" smtClean="0"/>
-              <a:t>2/9/2016</a:t>
+              <a:t>2/18/2016</a:t>
             </a:fld>
             <a:endParaRPr lang="en-US" dirty="0"/>
           </a:p>
@@ -13910,7 +13935,7 @@
           <a:p>
             <a:fld id="{184BFEAB-C714-4D5C-A87B-1F5F147C2568}" type="datetime1">
               <a:rPr lang="en-US" smtClean="0"/>
-              <a:t>2/9/2016</a:t>
+              <a:t>2/18/2016</a:t>
             </a:fld>
             <a:endParaRPr lang="en-US" dirty="0"/>
           </a:p>
@@ -14161,7 +14186,7 @@
           <a:p>
             <a:fld id="{9A92CE8C-71B3-4605-911C-C2357D36982A}" type="datetime1">
               <a:rPr lang="en-US" smtClean="0"/>
-              <a:t>2/9/2016</a:t>
+              <a:t>2/18/2016</a:t>
             </a:fld>
             <a:endParaRPr lang="en-US" dirty="0"/>
           </a:p>
@@ -14475,7 +14500,7 @@
           <a:p>
             <a:fld id="{015B728D-6EF1-44C1-BE74-A3569BAB8718}" type="datetime1">
               <a:rPr lang="en-US" smtClean="0"/>
-              <a:t>2/9/2016</a:t>
+              <a:t>2/18/2016</a:t>
             </a:fld>
             <a:endParaRPr lang="en-US" dirty="0"/>
           </a:p>
@@ -14808,7 +14833,7 @@
           <a:p>
             <a:fld id="{60F7EA30-F0F4-4B8A-BDF6-A084B0E8ACEE}" type="datetime1">
               <a:rPr lang="en-US" smtClean="0"/>
-              <a:t>2/9/2016</a:t>
+              <a:t>2/18/2016</a:t>
             </a:fld>
             <a:endParaRPr lang="en-US" dirty="0"/>
           </a:p>
@@ -15122,7 +15147,7 @@
           <a:p>
             <a:fld id="{F0EF549A-B982-48AE-849E-ED681B3F14FB}" type="datetime1">
               <a:rPr lang="en-US" smtClean="0"/>
-              <a:t>2/9/2016</a:t>
+              <a:t>2/18/2016</a:t>
             </a:fld>
             <a:endParaRPr lang="en-US" dirty="0"/>
           </a:p>
@@ -15515,7 +15540,7 @@
           <a:p>
             <a:fld id="{4A5FF696-44D7-45D2-8329-B53AF65ECE1F}" type="datetime1">
               <a:rPr lang="en-US" smtClean="0"/>
-              <a:t>2/9/2016</a:t>
+              <a:t>2/18/2016</a:t>
             </a:fld>
             <a:endParaRPr lang="en-US" dirty="0"/>
           </a:p>
@@ -15685,7 +15710,7 @@
           <a:p>
             <a:fld id="{D4E746AE-4EBB-48DA-A9A3-3CF4B615F483}" type="datetime1">
               <a:rPr lang="en-US" smtClean="0"/>
-              <a:t>2/9/2016</a:t>
+              <a:t>2/18/2016</a:t>
             </a:fld>
             <a:endParaRPr lang="en-US" dirty="0"/>
           </a:p>
@@ -15865,7 +15890,7 @@
           <a:p>
             <a:fld id="{5B1FEA50-B64E-45AF-A77E-1C43A8E7D5C1}" type="datetime1">
               <a:rPr lang="en-US" smtClean="0"/>
-              <a:t>2/9/2016</a:t>
+              <a:t>2/18/2016</a:t>
             </a:fld>
             <a:endParaRPr lang="en-US" dirty="0"/>
           </a:p>
@@ -16035,7 +16060,7 @@
           <a:p>
             <a:fld id="{5EE2A00C-C0A5-41E4-A254-0933BFC59600}" type="datetime1">
               <a:rPr lang="en-US" smtClean="0"/>
-              <a:t>2/9/2016</a:t>
+              <a:t>2/18/2016</a:t>
             </a:fld>
             <a:endParaRPr lang="en-US" dirty="0"/>
           </a:p>
@@ -16282,7 +16307,7 @@
           <a:p>
             <a:fld id="{C0C43579-370D-44CE-9989-325065EBA03B}" type="datetime1">
               <a:rPr lang="en-US" smtClean="0"/>
-              <a:t>2/9/2016</a:t>
+              <a:t>2/18/2016</a:t>
             </a:fld>
             <a:endParaRPr lang="en-US" dirty="0"/>
           </a:p>
@@ -16514,7 +16539,7 @@
           <a:p>
             <a:fld id="{29D814BD-9B18-4EA5-94F4-F1600C017603}" type="datetime1">
               <a:rPr lang="en-US" smtClean="0"/>
-              <a:t>2/9/2016</a:t>
+              <a:t>2/18/2016</a:t>
             </a:fld>
             <a:endParaRPr lang="en-US" dirty="0"/>
           </a:p>
@@ -16888,7 +16913,7 @@
           <a:p>
             <a:fld id="{CE8DCA57-17F0-4F45-8BC0-620199D29CBA}" type="datetime1">
               <a:rPr lang="en-US" smtClean="0"/>
-              <a:t>2/9/2016</a:t>
+              <a:t>2/18/2016</a:t>
             </a:fld>
             <a:endParaRPr lang="en-US" dirty="0"/>
           </a:p>
@@ -17011,7 +17036,7 @@
           <a:p>
             <a:fld id="{5507D437-E8BB-44EC-A888-137BD165F5EF}" type="datetime1">
               <a:rPr lang="en-US" smtClean="0"/>
-              <a:t>2/9/2016</a:t>
+              <a:t>2/18/2016</a:t>
             </a:fld>
             <a:endParaRPr lang="en-US" dirty="0"/>
           </a:p>
@@ -17106,7 +17131,7 @@
           <a:p>
             <a:fld id="{CBF48491-12CB-4315-A294-ECCB7042AE60}" type="datetime1">
               <a:rPr lang="en-US" smtClean="0"/>
-              <a:t>2/9/2016</a:t>
+              <a:t>2/18/2016</a:t>
             </a:fld>
             <a:endParaRPr lang="en-US" dirty="0"/>
           </a:p>
@@ -17361,7 +17386,7 @@
           <a:p>
             <a:fld id="{71547693-6F8C-49B3-B3CF-B2F3832F2060}" type="datetime1">
               <a:rPr lang="en-US" smtClean="0"/>
-              <a:t>2/9/2016</a:t>
+              <a:t>2/18/2016</a:t>
             </a:fld>
             <a:endParaRPr lang="en-US" dirty="0"/>
           </a:p>
@@ -17666,7 +17691,7 @@
           <a:p>
             <a:fld id="{891130D9-17AA-473C-8916-496E81563AE5}" type="datetime1">
               <a:rPr lang="en-US" smtClean="0"/>
-              <a:t>2/9/2016</a:t>
+              <a:t>2/18/2016</a:t>
             </a:fld>
             <a:endParaRPr lang="en-US" dirty="0"/>
           </a:p>
@@ -18368,7 +18393,7 @@
           <a:p>
             <a:fld id="{D84A2DE9-5A38-4CE7-AE12-F8EA769E5C95}" type="datetime1">
               <a:rPr lang="en-US" smtClean="0"/>
-              <a:t>2/9/2016</a:t>
+              <a:t>2/18/2016</a:t>
             </a:fld>
             <a:endParaRPr lang="en-US" dirty="0"/>
           </a:p>
@@ -19525,11 +19550,18 @@
           <a:lstStyle/>
           <a:p>
             <a:r>
+              <a:rPr lang="en-US" b="1" dirty="0" smtClean="0">
+                <a:latin typeface="Consolas" panose="020B0609020204030204" pitchFamily="49" charset="0"/>
+                <a:cs typeface="Consolas" panose="020B0609020204030204" pitchFamily="49" charset="0"/>
+              </a:rPr>
+              <a:t>&gt;</a:t>
+            </a:r>
+            <a:r>
               <a:rPr lang="en-US" dirty="0" smtClean="0">
                 <a:latin typeface="Consolas" panose="020B0609020204030204" pitchFamily="49" charset="0"/>
                 <a:cs typeface="Consolas" panose="020B0609020204030204" pitchFamily="49" charset="0"/>
               </a:rPr>
-              <a:t>&gt; dnu restore</a:t>
+              <a:t> dnu restore</a:t>
             </a:r>
             <a:endParaRPr lang="en-US" dirty="0">
               <a:latin typeface="Consolas" panose="020B0609020204030204" pitchFamily="49" charset="0"/>
@@ -19581,11 +19613,18 @@
           <a:lstStyle/>
           <a:p>
             <a:r>
+              <a:rPr lang="en-US" b="1" dirty="0" smtClean="0">
+                <a:latin typeface="Consolas" panose="020B0609020204030204" pitchFamily="49" charset="0"/>
+                <a:cs typeface="Consolas" panose="020B0609020204030204" pitchFamily="49" charset="0"/>
+              </a:rPr>
+              <a:t>&gt;</a:t>
+            </a:r>
+            <a:r>
               <a:rPr lang="en-US" dirty="0" smtClean="0">
                 <a:latin typeface="Consolas" panose="020B0609020204030204" pitchFamily="49" charset="0"/>
                 <a:cs typeface="Consolas" panose="020B0609020204030204" pitchFamily="49" charset="0"/>
               </a:rPr>
-              <a:t>&gt; dnx web</a:t>
+              <a:t> dnx web</a:t>
             </a:r>
             <a:endParaRPr lang="en-US" dirty="0">
               <a:latin typeface="Consolas" panose="020B0609020204030204" pitchFamily="49" charset="0"/>
@@ -19908,13 +19947,11 @@
           <a:p>
             <a:r>
               <a:rPr lang="en-US" dirty="0" smtClean="0">
-                <a:latin typeface="Consolas" panose="020B0609020204030204" pitchFamily="49" charset="0"/>
                 <a:cs typeface="Consolas" panose="020B0609020204030204" pitchFamily="49" charset="0"/>
               </a:rPr>
               <a:t>Unused References</a:t>
             </a:r>
             <a:endParaRPr lang="en-US" dirty="0">
-              <a:latin typeface="Consolas" panose="020B0609020204030204" pitchFamily="49" charset="0"/>
               <a:cs typeface="Consolas" panose="020B0609020204030204" pitchFamily="49" charset="0"/>
             </a:endParaRPr>
           </a:p>
@@ -19964,13 +20001,11 @@
           <a:p>
             <a:r>
               <a:rPr lang="en-US" dirty="0" smtClean="0">
-                <a:latin typeface="Consolas" panose="020B0609020204030204" pitchFamily="49" charset="0"/>
                 <a:cs typeface="Consolas" panose="020B0609020204030204" pitchFamily="49" charset="0"/>
               </a:rPr>
               <a:t>IntelliSense</a:t>
             </a:r>
             <a:endParaRPr lang="en-US" dirty="0">
-              <a:latin typeface="Consolas" panose="020B0609020204030204" pitchFamily="49" charset="0"/>
               <a:cs typeface="Consolas" panose="020B0609020204030204" pitchFamily="49" charset="0"/>
             </a:endParaRPr>
           </a:p>
@@ -20064,13 +20099,11 @@
           <a:p>
             <a:r>
               <a:rPr lang="en-US" dirty="0" smtClean="0">
-                <a:latin typeface="Consolas" panose="020B0609020204030204" pitchFamily="49" charset="0"/>
                 <a:cs typeface="Consolas" panose="020B0609020204030204" pitchFamily="49" charset="0"/>
               </a:rPr>
               <a:t>Code Lens</a:t>
             </a:r>
             <a:endParaRPr lang="en-US" dirty="0">
-              <a:latin typeface="Consolas" panose="020B0609020204030204" pitchFamily="49" charset="0"/>
               <a:cs typeface="Consolas" panose="020B0609020204030204" pitchFamily="49" charset="0"/>
             </a:endParaRPr>
           </a:p>
@@ -20329,7 +20362,7 @@
           <p:nvPr>
             <p:extLst>
               <p:ext uri="{D42A27DB-BD31-4B8C-83A1-F6EECF244321}">
-                <p14:modId xmlns:p14="http://schemas.microsoft.com/office/powerpoint/2010/main" val="202738643"/>
+                <p14:modId xmlns:p14="http://schemas.microsoft.com/office/powerpoint/2010/main" val="3174782317"/>
               </p:ext>
             </p:extLst>
           </p:nvPr>
@@ -21155,7 +21188,7 @@
           <p:nvPr>
             <p:extLst>
               <p:ext uri="{D42A27DB-BD31-4B8C-83A1-F6EECF244321}">
-                <p14:modId xmlns:p14="http://schemas.microsoft.com/office/powerpoint/2010/main" val="3909345757"/>
+                <p14:modId xmlns:p14="http://schemas.microsoft.com/office/powerpoint/2010/main" val="1692196779"/>
               </p:ext>
             </p:extLst>
           </p:nvPr>
@@ -21244,20 +21277,40 @@
           <a:lstStyle/>
           <a:p>
             <a:r>
-              <a:rPr lang="en-US" sz="2000" dirty="0" smtClean="0"/>
-              <a:t>DNVM (.NET Version Manager)</a:t>
+              <a:rPr lang="en-US" sz="2000" b="1" dirty="0" smtClean="0"/>
+              <a:t>DNVM</a:t>
             </a:r>
-          </a:p>
-          <a:p>
             <a:r>
               <a:rPr lang="en-US" sz="2000" dirty="0" smtClean="0"/>
-              <a:t>DNX (.NET Execution Environment)</a:t>
+              <a:t> (.NET Version Manager)</a:t>
             </a:r>
           </a:p>
           <a:p>
+            <a:r>
+              <a:rPr lang="en-US" sz="2000" b="1" dirty="0" smtClean="0"/>
+              <a:t>DNX</a:t>
+            </a:r>
+            <a:r>
+              <a:rPr lang="en-US" sz="2000" dirty="0" smtClean="0"/>
+              <a:t> </a:t>
+            </a:r>
+            <a:r>
+              <a:rPr lang="en-US" sz="2000" dirty="0" smtClean="0"/>
+              <a:t>(.</a:t>
+            </a:r>
+            <a:r>
+              <a:rPr lang="en-US" sz="2000" dirty="0" smtClean="0"/>
+              <a:t>NET Execution Environment)</a:t>
+            </a:r>
+          </a:p>
+          <a:p>
+            <a:r>
+              <a:rPr lang="en-US" sz="2000" b="1" dirty="0"/>
+              <a:t>DNU</a:t>
+            </a:r>
             <a:r>
               <a:rPr lang="en-US" sz="2000" dirty="0"/>
-              <a:t>DNU (.NET Development </a:t>
+              <a:t> (.NET Development </a:t>
             </a:r>
             <a:r>
               <a:rPr lang="en-US" sz="2000" dirty="0" smtClean="0"/>
@@ -21276,19 +21329,28 @@
           <a:p>
             <a:r>
               <a:rPr lang="en-US" sz="2000" dirty="0" smtClean="0"/>
-              <a:t>Installation of DN* Tooling</a:t>
+              <a:t>Installation of DN* </a:t>
             </a:r>
             <a:r>
-              <a:rPr lang="en-US" sz="2000" dirty="0"/>
-              <a:t>: </a:t>
+              <a:rPr lang="en-US" sz="2000" dirty="0" smtClean="0"/>
+              <a:t>Tooling:</a:t>
+            </a:r>
+          </a:p>
+          <a:p>
+            <a:pPr lvl="1"/>
+            <a:r>
+              <a:rPr lang="en-US" sz="1800" dirty="0" smtClean="0">
+                <a:hlinkClick r:id="rId2"/>
+              </a:rPr>
+              <a:t>https</a:t>
             </a:r>
             <a:r>
-              <a:rPr lang="en-US" sz="2000" dirty="0">
+              <a:rPr lang="en-US" sz="1800" dirty="0">
                 <a:hlinkClick r:id="rId2"/>
               </a:rPr>
-              <a:t>https://get.asp.net/</a:t>
+              <a:t>://get.asp.net/</a:t>
             </a:r>
-            <a:endParaRPr lang="en-US" sz="2000" dirty="0"/>
+            <a:endParaRPr lang="en-US" sz="1800" dirty="0"/>
           </a:p>
           <a:p>
             <a:pPr marL="0" indent="0">
@@ -21432,7 +21494,7 @@
           <p:nvPr>
             <p:extLst>
               <p:ext uri="{D42A27DB-BD31-4B8C-83A1-F6EECF244321}">
-                <p14:modId xmlns:p14="http://schemas.microsoft.com/office/powerpoint/2010/main" val="1464352553"/>
+                <p14:modId xmlns:p14="http://schemas.microsoft.com/office/powerpoint/2010/main" val="1650707984"/>
               </p:ext>
             </p:extLst>
           </p:nvPr>
@@ -21540,14 +21602,14 @@
             <p:ph idx="1"/>
             <p:extLst>
               <p:ext uri="{D42A27DB-BD31-4B8C-83A1-F6EECF244321}">
-                <p14:modId xmlns:p14="http://schemas.microsoft.com/office/powerpoint/2010/main" val="152673802"/>
+                <p14:modId xmlns:p14="http://schemas.microsoft.com/office/powerpoint/2010/main" val="2338640179"/>
               </p:ext>
             </p:extLst>
           </p:nvPr>
         </p:nvGraphicFramePr>
         <p:xfrm>
           <a:off x="2104586" y="1979005"/>
-          <a:ext cx="5761848" cy="3962400"/>
+          <a:ext cx="6194288" cy="4267200"/>
         </p:xfrm>
         <a:graphic>
           <a:graphicData uri="http://schemas.openxmlformats.org/drawingml/2006/table">
@@ -21556,14 +21618,14 @@
                 <a:tableStyleId>{5C22544A-7EE6-4342-B048-85BDC9FD1C3A}</a:tableStyleId>
               </a:tblPr>
               <a:tblGrid>
-                <a:gridCol w="2499839">
+                <a:gridCol w="2687458">
                   <a:extLst>
                     <a:ext uri="{9D8B030D-6E8A-4147-A177-3AD203B41FA5}">
                       <a16:colId xmlns:a16="http://schemas.microsoft.com/office/drawing/2014/main" val="769573976"/>
                     </a:ext>
                   </a:extLst>
                 </a:gridCol>
-                <a:gridCol w="3262009">
+                <a:gridCol w="3506830">
                   <a:extLst>
                     <a:ext uri="{9D8B030D-6E8A-4147-A177-3AD203B41FA5}">
                       <a16:colId xmlns:a16="http://schemas.microsoft.com/office/drawing/2014/main" val="354105347"/>
@@ -21578,10 +21640,10 @@
                     <a:lstStyle/>
                     <a:p>
                       <a:r>
-                        <a:rPr lang="en-US" sz="2000" dirty="0" smtClean="0"/>
+                        <a:rPr lang="en-US" sz="2200" dirty="0" smtClean="0"/>
                         <a:t>Old</a:t>
                       </a:r>
-                      <a:endParaRPr lang="en-US" sz="2000" dirty="0"/>
+                      <a:endParaRPr lang="en-US" sz="2200" dirty="0"/>
                     </a:p>
                   </a:txBody>
                   <a:tcPr/>
@@ -21592,10 +21654,10 @@
                     <a:lstStyle/>
                     <a:p>
                       <a:r>
-                        <a:rPr lang="en-US" sz="2000" dirty="0" smtClean="0"/>
+                        <a:rPr lang="en-US" sz="2200" dirty="0" smtClean="0"/>
                         <a:t>New</a:t>
                       </a:r>
-                      <a:endParaRPr lang="en-US" sz="2000" dirty="0"/>
+                      <a:endParaRPr lang="en-US" sz="2200" dirty="0"/>
                     </a:p>
                   </a:txBody>
                   <a:tcPr/>
@@ -21613,12 +21675,12 @@
                     <a:lstStyle/>
                     <a:p>
                       <a:r>
-                        <a:rPr lang="en-US" sz="2000" dirty="0" smtClean="0">
+                        <a:rPr lang="en-US" sz="2200" dirty="0" smtClean="0">
                           <a:latin typeface="Consolas" panose="020B0609020204030204" pitchFamily="49" charset="0"/>
                         </a:rPr>
                         <a:t>dnu restore</a:t>
                       </a:r>
-                      <a:endParaRPr lang="en-US" sz="2000" dirty="0">
+                      <a:endParaRPr lang="en-US" sz="2200" dirty="0">
                         <a:latin typeface="Consolas" panose="020B0609020204030204" pitchFamily="49" charset="0"/>
                       </a:endParaRPr>
                     </a:p>
@@ -21631,12 +21693,12 @@
                     <a:lstStyle/>
                     <a:p>
                       <a:r>
-                        <a:rPr lang="en-US" sz="2000" dirty="0" smtClean="0">
+                        <a:rPr lang="en-US" sz="2200" dirty="0" smtClean="0">
                           <a:latin typeface="Consolas" panose="020B0609020204030204" pitchFamily="49" charset="0"/>
                         </a:rPr>
                         <a:t>dotnet restore</a:t>
                       </a:r>
-                      <a:endParaRPr lang="en-US" sz="2000" dirty="0">
+                      <a:endParaRPr lang="en-US" sz="2200" dirty="0">
                         <a:latin typeface="Consolas" panose="020B0609020204030204" pitchFamily="49" charset="0"/>
                       </a:endParaRPr>
                     </a:p>
@@ -21656,12 +21718,12 @@
                     <a:lstStyle/>
                     <a:p>
                       <a:r>
-                        <a:rPr lang="en-US" sz="2000" dirty="0" smtClean="0">
+                        <a:rPr lang="en-US" sz="2200" dirty="0" smtClean="0">
                           <a:latin typeface="Consolas" panose="020B0609020204030204" pitchFamily="49" charset="0"/>
                         </a:rPr>
                         <a:t>dnu pack</a:t>
                       </a:r>
-                      <a:endParaRPr lang="en-US" sz="2000" dirty="0">
+                      <a:endParaRPr lang="en-US" sz="2200" dirty="0">
                         <a:latin typeface="Consolas" panose="020B0609020204030204" pitchFamily="49" charset="0"/>
                       </a:endParaRPr>
                     </a:p>
@@ -21674,12 +21736,12 @@
                     <a:lstStyle/>
                     <a:p>
                       <a:r>
-                        <a:rPr lang="en-US" sz="2000" dirty="0" smtClean="0">
+                        <a:rPr lang="en-US" sz="2200" dirty="0" smtClean="0">
                           <a:latin typeface="Consolas" panose="020B0609020204030204" pitchFamily="49" charset="0"/>
                         </a:rPr>
                         <a:t>dotnet pack</a:t>
                       </a:r>
-                      <a:endParaRPr lang="en-US" sz="2000" dirty="0">
+                      <a:endParaRPr lang="en-US" sz="2200" dirty="0">
                         <a:latin typeface="Consolas" panose="020B0609020204030204" pitchFamily="49" charset="0"/>
                       </a:endParaRPr>
                     </a:p>
@@ -21699,12 +21761,12 @@
                     <a:lstStyle/>
                     <a:p>
                       <a:r>
-                        <a:rPr lang="en-US" sz="2000" dirty="0" smtClean="0">
+                        <a:rPr lang="en-US" sz="2200" dirty="0" smtClean="0">
                           <a:latin typeface="Consolas" panose="020B0609020204030204" pitchFamily="49" charset="0"/>
                         </a:rPr>
                         <a:t>dnu build</a:t>
                       </a:r>
-                      <a:endParaRPr lang="en-US" sz="2000" dirty="0">
+                      <a:endParaRPr lang="en-US" sz="2200" dirty="0">
                         <a:latin typeface="Consolas" panose="020B0609020204030204" pitchFamily="49" charset="0"/>
                       </a:endParaRPr>
                     </a:p>
@@ -21717,12 +21779,12 @@
                     <a:lstStyle/>
                     <a:p>
                       <a:r>
-                        <a:rPr lang="en-US" sz="2000" dirty="0" smtClean="0">
+                        <a:rPr lang="en-US" sz="2200" dirty="0" smtClean="0">
                           <a:latin typeface="Consolas" panose="020B0609020204030204" pitchFamily="49" charset="0"/>
                         </a:rPr>
                         <a:t>dotnet compile/build</a:t>
                       </a:r>
-                      <a:endParaRPr lang="en-US" sz="2000" dirty="0">
+                      <a:endParaRPr lang="en-US" sz="2200" dirty="0">
                         <a:latin typeface="Consolas" panose="020B0609020204030204" pitchFamily="49" charset="0"/>
                       </a:endParaRPr>
                     </a:p>
@@ -21742,12 +21804,12 @@
                     <a:lstStyle/>
                     <a:p>
                       <a:r>
-                        <a:rPr lang="en-US" sz="2000" dirty="0" smtClean="0">
+                        <a:rPr lang="en-US" sz="2200" dirty="0" smtClean="0">
                           <a:latin typeface="Consolas" panose="020B0609020204030204" pitchFamily="49" charset="0"/>
                         </a:rPr>
                         <a:t>dnu publish</a:t>
                       </a:r>
-                      <a:endParaRPr lang="en-US" sz="2000" dirty="0">
+                      <a:endParaRPr lang="en-US" sz="2200" dirty="0">
                         <a:latin typeface="Consolas" panose="020B0609020204030204" pitchFamily="49" charset="0"/>
                       </a:endParaRPr>
                     </a:p>
@@ -21760,18 +21822,18 @@
                     <a:lstStyle/>
                     <a:p>
                       <a:r>
-                        <a:rPr lang="en-US" sz="2000" dirty="0" smtClean="0">
+                        <a:rPr lang="en-US" sz="2200" dirty="0" smtClean="0">
                           <a:latin typeface="Consolas" panose="020B0609020204030204" pitchFamily="49" charset="0"/>
                         </a:rPr>
                         <a:t>dotnet</a:t>
                       </a:r>
                       <a:r>
-                        <a:rPr lang="en-US" sz="2000" baseline="0" dirty="0" smtClean="0">
+                        <a:rPr lang="en-US" sz="2200" baseline="0" dirty="0" smtClean="0">
                           <a:latin typeface="Consolas" panose="020B0609020204030204" pitchFamily="49" charset="0"/>
                         </a:rPr>
                         <a:t> publish</a:t>
                       </a:r>
-                      <a:endParaRPr lang="en-US" sz="2000" dirty="0">
+                      <a:endParaRPr lang="en-US" sz="2200" dirty="0">
                         <a:latin typeface="Consolas" panose="020B0609020204030204" pitchFamily="49" charset="0"/>
                       </a:endParaRPr>
                     </a:p>
@@ -21791,12 +21853,12 @@
                     <a:lstStyle/>
                     <a:p>
                       <a:r>
-                        <a:rPr lang="en-US" sz="2000" dirty="0" smtClean="0">
+                        <a:rPr lang="en-US" sz="2200" dirty="0" smtClean="0">
                           <a:latin typeface="Consolas" panose="020B0609020204030204" pitchFamily="49" charset="0"/>
                         </a:rPr>
                         <a:t>dnu run</a:t>
                       </a:r>
-                      <a:endParaRPr lang="en-US" sz="2000" dirty="0">
+                      <a:endParaRPr lang="en-US" sz="2200" dirty="0">
                         <a:latin typeface="Consolas" panose="020B0609020204030204" pitchFamily="49" charset="0"/>
                       </a:endParaRPr>
                     </a:p>
@@ -21809,12 +21871,12 @@
                     <a:lstStyle/>
                     <a:p>
                       <a:r>
-                        <a:rPr lang="en-US" sz="2000" dirty="0" smtClean="0">
+                        <a:rPr lang="en-US" sz="2200" dirty="0" smtClean="0">
                           <a:latin typeface="Consolas" panose="020B0609020204030204" pitchFamily="49" charset="0"/>
                         </a:rPr>
                         <a:t>dotnet run</a:t>
                       </a:r>
-                      <a:endParaRPr lang="en-US" sz="2000" dirty="0">
+                      <a:endParaRPr lang="en-US" sz="2200" dirty="0">
                         <a:latin typeface="Consolas" panose="020B0609020204030204" pitchFamily="49" charset="0"/>
                       </a:endParaRPr>
                     </a:p>
@@ -21834,12 +21896,12 @@
                     <a:lstStyle/>
                     <a:p>
                       <a:r>
-                        <a:rPr lang="en-US" sz="2000" dirty="0" smtClean="0">
+                        <a:rPr lang="en-US" sz="2200" dirty="0" smtClean="0">
                           <a:latin typeface="Consolas" panose="020B0609020204030204" pitchFamily="49" charset="0"/>
                         </a:rPr>
                         <a:t>dnx-watch</a:t>
                       </a:r>
-                      <a:endParaRPr lang="en-US" sz="2000" dirty="0">
+                      <a:endParaRPr lang="en-US" sz="2200" dirty="0">
                         <a:latin typeface="Consolas" panose="020B0609020204030204" pitchFamily="49" charset="0"/>
                       </a:endParaRPr>
                     </a:p>
@@ -21852,12 +21914,12 @@
                     <a:lstStyle/>
                     <a:p>
                       <a:r>
-                        <a:rPr lang="en-US" sz="2000" dirty="0" smtClean="0">
+                        <a:rPr lang="en-US" sz="2200" dirty="0" smtClean="0">
                           <a:latin typeface="Consolas" panose="020B0609020204030204" pitchFamily="49" charset="0"/>
                         </a:rPr>
                         <a:t>dotnet watch</a:t>
                       </a:r>
-                      <a:endParaRPr lang="en-US" sz="2000" dirty="0">
+                      <a:endParaRPr lang="en-US" sz="2200" dirty="0">
                         <a:latin typeface="Consolas" panose="020B0609020204030204" pitchFamily="49" charset="0"/>
                       </a:endParaRPr>
                     </a:p>
@@ -21877,18 +21939,18 @@
                     <a:lstStyle/>
                     <a:p>
                       <a:r>
-                        <a:rPr lang="en-US" sz="2000" dirty="0" smtClean="0">
+                        <a:rPr lang="en-US" sz="2200" dirty="0" smtClean="0">
                           <a:latin typeface="Consolas" panose="020B0609020204030204" pitchFamily="49" charset="0"/>
                         </a:rPr>
                         <a:t>dnx</a:t>
                       </a:r>
                       <a:r>
-                        <a:rPr lang="en-US" sz="2000" baseline="0" dirty="0" smtClean="0">
+                        <a:rPr lang="en-US" sz="2200" baseline="0" dirty="0" smtClean="0">
                           <a:latin typeface="Consolas" panose="020B0609020204030204" pitchFamily="49" charset="0"/>
                         </a:rPr>
                         <a:t> ef</a:t>
                       </a:r>
-                      <a:endParaRPr lang="en-US" sz="2000" dirty="0">
+                      <a:endParaRPr lang="en-US" sz="2200" dirty="0">
                         <a:latin typeface="Consolas" panose="020B0609020204030204" pitchFamily="49" charset="0"/>
                       </a:endParaRPr>
                     </a:p>
@@ -21901,12 +21963,12 @@
                     <a:lstStyle/>
                     <a:p>
                       <a:r>
-                        <a:rPr lang="en-US" sz="2000" dirty="0" smtClean="0">
+                        <a:rPr lang="en-US" sz="2200" dirty="0" smtClean="0">
                           <a:latin typeface="Consolas" panose="020B0609020204030204" pitchFamily="49" charset="0"/>
                         </a:rPr>
                         <a:t>dotnet ef</a:t>
                       </a:r>
-                      <a:endParaRPr lang="en-US" sz="2000" dirty="0">
+                      <a:endParaRPr lang="en-US" sz="2200" dirty="0">
                         <a:latin typeface="Consolas" panose="020B0609020204030204" pitchFamily="49" charset="0"/>
                       </a:endParaRPr>
                     </a:p>
@@ -21926,12 +21988,12 @@
                     <a:lstStyle/>
                     <a:p>
                       <a:r>
-                        <a:rPr lang="en-US" sz="2000" dirty="0" smtClean="0">
+                        <a:rPr lang="en-US" sz="2200" dirty="0" smtClean="0">
                           <a:latin typeface="Consolas" panose="020B0609020204030204" pitchFamily="49" charset="0"/>
                         </a:rPr>
                         <a:t>dnx test</a:t>
                       </a:r>
-                      <a:endParaRPr lang="en-US" sz="2000" dirty="0">
+                      <a:endParaRPr lang="en-US" sz="2200" dirty="0">
                         <a:latin typeface="Consolas" panose="020B0609020204030204" pitchFamily="49" charset="0"/>
                       </a:endParaRPr>
                     </a:p>
@@ -21944,12 +22006,12 @@
                     <a:lstStyle/>
                     <a:p>
                       <a:r>
-                        <a:rPr lang="en-US" sz="2000" dirty="0" smtClean="0">
+                        <a:rPr lang="en-US" sz="2200" dirty="0" smtClean="0">
                           <a:latin typeface="Consolas" panose="020B0609020204030204" pitchFamily="49" charset="0"/>
                         </a:rPr>
                         <a:t>dotnet test</a:t>
                       </a:r>
-                      <a:endParaRPr lang="en-US" sz="2000" dirty="0">
+                      <a:endParaRPr lang="en-US" sz="2200" dirty="0">
                         <a:latin typeface="Consolas" panose="020B0609020204030204" pitchFamily="49" charset="0"/>
                       </a:endParaRPr>
                     </a:p>
@@ -21969,12 +22031,12 @@
                     <a:lstStyle/>
                     <a:p>
                       <a:r>
-                        <a:rPr lang="en-US" sz="2000" dirty="0" smtClean="0">
+                        <a:rPr lang="en-US" sz="2200" dirty="0" smtClean="0">
                           <a:latin typeface="Consolas" panose="020B0609020204030204" pitchFamily="49" charset="0"/>
                         </a:rPr>
                         <a:t>user-secrets</a:t>
                       </a:r>
-                      <a:endParaRPr lang="en-US" sz="2000" dirty="0">
+                      <a:endParaRPr lang="en-US" sz="2200" dirty="0">
                         <a:latin typeface="Consolas" panose="020B0609020204030204" pitchFamily="49" charset="0"/>
                       </a:endParaRPr>
                     </a:p>
@@ -21987,12 +22049,12 @@
                     <a:lstStyle/>
                     <a:p>
                       <a:r>
-                        <a:rPr lang="en-US" sz="2000" dirty="0" smtClean="0">
+                        <a:rPr lang="en-US" sz="2200" dirty="0" smtClean="0">
                           <a:latin typeface="Consolas" panose="020B0609020204030204" pitchFamily="49" charset="0"/>
                         </a:rPr>
                         <a:t>dotnet user-secrets</a:t>
                       </a:r>
-                      <a:endParaRPr lang="en-US" sz="2000" dirty="0">
+                      <a:endParaRPr lang="en-US" sz="2200" dirty="0">
                         <a:latin typeface="Consolas" panose="020B0609020204030204" pitchFamily="49" charset="0"/>
                       </a:endParaRPr>
                     </a:p>
@@ -22089,7 +22151,28 @@
                 <a:latin typeface="Consolas" panose="020B0609020204030204" pitchFamily="49" charset="0"/>
                 <a:cs typeface="Consolas" panose="020B0609020204030204" pitchFamily="49" charset="0"/>
               </a:rPr>
-              <a:t> dotnet CLI Demo</a:t>
+              <a:t> </a:t>
+            </a:r>
+            <a:r>
+              <a:rPr lang="en-US" dirty="0" err="1" smtClean="0">
+                <a:latin typeface="Consolas" panose="020B0609020204030204" pitchFamily="49" charset="0"/>
+                <a:cs typeface="Consolas" panose="020B0609020204030204" pitchFamily="49" charset="0"/>
+              </a:rPr>
+              <a:t>dotnet</a:t>
+            </a:r>
+            <a:r>
+              <a:rPr lang="en-US" dirty="0" smtClean="0">
+                <a:latin typeface="Consolas" panose="020B0609020204030204" pitchFamily="49" charset="0"/>
+                <a:cs typeface="Consolas" panose="020B0609020204030204" pitchFamily="49" charset="0"/>
+              </a:rPr>
+              <a:t> </a:t>
+            </a:r>
+            <a:r>
+              <a:rPr lang="en-US" dirty="0" smtClean="0">
+                <a:latin typeface="Consolas" panose="020B0609020204030204" pitchFamily="49" charset="0"/>
+                <a:cs typeface="Consolas" panose="020B0609020204030204" pitchFamily="49" charset="0"/>
+              </a:rPr>
+              <a:t>Demo</a:t>
             </a:r>
             <a:r>
               <a:rPr lang="en-US" dirty="0" smtClean="0"/>
@@ -22197,7 +22280,7 @@
         </p:blipFill>
         <p:spPr>
           <a:xfrm>
-            <a:off x="5382678" y="3873934"/>
+            <a:off x="4302024" y="3873934"/>
             <a:ext cx="568024" cy="568024"/>
           </a:xfrm>
           <a:prstGeom prst="rect">
@@ -23594,23 +23677,55 @@
           <a:p>
             <a:pPr lvl="1"/>
             <a:r>
-              <a:rPr lang="en-US" sz="1800" dirty="0" smtClean="0"/>
-              <a:t>%USERPROFILE%</a:t>
+              <a:rPr lang="en-US" sz="1800" dirty="0" smtClean="0">
+                <a:latin typeface="Consolas" panose="020B0609020204030204" pitchFamily="49" charset="0"/>
+                <a:cs typeface="Consolas" panose="020B0609020204030204" pitchFamily="49" charset="0"/>
+              </a:rPr>
+              <a:t>%</a:t>
             </a:r>
             <a:r>
-              <a:rPr lang="en-US" sz="1800" b="1" dirty="0" smtClean="0"/>
+              <a:rPr lang="en-US" sz="1800" dirty="0" smtClean="0">
+                <a:latin typeface="Consolas" panose="020B0609020204030204" pitchFamily="49" charset="0"/>
+                <a:cs typeface="Consolas" panose="020B0609020204030204" pitchFamily="49" charset="0"/>
+              </a:rPr>
+              <a:t>USERPROFILE%</a:t>
+            </a:r>
+            <a:r>
+              <a:rPr lang="en-US" sz="2000" b="1" dirty="0" smtClean="0">
+                <a:solidFill>
+                  <a:schemeClr val="tx2">
+                    <a:lumMod val="75000"/>
+                  </a:schemeClr>
+                </a:solidFill>
+                <a:latin typeface="Consolas" panose="020B0609020204030204" pitchFamily="49" charset="0"/>
+                <a:cs typeface="Consolas" panose="020B0609020204030204" pitchFamily="49" charset="0"/>
+              </a:rPr>
               <a:t>\</a:t>
             </a:r>
             <a:r>
-              <a:rPr lang="en-US" sz="1800" dirty="0" smtClean="0"/>
+              <a:rPr lang="en-US" sz="1800" dirty="0" smtClean="0">
+                <a:latin typeface="Consolas" panose="020B0609020204030204" pitchFamily="49" charset="0"/>
+                <a:cs typeface="Consolas" panose="020B0609020204030204" pitchFamily="49" charset="0"/>
+              </a:rPr>
               <a:t>.dnx</a:t>
             </a:r>
             <a:r>
-              <a:rPr lang="en-US" sz="1800" b="1" dirty="0" smtClean="0"/>
+              <a:rPr lang="en-US" sz="2000" b="1" dirty="0" smtClean="0">
+                <a:solidFill>
+                  <a:schemeClr val="tx2">
+                    <a:lumMod val="75000"/>
+                  </a:schemeClr>
+                </a:solidFill>
+                <a:latin typeface="Consolas" panose="020B0609020204030204" pitchFamily="49" charset="0"/>
+                <a:cs typeface="Consolas" panose="020B0609020204030204" pitchFamily="49" charset="0"/>
+              </a:rPr>
               <a:t>\</a:t>
             </a:r>
             <a:r>
-              <a:rPr lang="en-US" sz="1800" dirty="0" smtClean="0"/>
+              <a:rPr lang="en-US" sz="1800" dirty="0" smtClean="0">
+                <a:latin typeface="Consolas" panose="020B0609020204030204" pitchFamily="49" charset="0"/>
+                <a:cs typeface="Consolas" panose="020B0609020204030204" pitchFamily="49" charset="0"/>
+              </a:rPr>
               <a:t>runtimes</a:t>
             </a:r>
           </a:p>
@@ -23713,6 +23828,47 @@
           </a:prstGeom>
         </p:spPr>
       </p:pic>
+      <p:sp>
+        <p:nvSpPr>
+          <p:cNvPr id="6" name="Rectangle 5"/>
+          <p:cNvSpPr/>
+          <p:nvPr/>
+        </p:nvSpPr>
+        <p:spPr>
+          <a:xfrm>
+            <a:off x="1427018" y="2867890"/>
+            <a:ext cx="3588327" cy="415637"/>
+          </a:xfrm>
+          <a:prstGeom prst="rect">
+            <a:avLst/>
+          </a:prstGeom>
+          <a:noFill/>
+        </p:spPr>
+        <p:style>
+          <a:lnRef idx="2">
+            <a:schemeClr val="accent1">
+              <a:shade val="50000"/>
+            </a:schemeClr>
+          </a:lnRef>
+          <a:fillRef idx="1">
+            <a:schemeClr val="accent1"/>
+          </a:fillRef>
+          <a:effectRef idx="0">
+            <a:schemeClr val="accent1"/>
+          </a:effectRef>
+          <a:fontRef idx="minor">
+            <a:schemeClr val="lt1"/>
+          </a:fontRef>
+        </p:style>
+        <p:txBody>
+          <a:bodyPr rtlCol="0" anchor="ctr"/>
+          <a:lstStyle/>
+          <a:p>
+            <a:pPr algn="ctr"/>
+            <a:endParaRPr lang="en-US"/>
+          </a:p>
+        </p:txBody>
+      </p:sp>
     </p:spTree>
     <p:extLst>
       <p:ext uri="{BB962C8B-B14F-4D97-AF65-F5344CB8AC3E}">
@@ -24498,8 +24654,13 @@
           <a:p>
             <a:r>
               <a:rPr lang="en-US" sz="2200" dirty="0" smtClean="0"/>
-              <a:t>Built by ASP.NET team to make framework:</a:t>
+              <a:t>Built by ASP.NET team to make </a:t>
             </a:r>
+            <a:r>
+              <a:rPr lang="en-US" sz="2200" dirty="0" smtClean="0"/>
+              <a:t>framework…</a:t>
+            </a:r>
+            <a:endParaRPr lang="en-US" sz="2200" dirty="0" smtClean="0"/>
           </a:p>
           <a:p>
             <a:pPr marL="800100" lvl="1" indent="-342900">
@@ -24515,7 +24676,15 @@
             <a:pPr lvl="2"/>
             <a:r>
               <a:rPr lang="en-US" sz="1700" dirty="0" smtClean="0"/>
-              <a:t>Windows, Mac OSX, Linux</a:t>
+              <a:t>Windows, Mac </a:t>
+            </a:r>
+            <a:r>
+              <a:rPr lang="en-US" sz="1700" dirty="0" smtClean="0"/>
+              <a:t>OS X</a:t>
+            </a:r>
+            <a:r>
+              <a:rPr lang="en-US" sz="1700" dirty="0" smtClean="0"/>
+              <a:t>, Linux</a:t>
             </a:r>
           </a:p>
           <a:p>

</xml_diff>

<commit_message>
Replace incorrect ASP.NET Core references with ASP.NET 5
</commit_message>
<xml_diff>
--- a/Getting Started with ASP.NET Core 1.0 in VS Code - SFLCC.pptx
+++ b/Getting Started with ASP.NET Core 1.0 in VS Code - SFLCC.pptx
@@ -3294,10 +3294,9 @@
         <a:lstStyle/>
         <a:p>
           <a:r>
-            <a:rPr lang="en-US" dirty="0" smtClean="0"/>
-            <a:t>ASP.NET Core App</a:t>
+            <a:rPr lang="en-US" dirty="0"/>
+            <a:t>ASP.NET 5 App</a:t>
           </a:r>
-          <a:endParaRPr lang="en-US" dirty="0"/>
         </a:p>
       </dgm:t>
     </dgm:pt>
@@ -3325,18 +3324,13 @@
         <a:p>
           <a:pPr algn="ctr"/>
           <a:r>
-            <a:rPr lang="en-US" b="1" dirty="0" smtClean="0">
+            <a:rPr lang="en-US" b="1" dirty="0">
               <a:solidFill>
                 <a:schemeClr val="bg1"/>
               </a:solidFill>
             </a:rPr>
             <a:t>DNX</a:t>
           </a:r>
-          <a:endParaRPr lang="en-US" b="1" dirty="0">
-            <a:solidFill>
-              <a:schemeClr val="bg1"/>
-            </a:solidFill>
-          </a:endParaRPr>
         </a:p>
       </dgm:t>
     </dgm:pt>
@@ -3348,10 +3342,9 @@
         <a:lstStyle/>
         <a:p>
           <a:r>
-            <a:rPr lang="en-US" dirty="0" smtClean="0"/>
+            <a:rPr lang="en-US" dirty="0"/>
             <a:t>.NET Framework</a:t>
           </a:r>
-          <a:endParaRPr lang="en-US" dirty="0"/>
         </a:p>
       </dgm:t>
     </dgm:pt>
@@ -3376,10 +3369,9 @@
         <a:lstStyle/>
         <a:p>
           <a:r>
-            <a:rPr lang="en-US" dirty="0" smtClean="0"/>
+            <a:rPr lang="en-US" dirty="0"/>
             <a:t>dnx451, dnx452, dnx46</a:t>
           </a:r>
-          <a:endParaRPr lang="en-US" dirty="0"/>
         </a:p>
       </dgm:t>
     </dgm:pt>
@@ -3391,10 +3383,9 @@
         <a:lstStyle/>
         <a:p>
           <a:r>
-            <a:rPr lang="en-US" dirty="0" smtClean="0"/>
+            <a:rPr lang="en-US" dirty="0"/>
             <a:t>.NET Core</a:t>
           </a:r>
-          <a:endParaRPr lang="en-US" dirty="0"/>
         </a:p>
       </dgm:t>
     </dgm:pt>
@@ -3419,10 +3410,9 @@
         <a:lstStyle/>
         <a:p>
           <a:r>
-            <a:rPr lang="en-US" dirty="0" smtClean="0"/>
+            <a:rPr lang="en-US" dirty="0"/>
             <a:t>dnxcore50</a:t>
           </a:r>
-          <a:endParaRPr lang="en-US" dirty="0"/>
         </a:p>
       </dgm:t>
     </dgm:pt>
@@ -3434,10 +3424,9 @@
         <a:lstStyle/>
         <a:p>
           <a:r>
-            <a:rPr lang="en-US" dirty="0" smtClean="0"/>
+            <a:rPr lang="en-US" dirty="0"/>
             <a:t>Both</a:t>
           </a:r>
-          <a:endParaRPr lang="en-US" dirty="0"/>
         </a:p>
       </dgm:t>
     </dgm:pt>
@@ -3462,10 +3451,9 @@
         <a:lstStyle/>
         <a:p>
           <a:r>
-            <a:rPr lang="en-US" dirty="0" smtClean="0"/>
+            <a:rPr lang="en-US" dirty="0"/>
             <a:t>dnx46 &amp; dnxcore50</a:t>
           </a:r>
-          <a:endParaRPr lang="en-US" dirty="0"/>
         </a:p>
       </dgm:t>
     </dgm:pt>
@@ -3481,13 +3469,6 @@
         </dgm:presLayoutVars>
       </dgm:prSet>
       <dgm:spPr/>
-      <dgm:t>
-        <a:bodyPr/>
-        <a:lstStyle/>
-        <a:p>
-          <a:endParaRPr lang="en-US"/>
-        </a:p>
-      </dgm:t>
     </dgm:pt>
     <dgm:pt modelId="{0DA0A989-CBED-4B19-A3FE-81EAF897B5B7}" type="pres">
       <dgm:prSet presAssocID="{48C133C3-77F3-4A71-8515-4B7725FB695C}" presName="hierRoot1" presStyleCnt="0">
@@ -3509,13 +3490,6 @@
         </dgm:presLayoutVars>
       </dgm:prSet>
       <dgm:spPr/>
-      <dgm:t>
-        <a:bodyPr/>
-        <a:lstStyle/>
-        <a:p>
-          <a:endParaRPr lang="en-US"/>
-        </a:p>
-      </dgm:t>
     </dgm:pt>
     <dgm:pt modelId="{EFFCA47C-D5C2-4308-A844-2CC7B5C9555D}" type="pres">
       <dgm:prSet presAssocID="{48C133C3-77F3-4A71-8515-4B7725FB695C}" presName="titleText1" presStyleLbl="fgAcc0" presStyleIdx="0" presStyleCnt="1" custScaleX="279711" custLinFactNeighborX="-7515" custLinFactNeighborY="95890">
@@ -3525,24 +3499,10 @@
         </dgm:presLayoutVars>
       </dgm:prSet>
       <dgm:spPr/>
-      <dgm:t>
-        <a:bodyPr/>
-        <a:lstStyle/>
-        <a:p>
-          <a:endParaRPr lang="en-US"/>
-        </a:p>
-      </dgm:t>
     </dgm:pt>
     <dgm:pt modelId="{E4683AE9-12A6-4E1D-8807-2134BE840AFA}" type="pres">
       <dgm:prSet presAssocID="{48C133C3-77F3-4A71-8515-4B7725FB695C}" presName="rootConnector1" presStyleLbl="node1" presStyleIdx="0" presStyleCnt="3"/>
       <dgm:spPr/>
-      <dgm:t>
-        <a:bodyPr/>
-        <a:lstStyle/>
-        <a:p>
-          <a:endParaRPr lang="en-US"/>
-        </a:p>
-      </dgm:t>
     </dgm:pt>
     <dgm:pt modelId="{E266A8FF-97C8-4138-9197-7BCA3AB036B3}" type="pres">
       <dgm:prSet presAssocID="{48C133C3-77F3-4A71-8515-4B7725FB695C}" presName="hierChild2" presStyleCnt="0"/>
@@ -3551,13 +3511,6 @@
     <dgm:pt modelId="{6C4D6CE3-4FAA-4D39-8A22-7BAC7C27FEEC}" type="pres">
       <dgm:prSet presAssocID="{523E3F81-A7FD-41C6-AEFA-00BFD2D5C126}" presName="Name37" presStyleLbl="parChTrans1D2" presStyleIdx="0" presStyleCnt="3"/>
       <dgm:spPr/>
-      <dgm:t>
-        <a:bodyPr/>
-        <a:lstStyle/>
-        <a:p>
-          <a:endParaRPr lang="en-US"/>
-        </a:p>
-      </dgm:t>
     </dgm:pt>
     <dgm:pt modelId="{1FD04404-7F57-4E0A-96B8-2299288FE726}" type="pres">
       <dgm:prSet presAssocID="{6C56C7E1-118B-466E-A84D-657D222A3EFB}" presName="hierRoot2" presStyleCnt="0">
@@ -3579,13 +3532,6 @@
         </dgm:presLayoutVars>
       </dgm:prSet>
       <dgm:spPr/>
-      <dgm:t>
-        <a:bodyPr/>
-        <a:lstStyle/>
-        <a:p>
-          <a:endParaRPr lang="en-US"/>
-        </a:p>
-      </dgm:t>
     </dgm:pt>
     <dgm:pt modelId="{40DF6143-7A1D-4CBC-A39F-187E0F34DDEB}" type="pres">
       <dgm:prSet presAssocID="{6C56C7E1-118B-466E-A84D-657D222A3EFB}" presName="titleText2" presStyleLbl="fgAcc1" presStyleIdx="0" presStyleCnt="3">
@@ -3595,24 +3541,10 @@
         </dgm:presLayoutVars>
       </dgm:prSet>
       <dgm:spPr/>
-      <dgm:t>
-        <a:bodyPr/>
-        <a:lstStyle/>
-        <a:p>
-          <a:endParaRPr lang="en-US"/>
-        </a:p>
-      </dgm:t>
     </dgm:pt>
     <dgm:pt modelId="{443F2EA8-12E1-4F9D-B8E2-9D66197C9EA8}" type="pres">
       <dgm:prSet presAssocID="{6C56C7E1-118B-466E-A84D-657D222A3EFB}" presName="rootConnector" presStyleLbl="node2" presStyleIdx="0" presStyleCnt="0"/>
       <dgm:spPr/>
-      <dgm:t>
-        <a:bodyPr/>
-        <a:lstStyle/>
-        <a:p>
-          <a:endParaRPr lang="en-US"/>
-        </a:p>
-      </dgm:t>
     </dgm:pt>
     <dgm:pt modelId="{D5FA2318-57AC-41A7-B7B1-2298A7F5EF08}" type="pres">
       <dgm:prSet presAssocID="{6C56C7E1-118B-466E-A84D-657D222A3EFB}" presName="hierChild4" presStyleCnt="0"/>
@@ -3625,13 +3557,6 @@
     <dgm:pt modelId="{8D96E3EE-4EE6-47C0-BDA3-1B464380816D}" type="pres">
       <dgm:prSet presAssocID="{4EEC8717-AA0F-49DE-8732-2508B3115DE0}" presName="Name37" presStyleLbl="parChTrans1D2" presStyleIdx="1" presStyleCnt="3"/>
       <dgm:spPr/>
-      <dgm:t>
-        <a:bodyPr/>
-        <a:lstStyle/>
-        <a:p>
-          <a:endParaRPr lang="en-US"/>
-        </a:p>
-      </dgm:t>
     </dgm:pt>
     <dgm:pt modelId="{44CA2DCF-42C0-407A-ABE2-B3D41E866CEB}" type="pres">
       <dgm:prSet presAssocID="{B4FA02E4-55C6-4E7F-89E1-A36E659C009D}" presName="hierRoot2" presStyleCnt="0">
@@ -3653,13 +3578,6 @@
         </dgm:presLayoutVars>
       </dgm:prSet>
       <dgm:spPr/>
-      <dgm:t>
-        <a:bodyPr/>
-        <a:lstStyle/>
-        <a:p>
-          <a:endParaRPr lang="en-US"/>
-        </a:p>
-      </dgm:t>
     </dgm:pt>
     <dgm:pt modelId="{8C87CF99-C695-483F-877F-16140EF7B842}" type="pres">
       <dgm:prSet presAssocID="{B4FA02E4-55C6-4E7F-89E1-A36E659C009D}" presName="titleText2" presStyleLbl="fgAcc1" presStyleIdx="1" presStyleCnt="3">
@@ -3669,24 +3587,10 @@
         </dgm:presLayoutVars>
       </dgm:prSet>
       <dgm:spPr/>
-      <dgm:t>
-        <a:bodyPr/>
-        <a:lstStyle/>
-        <a:p>
-          <a:endParaRPr lang="en-US"/>
-        </a:p>
-      </dgm:t>
     </dgm:pt>
     <dgm:pt modelId="{6A000DF7-1A06-4720-A08C-779CAA7DF395}" type="pres">
       <dgm:prSet presAssocID="{B4FA02E4-55C6-4E7F-89E1-A36E659C009D}" presName="rootConnector" presStyleLbl="node2" presStyleIdx="0" presStyleCnt="0"/>
       <dgm:spPr/>
-      <dgm:t>
-        <a:bodyPr/>
-        <a:lstStyle/>
-        <a:p>
-          <a:endParaRPr lang="en-US"/>
-        </a:p>
-      </dgm:t>
     </dgm:pt>
     <dgm:pt modelId="{DABA6A64-3116-429A-A6C2-E81A683FF019}" type="pres">
       <dgm:prSet presAssocID="{B4FA02E4-55C6-4E7F-89E1-A36E659C009D}" presName="hierChild4" presStyleCnt="0"/>
@@ -3699,13 +3603,6 @@
     <dgm:pt modelId="{3E8CF59A-FAAD-44AA-979D-BA7D6881B96A}" type="pres">
       <dgm:prSet presAssocID="{CEA44938-41CA-4FE2-8E9C-87D351F742D9}" presName="Name37" presStyleLbl="parChTrans1D2" presStyleIdx="2" presStyleCnt="3"/>
       <dgm:spPr/>
-      <dgm:t>
-        <a:bodyPr/>
-        <a:lstStyle/>
-        <a:p>
-          <a:endParaRPr lang="en-US"/>
-        </a:p>
-      </dgm:t>
     </dgm:pt>
     <dgm:pt modelId="{C1633CCD-9047-4C60-92A6-ABE37F20362C}" type="pres">
       <dgm:prSet presAssocID="{98676505-2196-4383-BEFB-5F6FF8DFC4F3}" presName="hierRoot2" presStyleCnt="0">
@@ -3727,13 +3624,6 @@
         </dgm:presLayoutVars>
       </dgm:prSet>
       <dgm:spPr/>
-      <dgm:t>
-        <a:bodyPr/>
-        <a:lstStyle/>
-        <a:p>
-          <a:endParaRPr lang="en-US"/>
-        </a:p>
-      </dgm:t>
     </dgm:pt>
     <dgm:pt modelId="{511293F5-5A5E-445C-B435-92C4CB8E9AD6}" type="pres">
       <dgm:prSet presAssocID="{98676505-2196-4383-BEFB-5F6FF8DFC4F3}" presName="titleText2" presStyleLbl="fgAcc1" presStyleIdx="2" presStyleCnt="3">
@@ -3743,24 +3633,10 @@
         </dgm:presLayoutVars>
       </dgm:prSet>
       <dgm:spPr/>
-      <dgm:t>
-        <a:bodyPr/>
-        <a:lstStyle/>
-        <a:p>
-          <a:endParaRPr lang="en-US"/>
-        </a:p>
-      </dgm:t>
     </dgm:pt>
     <dgm:pt modelId="{00BA90B6-26AF-4594-9663-43A9B290A14C}" type="pres">
       <dgm:prSet presAssocID="{98676505-2196-4383-BEFB-5F6FF8DFC4F3}" presName="rootConnector" presStyleLbl="node2" presStyleIdx="0" presStyleCnt="0"/>
       <dgm:spPr/>
-      <dgm:t>
-        <a:bodyPr/>
-        <a:lstStyle/>
-        <a:p>
-          <a:endParaRPr lang="en-US"/>
-        </a:p>
-      </dgm:t>
     </dgm:pt>
     <dgm:pt modelId="{392062C4-C553-41FE-8178-6B977942723D}" type="pres">
       <dgm:prSet presAssocID="{98676505-2196-4383-BEFB-5F6FF8DFC4F3}" presName="hierChild4" presStyleCnt="0"/>
@@ -3853,10 +3729,9 @@
         <a:lstStyle/>
         <a:p>
           <a:r>
-            <a:rPr lang="en-US" dirty="0" smtClean="0"/>
+            <a:rPr lang="en-US" dirty="0"/>
             <a:t>OmniSharp</a:t>
           </a:r>
-          <a:endParaRPr lang="en-US" dirty="0"/>
         </a:p>
       </dgm:t>
     </dgm:pt>
@@ -3890,10 +3765,9 @@
         <a:lstStyle/>
         <a:p>
           <a:r>
-            <a:rPr lang="en-US" dirty="0" smtClean="0"/>
+            <a:rPr lang="en-US" dirty="0"/>
             <a:t>Yeoman</a:t>
           </a:r>
-          <a:endParaRPr lang="en-US" dirty="0"/>
         </a:p>
       </dgm:t>
     </dgm:pt>
@@ -3927,10 +3801,9 @@
         <a:lstStyle/>
         <a:p>
           <a:r>
-            <a:rPr lang="en-US" dirty="0" smtClean="0"/>
+            <a:rPr lang="en-US" dirty="0"/>
             <a:t>generator-aspnet</a:t>
           </a:r>
-          <a:endParaRPr lang="en-US" dirty="0"/>
         </a:p>
       </dgm:t>
     </dgm:pt>
@@ -3972,13 +3845,6 @@
         </dgm:presLayoutVars>
       </dgm:prSet>
       <dgm:spPr/>
-      <dgm:t>
-        <a:bodyPr/>
-        <a:lstStyle/>
-        <a:p>
-          <a:endParaRPr lang="en-US"/>
-        </a:p>
-      </dgm:t>
     </dgm:pt>
     <dgm:pt modelId="{EC8D6BDD-CBE9-4CC5-9E48-341091C59318}" type="pres">
       <dgm:prSet presAssocID="{CCBA48EB-82DB-4599-9F30-0FD041069C67}" presName="spacerL" presStyleCnt="0"/>
@@ -3987,13 +3853,6 @@
     <dgm:pt modelId="{99021CD3-1159-400A-919E-59EF40167229}" type="pres">
       <dgm:prSet presAssocID="{CCBA48EB-82DB-4599-9F30-0FD041069C67}" presName="sibTrans" presStyleLbl="sibTrans2D1" presStyleIdx="0" presStyleCnt="2"/>
       <dgm:spPr/>
-      <dgm:t>
-        <a:bodyPr/>
-        <a:lstStyle/>
-        <a:p>
-          <a:endParaRPr lang="en-US"/>
-        </a:p>
-      </dgm:t>
     </dgm:pt>
     <dgm:pt modelId="{E52C8B72-C0EE-47E9-87A4-FC41AE12ADF6}" type="pres">
       <dgm:prSet presAssocID="{CCBA48EB-82DB-4599-9F30-0FD041069C67}" presName="spacerR" presStyleCnt="0"/>
@@ -4006,13 +3865,6 @@
         </dgm:presLayoutVars>
       </dgm:prSet>
       <dgm:spPr/>
-      <dgm:t>
-        <a:bodyPr/>
-        <a:lstStyle/>
-        <a:p>
-          <a:endParaRPr lang="en-US"/>
-        </a:p>
-      </dgm:t>
     </dgm:pt>
     <dgm:pt modelId="{2439484F-491B-4834-9D8C-B3B34B2FE244}" type="pres">
       <dgm:prSet presAssocID="{D9BABC70-83CF-4142-A7A5-7FDE52E54ECF}" presName="spacerL" presStyleCnt="0"/>
@@ -4021,13 +3873,6 @@
     <dgm:pt modelId="{0CEB9DC7-5783-4ACD-BCD5-4EF3BE321E8C}" type="pres">
       <dgm:prSet presAssocID="{D9BABC70-83CF-4142-A7A5-7FDE52E54ECF}" presName="sibTrans" presStyleLbl="sibTrans2D1" presStyleIdx="1" presStyleCnt="2"/>
       <dgm:spPr/>
-      <dgm:t>
-        <a:bodyPr/>
-        <a:lstStyle/>
-        <a:p>
-          <a:endParaRPr lang="en-US"/>
-        </a:p>
-      </dgm:t>
     </dgm:pt>
     <dgm:pt modelId="{E4967E0E-89AA-4A88-BEF2-F7E691A23511}" type="pres">
       <dgm:prSet presAssocID="{D9BABC70-83CF-4142-A7A5-7FDE52E54ECF}" presName="spacerR" presStyleCnt="0"/>
@@ -4040,13 +3885,6 @@
         </dgm:presLayoutVars>
       </dgm:prSet>
       <dgm:spPr/>
-      <dgm:t>
-        <a:bodyPr/>
-        <a:lstStyle/>
-        <a:p>
-          <a:endParaRPr lang="en-US"/>
-        </a:p>
-      </dgm:t>
     </dgm:pt>
   </dgm:ptLst>
   <dgm:cxnLst>
@@ -4094,10 +3932,9 @@
         <a:lstStyle/>
         <a:p>
           <a:r>
-            <a:rPr lang="en-US" dirty="0" smtClean="0"/>
+            <a:rPr lang="en-US" dirty="0"/>
             <a:t>KRuntime</a:t>
           </a:r>
-          <a:endParaRPr lang="en-US" dirty="0"/>
         </a:p>
       </dgm:t>
     </dgm:pt>
@@ -4131,10 +3968,9 @@
         <a:lstStyle/>
         <a:p>
           <a:r>
-            <a:rPr lang="en-US" dirty="0" smtClean="0"/>
+            <a:rPr lang="en-US" dirty="0"/>
             <a:t>XRE</a:t>
           </a:r>
-          <a:endParaRPr lang="en-US" dirty="0"/>
         </a:p>
       </dgm:t>
     </dgm:pt>
@@ -4168,10 +4004,9 @@
         <a:lstStyle/>
         <a:p>
           <a:r>
-            <a:rPr lang="en-US" dirty="0" smtClean="0"/>
+            <a:rPr lang="en-US" dirty="0"/>
             <a:t>DNX</a:t>
           </a:r>
-          <a:endParaRPr lang="en-US" dirty="0"/>
         </a:p>
       </dgm:t>
     </dgm:pt>
@@ -4205,10 +4040,9 @@
         <a:lstStyle/>
         <a:p>
           <a:r>
-            <a:rPr lang="en-US" dirty="0" smtClean="0"/>
+            <a:rPr lang="en-US" dirty="0"/>
             <a:t>.NET Core CLI</a:t>
           </a:r>
-          <a:endParaRPr lang="en-US" dirty="0"/>
         </a:p>
       </dgm:t>
     </dgm:pt>
@@ -4250,13 +4084,6 @@
         </dgm:presLayoutVars>
       </dgm:prSet>
       <dgm:spPr/>
-      <dgm:t>
-        <a:bodyPr/>
-        <a:lstStyle/>
-        <a:p>
-          <a:endParaRPr lang="en-US"/>
-        </a:p>
-      </dgm:t>
     </dgm:pt>
     <dgm:pt modelId="{C50C79D4-5126-46F2-A0CE-E38A9F55D2BC}" type="pres">
       <dgm:prSet presAssocID="{48747E02-CA4B-4EA6-9401-0110B1D75C1C}" presName="parSpace" presStyleCnt="0"/>
@@ -4269,13 +4096,6 @@
         </dgm:presLayoutVars>
       </dgm:prSet>
       <dgm:spPr/>
-      <dgm:t>
-        <a:bodyPr/>
-        <a:lstStyle/>
-        <a:p>
-          <a:endParaRPr lang="en-US"/>
-        </a:p>
-      </dgm:t>
     </dgm:pt>
     <dgm:pt modelId="{A95E42FC-585F-4585-9387-6DE56D9085EF}" type="pres">
       <dgm:prSet presAssocID="{AF4E4C78-ACEB-418E-9260-D6B62A130E48}" presName="parSpace" presStyleCnt="0"/>
@@ -4288,13 +4108,6 @@
         </dgm:presLayoutVars>
       </dgm:prSet>
       <dgm:spPr/>
-      <dgm:t>
-        <a:bodyPr/>
-        <a:lstStyle/>
-        <a:p>
-          <a:endParaRPr lang="en-US"/>
-        </a:p>
-      </dgm:t>
     </dgm:pt>
     <dgm:pt modelId="{23E62C7A-FE69-40DE-AB18-DE7CF9370157}" type="pres">
       <dgm:prSet presAssocID="{504C7C3C-B8A3-45F5-A123-5A59AFB0B8A3}" presName="parSpace" presStyleCnt="0"/>
@@ -4307,13 +4120,6 @@
         </dgm:presLayoutVars>
       </dgm:prSet>
       <dgm:spPr/>
-      <dgm:t>
-        <a:bodyPr/>
-        <a:lstStyle/>
-        <a:p>
-          <a:endParaRPr lang="en-US"/>
-        </a:p>
-      </dgm:t>
     </dgm:pt>
   </dgm:ptLst>
   <dgm:cxnLst>
@@ -4322,8 +4128,8 @@
     <dgm:cxn modelId="{BE4D6236-A3E0-4057-9A2C-42D4A877D36E}" type="presOf" srcId="{8A45336E-5408-4D62-9EF1-08F486318BFF}" destId="{57863176-DB12-4225-A941-96CD5A6A82CC}" srcOrd="0" destOrd="0" presId="urn:microsoft.com/office/officeart/2005/8/layout/hChevron3"/>
     <dgm:cxn modelId="{1C1D83E0-DB0F-4A9B-A04D-A392BE0DD04C}" type="presOf" srcId="{AFF4B1FA-9A6B-43F7-B8CB-4C91CF1DDBE0}" destId="{6E8A8CB1-126C-4A8D-95E5-7D016B2029F2}" srcOrd="0" destOrd="0" presId="urn:microsoft.com/office/officeart/2005/8/layout/hChevron3"/>
     <dgm:cxn modelId="{DCD6A15A-B19C-4616-9ED1-26DCB2C43285}" srcId="{8A45336E-5408-4D62-9EF1-08F486318BFF}" destId="{8BEAE8CB-A7D8-45E4-BC87-9A18CED7E7CE}" srcOrd="0" destOrd="0" parTransId="{E16CB781-B1BB-4E9E-9C86-96F481B14BFA}" sibTransId="{48747E02-CA4B-4EA6-9401-0110B1D75C1C}"/>
+    <dgm:cxn modelId="{C70A686A-14B0-4CBB-AA56-4BFD6C2C7B89}" type="presOf" srcId="{766D0765-5B45-432B-826E-9A27A845A5A7}" destId="{F0AA213A-C7FF-4409-B147-991ABB26AAB2}" srcOrd="0" destOrd="0" presId="urn:microsoft.com/office/officeart/2005/8/layout/hChevron3"/>
     <dgm:cxn modelId="{94C1853C-02E7-4C27-A29A-FC84C3187A32}" srcId="{8A45336E-5408-4D62-9EF1-08F486318BFF}" destId="{A917A1F9-17B7-4B88-9FAD-AF41E2910DBD}" srcOrd="3" destOrd="0" parTransId="{FEFD055D-8110-41D2-83FF-BB68E3C24098}" sibTransId="{A2ABC1CA-D4DB-4C0F-83FD-5DAA1C23AAEA}"/>
-    <dgm:cxn modelId="{C70A686A-14B0-4CBB-AA56-4BFD6C2C7B89}" type="presOf" srcId="{766D0765-5B45-432B-826E-9A27A845A5A7}" destId="{F0AA213A-C7FF-4409-B147-991ABB26AAB2}" srcOrd="0" destOrd="0" presId="urn:microsoft.com/office/officeart/2005/8/layout/hChevron3"/>
     <dgm:cxn modelId="{9CC9A370-689E-4C6F-B870-78ECD0BA24BE}" type="presOf" srcId="{A917A1F9-17B7-4B88-9FAD-AF41E2910DBD}" destId="{6655FB27-B27C-4A7B-B55D-EF2C08C6B65E}" srcOrd="0" destOrd="0" presId="urn:microsoft.com/office/officeart/2005/8/layout/hChevron3"/>
     <dgm:cxn modelId="{128E7390-4262-4560-BB4D-C552847BC8AE}" type="presOf" srcId="{8BEAE8CB-A7D8-45E4-BC87-9A18CED7E7CE}" destId="{54F0ADA0-D0DF-4213-9ACF-ED13172B50C7}" srcOrd="0" destOrd="0" presId="urn:microsoft.com/office/officeart/2005/8/layout/hChevron3"/>
     <dgm:cxn modelId="{CB4508D6-DCB1-41A9-9031-BAB1F7FDDC1E}" type="presParOf" srcId="{57863176-DB12-4225-A941-96CD5A6A82CC}" destId="{54F0ADA0-D0DF-4213-9ACF-ED13172B50C7}" srcOrd="0" destOrd="0" presId="urn:microsoft.com/office/officeart/2005/8/layout/hChevron3"/>
@@ -4366,10 +4172,9 @@
         <a:lstStyle/>
         <a:p>
           <a:r>
-            <a:rPr lang="en-US" dirty="0" smtClean="0"/>
+            <a:rPr lang="en-US" dirty="0"/>
             <a:t>DNU</a:t>
           </a:r>
-          <a:endParaRPr lang="en-US" dirty="0"/>
         </a:p>
       </dgm:t>
     </dgm:pt>
@@ -4403,10 +4208,9 @@
         <a:lstStyle/>
         <a:p>
           <a:r>
-            <a:rPr lang="en-US" dirty="0" smtClean="0"/>
+            <a:rPr lang="en-US" dirty="0"/>
             <a:t>DNX</a:t>
           </a:r>
-          <a:endParaRPr lang="en-US" dirty="0"/>
         </a:p>
       </dgm:t>
     </dgm:pt>
@@ -4440,10 +4244,9 @@
         <a:lstStyle/>
         <a:p>
           <a:r>
-            <a:rPr lang="en-US" dirty="0" smtClean="0"/>
+            <a:rPr lang="en-US" dirty="0"/>
             <a:t>DNVM</a:t>
           </a:r>
-          <a:endParaRPr lang="en-US" dirty="0"/>
         </a:p>
       </dgm:t>
     </dgm:pt>
@@ -4477,20 +4280,17 @@
         <a:lstStyle/>
         <a:p>
           <a:r>
-            <a:rPr lang="en-US" b="1" dirty="0" smtClean="0">
+            <a:rPr lang="en-US" b="1" dirty="0">
               <a:latin typeface="Consolas" panose="020B0609020204030204" pitchFamily="49" charset="0"/>
             </a:rPr>
             <a:t>&gt;</a:t>
           </a:r>
           <a:r>
-            <a:rPr lang="en-US" dirty="0" smtClean="0">
+            <a:rPr lang="en-US" dirty="0">
               <a:latin typeface="Consolas" panose="020B0609020204030204" pitchFamily="49" charset="0"/>
             </a:rPr>
             <a:t> dotnet</a:t>
           </a:r>
-          <a:endParaRPr lang="en-US" dirty="0">
-            <a:latin typeface="Consolas" panose="020B0609020204030204" pitchFamily="49" charset="0"/>
-          </a:endParaRPr>
         </a:p>
       </dgm:t>
     </dgm:pt>
@@ -4524,35 +4324,14 @@
         </dgm:presLayoutVars>
       </dgm:prSet>
       <dgm:spPr/>
-      <dgm:t>
-        <a:bodyPr/>
-        <a:lstStyle/>
-        <a:p>
-          <a:endParaRPr lang="en-US"/>
-        </a:p>
-      </dgm:t>
     </dgm:pt>
     <dgm:pt modelId="{A1B8E387-8D9B-44C2-8C10-A0878F4BCBA5}" type="pres">
       <dgm:prSet presAssocID="{E5CE24D6-BB13-4FEA-83CB-7B761924780A}" presName="ellipse" presStyleLbl="trBgShp" presStyleIdx="0" presStyleCnt="1"/>
       <dgm:spPr/>
-      <dgm:t>
-        <a:bodyPr/>
-        <a:lstStyle/>
-        <a:p>
-          <a:endParaRPr lang="en-US"/>
-        </a:p>
-      </dgm:t>
     </dgm:pt>
     <dgm:pt modelId="{0E603398-1A32-447A-A475-9378CFFE704C}" type="pres">
       <dgm:prSet presAssocID="{E5CE24D6-BB13-4FEA-83CB-7B761924780A}" presName="arrow1" presStyleLbl="fgShp" presStyleIdx="0" presStyleCnt="1"/>
       <dgm:spPr/>
-      <dgm:t>
-        <a:bodyPr/>
-        <a:lstStyle/>
-        <a:p>
-          <a:endParaRPr lang="en-US"/>
-        </a:p>
-      </dgm:t>
     </dgm:pt>
     <dgm:pt modelId="{7064439C-79BF-4007-8305-264DEF8B33A8}" type="pres">
       <dgm:prSet presAssocID="{E5CE24D6-BB13-4FEA-83CB-7B761924780A}" presName="rectangle" presStyleLbl="revTx" presStyleIdx="0" presStyleCnt="1" custLinFactNeighborX="-1404" custLinFactNeighborY="-17500">
@@ -4561,13 +4340,6 @@
         </dgm:presLayoutVars>
       </dgm:prSet>
       <dgm:spPr/>
-      <dgm:t>
-        <a:bodyPr/>
-        <a:lstStyle/>
-        <a:p>
-          <a:endParaRPr lang="en-US"/>
-        </a:p>
-      </dgm:t>
     </dgm:pt>
     <dgm:pt modelId="{B19AC436-4DF8-4C08-926C-D50DB9D12085}" type="pres">
       <dgm:prSet presAssocID="{CCBC4AA6-C802-48A7-B103-4A416A18AF69}" presName="item1" presStyleLbl="node1" presStyleIdx="0" presStyleCnt="3">
@@ -4576,13 +4348,6 @@
         </dgm:presLayoutVars>
       </dgm:prSet>
       <dgm:spPr/>
-      <dgm:t>
-        <a:bodyPr/>
-        <a:lstStyle/>
-        <a:p>
-          <a:endParaRPr lang="en-US"/>
-        </a:p>
-      </dgm:t>
     </dgm:pt>
     <dgm:pt modelId="{8CDB8FD0-72FA-499C-B88E-4E068EA69195}" type="pres">
       <dgm:prSet presAssocID="{2DA5656D-3E8D-46CE-AD51-FF85A7C808EF}" presName="item2" presStyleLbl="node1" presStyleIdx="1" presStyleCnt="3">
@@ -4591,13 +4356,6 @@
         </dgm:presLayoutVars>
       </dgm:prSet>
       <dgm:spPr/>
-      <dgm:t>
-        <a:bodyPr/>
-        <a:lstStyle/>
-        <a:p>
-          <a:endParaRPr lang="en-US"/>
-        </a:p>
-      </dgm:t>
     </dgm:pt>
     <dgm:pt modelId="{71F14A9E-0840-46B5-8EF7-0D0179E9C58E}" type="pres">
       <dgm:prSet presAssocID="{22AD93CB-D30E-4A25-B006-11BB4654006F}" presName="item3" presStyleLbl="node1" presStyleIdx="2" presStyleCnt="3">
@@ -4606,24 +4364,10 @@
         </dgm:presLayoutVars>
       </dgm:prSet>
       <dgm:spPr/>
-      <dgm:t>
-        <a:bodyPr/>
-        <a:lstStyle/>
-        <a:p>
-          <a:endParaRPr lang="en-US"/>
-        </a:p>
-      </dgm:t>
     </dgm:pt>
     <dgm:pt modelId="{012112E1-3F87-4D99-A816-1C48948C5C0D}" type="pres">
       <dgm:prSet presAssocID="{E5CE24D6-BB13-4FEA-83CB-7B761924780A}" presName="funnel" presStyleLbl="trAlignAcc1" presStyleIdx="0" presStyleCnt="1"/>
       <dgm:spPr/>
-      <dgm:t>
-        <a:bodyPr/>
-        <a:lstStyle/>
-        <a:p>
-          <a:endParaRPr lang="en-US"/>
-        </a:p>
-      </dgm:t>
     </dgm:pt>
   </dgm:ptLst>
   <dgm:cxnLst>
@@ -4893,10 +4637,9 @@
             </a:spcAft>
           </a:pPr>
           <a:r>
-            <a:rPr lang="en-US" sz="3600" kern="1200" dirty="0" smtClean="0"/>
-            <a:t>ASP.NET Core App</a:t>
+            <a:rPr lang="en-US" sz="3600" kern="1200" dirty="0"/>
+            <a:t>ASP.NET 5 App</a:t>
           </a:r>
-          <a:endParaRPr lang="en-US" sz="3600" kern="1200" dirty="0"/>
         </a:p>
       </dsp:txBody>
       <dsp:txXfrm>
@@ -4963,18 +4706,13 @@
             </a:spcAft>
           </a:pPr>
           <a:r>
-            <a:rPr lang="en-US" sz="2700" b="1" kern="1200" dirty="0" smtClean="0">
+            <a:rPr lang="en-US" sz="2700" b="1" kern="1200" dirty="0">
               <a:solidFill>
                 <a:schemeClr val="bg1"/>
               </a:solidFill>
             </a:rPr>
             <a:t>DNX</a:t>
           </a:r>
-          <a:endParaRPr lang="en-US" sz="2700" b="1" kern="1200" dirty="0">
-            <a:solidFill>
-              <a:schemeClr val="bg1"/>
-            </a:solidFill>
-          </a:endParaRPr>
         </a:p>
       </dsp:txBody>
       <dsp:txXfrm>
@@ -5048,10 +4786,9 @@
             </a:spcAft>
           </a:pPr>
           <a:r>
-            <a:rPr lang="en-US" sz="3600" kern="1200" dirty="0" smtClean="0"/>
+            <a:rPr lang="en-US" sz="3600" kern="1200" dirty="0"/>
             <a:t>.NET Framework</a:t>
           </a:r>
-          <a:endParaRPr lang="en-US" sz="3600" kern="1200" dirty="0"/>
         </a:p>
       </dsp:txBody>
       <dsp:txXfrm>
@@ -5124,10 +4861,9 @@
             </a:spcAft>
           </a:pPr>
           <a:r>
-            <a:rPr lang="en-US" sz="1500" kern="1200" dirty="0" smtClean="0"/>
+            <a:rPr lang="en-US" sz="1500" kern="1200" dirty="0"/>
             <a:t>dnx451, dnx452, dnx46</a:t>
           </a:r>
-          <a:endParaRPr lang="en-US" sz="1500" kern="1200" dirty="0"/>
         </a:p>
       </dsp:txBody>
       <dsp:txXfrm>
@@ -5201,10 +4937,9 @@
             </a:spcAft>
           </a:pPr>
           <a:r>
-            <a:rPr lang="en-US" sz="3600" kern="1200" dirty="0" smtClean="0"/>
+            <a:rPr lang="en-US" sz="3600" kern="1200" dirty="0"/>
             <a:t>.NET Core</a:t>
           </a:r>
-          <a:endParaRPr lang="en-US" sz="3600" kern="1200" dirty="0"/>
         </a:p>
       </dsp:txBody>
       <dsp:txXfrm>
@@ -5277,10 +5012,9 @@
             </a:spcAft>
           </a:pPr>
           <a:r>
-            <a:rPr lang="en-US" sz="2700" kern="1200" dirty="0" smtClean="0"/>
+            <a:rPr lang="en-US" sz="2700" kern="1200" dirty="0"/>
             <a:t>dnxcore50</a:t>
           </a:r>
-          <a:endParaRPr lang="en-US" sz="2700" kern="1200" dirty="0"/>
         </a:p>
       </dsp:txBody>
       <dsp:txXfrm>
@@ -5354,10 +5088,9 @@
             </a:spcAft>
           </a:pPr>
           <a:r>
-            <a:rPr lang="en-US" sz="3600" kern="1200" dirty="0" smtClean="0"/>
+            <a:rPr lang="en-US" sz="3600" kern="1200" dirty="0"/>
             <a:t>Both</a:t>
           </a:r>
-          <a:endParaRPr lang="en-US" sz="3600" kern="1200" dirty="0"/>
         </a:p>
       </dsp:txBody>
       <dsp:txXfrm>
@@ -5430,10 +5163,9 @@
             </a:spcAft>
           </a:pPr>
           <a:r>
-            <a:rPr lang="en-US" sz="1800" kern="1200" dirty="0" smtClean="0"/>
+            <a:rPr lang="en-US" sz="1800" kern="1200" dirty="0"/>
             <a:t>dnx46 &amp; dnxcore50</a:t>
           </a:r>
-          <a:endParaRPr lang="en-US" sz="1800" kern="1200" dirty="0"/>
         </a:p>
       </dsp:txBody>
       <dsp:txXfrm>
@@ -5519,10 +5251,9 @@
             </a:spcAft>
           </a:pPr>
           <a:r>
-            <a:rPr lang="en-US" sz="2000" kern="1200" dirty="0" smtClean="0"/>
+            <a:rPr lang="en-US" sz="2000" kern="1200" dirty="0"/>
             <a:t>OmniSharp</a:t>
           </a:r>
-          <a:endParaRPr lang="en-US" sz="2000" kern="1200" dirty="0"/>
         </a:p>
       </dsp:txBody>
       <dsp:txXfrm>
@@ -5662,10 +5393,9 @@
             </a:spcAft>
           </a:pPr>
           <a:r>
-            <a:rPr lang="en-US" sz="2000" kern="1200" dirty="0" smtClean="0"/>
+            <a:rPr lang="en-US" sz="2000" kern="1200" dirty="0"/>
             <a:t>Yeoman</a:t>
           </a:r>
-          <a:endParaRPr lang="en-US" sz="2000" kern="1200" dirty="0"/>
         </a:p>
       </dsp:txBody>
       <dsp:txXfrm>
@@ -5805,10 +5535,9 @@
             </a:spcAft>
           </a:pPr>
           <a:r>
-            <a:rPr lang="en-US" sz="2000" kern="1200" dirty="0" smtClean="0"/>
+            <a:rPr lang="en-US" sz="2000" kern="1200" dirty="0"/>
             <a:t>generator-aspnet</a:t>
           </a:r>
-          <a:endParaRPr lang="en-US" sz="2000" kern="1200" dirty="0"/>
         </a:p>
       </dsp:txBody>
       <dsp:txXfrm>
@@ -5920,10 +5649,9 @@
             </a:spcAft>
           </a:pPr>
           <a:r>
-            <a:rPr lang="en-US" sz="3500" kern="1200" dirty="0" smtClean="0"/>
+            <a:rPr lang="en-US" sz="3500" kern="1200" dirty="0"/>
             <a:t>KRuntime</a:t>
           </a:r>
-          <a:endParaRPr lang="en-US" sz="3500" kern="1200" dirty="0"/>
         </a:p>
       </dsp:txBody>
       <dsp:txXfrm>
@@ -6023,10 +5751,9 @@
             </a:spcAft>
           </a:pPr>
           <a:r>
-            <a:rPr lang="en-US" sz="3500" kern="1200" dirty="0" smtClean="0"/>
+            <a:rPr lang="en-US" sz="3500" kern="1200" dirty="0"/>
             <a:t>XRE</a:t>
           </a:r>
-          <a:endParaRPr lang="en-US" sz="3500" kern="1200" dirty="0"/>
         </a:p>
       </dsp:txBody>
       <dsp:txXfrm>
@@ -6126,10 +5853,9 @@
             </a:spcAft>
           </a:pPr>
           <a:r>
-            <a:rPr lang="en-US" sz="3500" kern="1200" dirty="0" smtClean="0"/>
+            <a:rPr lang="en-US" sz="3500" kern="1200" dirty="0"/>
             <a:t>DNX</a:t>
           </a:r>
-          <a:endParaRPr lang="en-US" sz="3500" kern="1200" dirty="0"/>
         </a:p>
       </dsp:txBody>
       <dsp:txXfrm>
@@ -6229,10 +5955,9 @@
             </a:spcAft>
           </a:pPr>
           <a:r>
-            <a:rPr lang="en-US" sz="3500" kern="1200" dirty="0" smtClean="0"/>
+            <a:rPr lang="en-US" sz="3500" kern="1200" dirty="0"/>
             <a:t>.NET Core CLI</a:t>
           </a:r>
-          <a:endParaRPr lang="en-US" sz="3500" kern="1200" dirty="0"/>
         </a:p>
       </dsp:txBody>
       <dsp:txXfrm>
@@ -6390,20 +6115,17 @@
             </a:spcAft>
           </a:pPr>
           <a:r>
-            <a:rPr lang="en-US" sz="3600" b="1" kern="1200" dirty="0" smtClean="0">
+            <a:rPr lang="en-US" sz="3600" b="1" kern="1200" dirty="0">
               <a:latin typeface="Consolas" panose="020B0609020204030204" pitchFamily="49" charset="0"/>
             </a:rPr>
             <a:t>&gt;</a:t>
           </a:r>
           <a:r>
-            <a:rPr lang="en-US" sz="3600" kern="1200" dirty="0" smtClean="0">
+            <a:rPr lang="en-US" sz="3600" kern="1200" dirty="0">
               <a:latin typeface="Consolas" panose="020B0609020204030204" pitchFamily="49" charset="0"/>
             </a:rPr>
             <a:t> dotnet</a:t>
           </a:r>
-          <a:endParaRPr lang="en-US" sz="3600" kern="1200" dirty="0">
-            <a:latin typeface="Consolas" panose="020B0609020204030204" pitchFamily="49" charset="0"/>
-          </a:endParaRPr>
         </a:p>
       </dsp:txBody>
       <dsp:txXfrm>
@@ -6477,10 +6199,9 @@
             </a:spcAft>
           </a:pPr>
           <a:r>
-            <a:rPr lang="en-US" sz="3000" kern="1200" dirty="0" smtClean="0"/>
+            <a:rPr lang="en-US" sz="3000" kern="1200" dirty="0"/>
             <a:t>DNVM</a:t>
           </a:r>
-          <a:endParaRPr lang="en-US" sz="3000" kern="1200" dirty="0"/>
         </a:p>
       </dsp:txBody>
       <dsp:txXfrm>
@@ -6554,10 +6275,9 @@
             </a:spcAft>
           </a:pPr>
           <a:r>
-            <a:rPr lang="en-US" sz="3000" kern="1200" dirty="0" smtClean="0"/>
+            <a:rPr lang="en-US" sz="3000" kern="1200" dirty="0"/>
             <a:t>DNX</a:t>
           </a:r>
-          <a:endParaRPr lang="en-US" sz="3000" kern="1200" dirty="0"/>
         </a:p>
       </dsp:txBody>
       <dsp:txXfrm>
@@ -6631,10 +6351,9 @@
             </a:spcAft>
           </a:pPr>
           <a:r>
-            <a:rPr lang="en-US" sz="3000" kern="1200" dirty="0" smtClean="0"/>
+            <a:rPr lang="en-US" sz="3000" kern="1200" dirty="0"/>
             <a:t>DNU</a:t>
           </a:r>
-          <a:endParaRPr lang="en-US" sz="3000" kern="1200" dirty="0"/>
         </a:p>
       </dsp:txBody>
       <dsp:txXfrm>
@@ -12838,7 +12557,7 @@
           <a:p>
             <a:fld id="{DFB3EBE0-77A0-4731-B691-855A17DBDF42}" type="datetimeFigureOut">
               <a:rPr lang="en-US" smtClean="0"/>
-              <a:t>2/18/2016</a:t>
+              <a:t>2/24/2016</a:t>
             </a:fld>
             <a:endParaRPr lang="en-US" dirty="0"/>
           </a:p>
@@ -12902,38 +12621,37 @@
           <a:p>
             <a:pPr lvl="0"/>
             <a:r>
-              <a:rPr lang="en-US" smtClean="0"/>
+              <a:rPr lang="en-US"/>
               <a:t>Click to edit Master text styles</a:t>
             </a:r>
           </a:p>
           <a:p>
             <a:pPr lvl="1"/>
             <a:r>
-              <a:rPr lang="en-US" smtClean="0"/>
+              <a:rPr lang="en-US"/>
               <a:t>Second level</a:t>
             </a:r>
           </a:p>
           <a:p>
             <a:pPr lvl="2"/>
             <a:r>
-              <a:rPr lang="en-US" smtClean="0"/>
+              <a:rPr lang="en-US"/>
               <a:t>Third level</a:t>
             </a:r>
           </a:p>
           <a:p>
             <a:pPr lvl="3"/>
             <a:r>
-              <a:rPr lang="en-US" smtClean="0"/>
+              <a:rPr lang="en-US"/>
               <a:t>Fourth level</a:t>
             </a:r>
           </a:p>
           <a:p>
             <a:pPr lvl="4"/>
             <a:r>
-              <a:rPr lang="en-US" smtClean="0"/>
+              <a:rPr lang="en-US"/>
               <a:t>Fifth level</a:t>
             </a:r>
-            <a:endParaRPr lang="en-US"/>
           </a:p>
         </p:txBody>
       </p:sp>
@@ -13791,7 +13509,7 @@
           </a:lstStyle>
           <a:p>
             <a:r>
-              <a:rPr lang="en-US" smtClean="0"/>
+              <a:rPr lang="en-US"/>
               <a:t>Click to edit Master title style</a:t>
             </a:r>
             <a:endParaRPr lang="en-US" dirty="0"/>
@@ -13911,7 +13629,7 @@
           </a:lstStyle>
           <a:p>
             <a:r>
-              <a:rPr lang="en-US" smtClean="0"/>
+              <a:rPr lang="en-US"/>
               <a:t>Click to edit Master subtitle style</a:t>
             </a:r>
             <a:endParaRPr lang="en-US" dirty="0"/>
@@ -13935,7 +13653,7 @@
           <a:p>
             <a:fld id="{184BFEAB-C714-4D5C-A87B-1F5F147C2568}" type="datetime1">
               <a:rPr lang="en-US" smtClean="0"/>
-              <a:t>2/18/2016</a:t>
+              <a:t>2/24/2016</a:t>
             </a:fld>
             <a:endParaRPr lang="en-US" dirty="0"/>
           </a:p>
@@ -14040,7 +13758,7 @@
           </a:lstStyle>
           <a:p>
             <a:r>
-              <a:rPr lang="en-US" smtClean="0"/>
+              <a:rPr lang="en-US"/>
               <a:t>Click to edit Master title style</a:t>
             </a:r>
             <a:endParaRPr lang="en-US" dirty="0"/>
@@ -14163,7 +13881,7 @@
           <a:p>
             <a:pPr lvl="0"/>
             <a:r>
-              <a:rPr lang="en-US" smtClean="0"/>
+              <a:rPr lang="en-US"/>
               <a:t>Click to edit Master text styles</a:t>
             </a:r>
           </a:p>
@@ -14186,7 +13904,7 @@
           <a:p>
             <a:fld id="{9A92CE8C-71B3-4605-911C-C2357D36982A}" type="datetime1">
               <a:rPr lang="en-US" smtClean="0"/>
-              <a:t>2/18/2016</a:t>
+              <a:t>2/24/2016</a:t>
             </a:fld>
             <a:endParaRPr lang="en-US" dirty="0"/>
           </a:p>
@@ -14291,7 +14009,7 @@
           </a:lstStyle>
           <a:p>
             <a:r>
-              <a:rPr lang="en-US" smtClean="0"/>
+              <a:rPr lang="en-US"/>
               <a:t>Click to edit Master title style</a:t>
             </a:r>
             <a:endParaRPr lang="en-US" dirty="0"/>
@@ -14355,7 +14073,7 @@
           <a:p>
             <a:pPr lvl="0"/>
             <a:r>
-              <a:rPr lang="en-US" smtClean="0"/>
+              <a:rPr lang="en-US"/>
               <a:t>Click to edit Master text styles</a:t>
             </a:r>
           </a:p>
@@ -14477,7 +14195,7 @@
           <a:p>
             <a:pPr lvl="0"/>
             <a:r>
-              <a:rPr lang="en-US" smtClean="0"/>
+              <a:rPr lang="en-US"/>
               <a:t>Click to edit Master text styles</a:t>
             </a:r>
           </a:p>
@@ -14500,7 +14218,7 @@
           <a:p>
             <a:fld id="{015B728D-6EF1-44C1-BE74-A3569BAB8718}" type="datetime1">
               <a:rPr lang="en-US" smtClean="0"/>
-              <a:t>2/18/2016</a:t>
+              <a:t>2/24/2016</a:t>
             </a:fld>
             <a:endParaRPr lang="en-US" dirty="0"/>
           </a:p>
@@ -14687,7 +14405,7 @@
           </a:lstStyle>
           <a:p>
             <a:r>
-              <a:rPr lang="en-US" smtClean="0"/>
+              <a:rPr lang="en-US"/>
               <a:t>Click to edit Master title style</a:t>
             </a:r>
             <a:endParaRPr lang="en-US" dirty="0"/>
@@ -14810,7 +14528,7 @@
           <a:p>
             <a:pPr lvl="0"/>
             <a:r>
-              <a:rPr lang="en-US" smtClean="0"/>
+              <a:rPr lang="en-US"/>
               <a:t>Click to edit Master text styles</a:t>
             </a:r>
           </a:p>
@@ -14833,7 +14551,7 @@
           <a:p>
             <a:fld id="{60F7EA30-F0F4-4B8A-BDF6-A084B0E8ACEE}" type="datetime1">
               <a:rPr lang="en-US" smtClean="0"/>
-              <a:t>2/18/2016</a:t>
+              <a:t>2/24/2016</a:t>
             </a:fld>
             <a:endParaRPr lang="en-US" dirty="0"/>
           </a:p>
@@ -14938,7 +14656,7 @@
           </a:lstStyle>
           <a:p>
             <a:r>
-              <a:rPr lang="en-US" smtClean="0"/>
+              <a:rPr lang="en-US"/>
               <a:t>Click to edit Master title style</a:t>
             </a:r>
             <a:endParaRPr lang="en-US" dirty="0"/>
@@ -15002,7 +14720,7 @@
           <a:p>
             <a:pPr lvl="0"/>
             <a:r>
-              <a:rPr lang="en-US" smtClean="0"/>
+              <a:rPr lang="en-US"/>
               <a:t>Click to edit Master text styles</a:t>
             </a:r>
           </a:p>
@@ -15124,7 +14842,7 @@
           <a:p>
             <a:pPr lvl="0"/>
             <a:r>
-              <a:rPr lang="en-US" smtClean="0"/>
+              <a:rPr lang="en-US"/>
               <a:t>Click to edit Master text styles</a:t>
             </a:r>
           </a:p>
@@ -15147,7 +14865,7 @@
           <a:p>
             <a:fld id="{F0EF549A-B982-48AE-849E-ED681B3F14FB}" type="datetime1">
               <a:rPr lang="en-US" smtClean="0"/>
-              <a:t>2/18/2016</a:t>
+              <a:t>2/24/2016</a:t>
             </a:fld>
             <a:endParaRPr lang="en-US" dirty="0"/>
           </a:p>
@@ -15334,7 +15052,7 @@
           </a:lstStyle>
           <a:p>
             <a:r>
-              <a:rPr lang="en-US" smtClean="0"/>
+              <a:rPr lang="en-US"/>
               <a:t>Click to edit Master title style</a:t>
             </a:r>
             <a:endParaRPr lang="en-US" dirty="0"/>
@@ -15395,7 +15113,7 @@
           <a:p>
             <a:pPr lvl="0"/>
             <a:r>
-              <a:rPr lang="en-US" smtClean="0"/>
+              <a:rPr lang="en-US"/>
               <a:t>Click to edit Master text styles</a:t>
             </a:r>
           </a:p>
@@ -15517,7 +15235,7 @@
           <a:p>
             <a:pPr lvl="0"/>
             <a:r>
-              <a:rPr lang="en-US" smtClean="0"/>
+              <a:rPr lang="en-US"/>
               <a:t>Click to edit Master text styles</a:t>
             </a:r>
           </a:p>
@@ -15540,7 +15258,7 @@
           <a:p>
             <a:fld id="{4A5FF696-44D7-45D2-8329-B53AF65ECE1F}" type="datetime1">
               <a:rPr lang="en-US" smtClean="0"/>
-              <a:t>2/18/2016</a:t>
+              <a:t>2/24/2016</a:t>
             </a:fld>
             <a:endParaRPr lang="en-US" dirty="0"/>
           </a:p>
@@ -15634,7 +15352,7 @@
           <a:lstStyle/>
           <a:p>
             <a:r>
-              <a:rPr lang="en-US" smtClean="0"/>
+              <a:rPr lang="en-US"/>
               <a:t>Click to edit Master title style</a:t>
             </a:r>
             <a:endParaRPr lang="en-US" dirty="0"/>
@@ -15658,35 +15376,35 @@
           <a:p>
             <a:pPr lvl="0"/>
             <a:r>
-              <a:rPr lang="en-US" smtClean="0"/>
+              <a:rPr lang="en-US"/>
               <a:t>Click to edit Master text styles</a:t>
             </a:r>
           </a:p>
           <a:p>
             <a:pPr lvl="1"/>
             <a:r>
-              <a:rPr lang="en-US" smtClean="0"/>
+              <a:rPr lang="en-US"/>
               <a:t>Second level</a:t>
             </a:r>
           </a:p>
           <a:p>
             <a:pPr lvl="2"/>
             <a:r>
-              <a:rPr lang="en-US" smtClean="0"/>
+              <a:rPr lang="en-US"/>
               <a:t>Third level</a:t>
             </a:r>
           </a:p>
           <a:p>
             <a:pPr lvl="3"/>
             <a:r>
-              <a:rPr lang="en-US" smtClean="0"/>
+              <a:rPr lang="en-US"/>
               <a:t>Fourth level</a:t>
             </a:r>
           </a:p>
           <a:p>
             <a:pPr lvl="4"/>
             <a:r>
-              <a:rPr lang="en-US" smtClean="0"/>
+              <a:rPr lang="en-US"/>
               <a:t>Fifth level</a:t>
             </a:r>
             <a:endParaRPr lang="en-US" dirty="0"/>
@@ -15710,7 +15428,7 @@
           <a:p>
             <a:fld id="{D4E746AE-4EBB-48DA-A9A3-3CF4B615F483}" type="datetime1">
               <a:rPr lang="en-US" smtClean="0"/>
-              <a:t>2/18/2016</a:t>
+              <a:t>2/24/2016</a:t>
             </a:fld>
             <a:endParaRPr lang="en-US" dirty="0"/>
           </a:p>
@@ -15809,7 +15527,7 @@
           <a:lstStyle/>
           <a:p>
             <a:r>
-              <a:rPr lang="en-US" smtClean="0"/>
+              <a:rPr lang="en-US"/>
               <a:t>Click to edit Master title style</a:t>
             </a:r>
             <a:endParaRPr lang="en-US" dirty="0"/>
@@ -15838,35 +15556,35 @@
           <a:p>
             <a:pPr lvl="0"/>
             <a:r>
-              <a:rPr lang="en-US" smtClean="0"/>
+              <a:rPr lang="en-US"/>
               <a:t>Click to edit Master text styles</a:t>
             </a:r>
           </a:p>
           <a:p>
             <a:pPr lvl="1"/>
             <a:r>
-              <a:rPr lang="en-US" smtClean="0"/>
+              <a:rPr lang="en-US"/>
               <a:t>Second level</a:t>
             </a:r>
           </a:p>
           <a:p>
             <a:pPr lvl="2"/>
             <a:r>
-              <a:rPr lang="en-US" smtClean="0"/>
+              <a:rPr lang="en-US"/>
               <a:t>Third level</a:t>
             </a:r>
           </a:p>
           <a:p>
             <a:pPr lvl="3"/>
             <a:r>
-              <a:rPr lang="en-US" smtClean="0"/>
+              <a:rPr lang="en-US"/>
               <a:t>Fourth level</a:t>
             </a:r>
           </a:p>
           <a:p>
             <a:pPr lvl="4"/>
             <a:r>
-              <a:rPr lang="en-US" smtClean="0"/>
+              <a:rPr lang="en-US"/>
               <a:t>Fifth level</a:t>
             </a:r>
             <a:endParaRPr lang="en-US" dirty="0"/>
@@ -15890,7 +15608,7 @@
           <a:p>
             <a:fld id="{5B1FEA50-B64E-45AF-A77E-1C43A8E7D5C1}" type="datetime1">
               <a:rPr lang="en-US" smtClean="0"/>
-              <a:t>2/18/2016</a:t>
+              <a:t>2/24/2016</a:t>
             </a:fld>
             <a:endParaRPr lang="en-US" dirty="0"/>
           </a:p>
@@ -15984,7 +15702,7 @@
           <a:lstStyle/>
           <a:p>
             <a:r>
-              <a:rPr lang="en-US" smtClean="0"/>
+              <a:rPr lang="en-US"/>
               <a:t>Click to edit Master title style</a:t>
             </a:r>
             <a:endParaRPr lang="en-US" dirty="0"/>
@@ -16008,35 +15726,35 @@
           <a:p>
             <a:pPr lvl="0"/>
             <a:r>
-              <a:rPr lang="en-US" smtClean="0"/>
+              <a:rPr lang="en-US"/>
               <a:t>Click to edit Master text styles</a:t>
             </a:r>
           </a:p>
           <a:p>
             <a:pPr lvl="1"/>
             <a:r>
-              <a:rPr lang="en-US" smtClean="0"/>
+              <a:rPr lang="en-US"/>
               <a:t>Second level</a:t>
             </a:r>
           </a:p>
           <a:p>
             <a:pPr lvl="2"/>
             <a:r>
-              <a:rPr lang="en-US" smtClean="0"/>
+              <a:rPr lang="en-US"/>
               <a:t>Third level</a:t>
             </a:r>
           </a:p>
           <a:p>
             <a:pPr lvl="3"/>
             <a:r>
-              <a:rPr lang="en-US" smtClean="0"/>
+              <a:rPr lang="en-US"/>
               <a:t>Fourth level</a:t>
             </a:r>
           </a:p>
           <a:p>
             <a:pPr lvl="4"/>
             <a:r>
-              <a:rPr lang="en-US" smtClean="0"/>
+              <a:rPr lang="en-US"/>
               <a:t>Fifth level</a:t>
             </a:r>
             <a:endParaRPr lang="en-US" dirty="0"/>
@@ -16060,7 +15778,7 @@
           <a:p>
             <a:fld id="{5EE2A00C-C0A5-41E4-A254-0933BFC59600}" type="datetime1">
               <a:rPr lang="en-US" smtClean="0"/>
-              <a:t>2/18/2016</a:t>
+              <a:t>2/24/2016</a:t>
             </a:fld>
             <a:endParaRPr lang="en-US" dirty="0"/>
           </a:p>
@@ -16163,7 +15881,7 @@
           </a:lstStyle>
           <a:p>
             <a:r>
-              <a:rPr lang="en-US" smtClean="0"/>
+              <a:rPr lang="en-US"/>
               <a:t>Click to edit Master title style</a:t>
             </a:r>
             <a:endParaRPr lang="en-US" dirty="0"/>
@@ -16284,7 +16002,7 @@
           <a:p>
             <a:pPr lvl="0"/>
             <a:r>
-              <a:rPr lang="en-US" smtClean="0"/>
+              <a:rPr lang="en-US"/>
               <a:t>Click to edit Master text styles</a:t>
             </a:r>
           </a:p>
@@ -16307,7 +16025,7 @@
           <a:p>
             <a:fld id="{C0C43579-370D-44CE-9989-325065EBA03B}" type="datetime1">
               <a:rPr lang="en-US" smtClean="0"/>
-              <a:t>2/18/2016</a:t>
+              <a:t>2/24/2016</a:t>
             </a:fld>
             <a:endParaRPr lang="en-US" dirty="0"/>
           </a:p>
@@ -16401,7 +16119,7 @@
           <a:lstStyle/>
           <a:p>
             <a:r>
-              <a:rPr lang="en-US" smtClean="0"/>
+              <a:rPr lang="en-US"/>
               <a:t>Click to edit Master title style</a:t>
             </a:r>
             <a:endParaRPr lang="en-US" dirty="0"/>
@@ -16430,35 +16148,35 @@
           <a:p>
             <a:pPr lvl="0"/>
             <a:r>
-              <a:rPr lang="en-US" smtClean="0"/>
+              <a:rPr lang="en-US"/>
               <a:t>Click to edit Master text styles</a:t>
             </a:r>
           </a:p>
           <a:p>
             <a:pPr lvl="1"/>
             <a:r>
-              <a:rPr lang="en-US" smtClean="0"/>
+              <a:rPr lang="en-US"/>
               <a:t>Second level</a:t>
             </a:r>
           </a:p>
           <a:p>
             <a:pPr lvl="2"/>
             <a:r>
-              <a:rPr lang="en-US" smtClean="0"/>
+              <a:rPr lang="en-US"/>
               <a:t>Third level</a:t>
             </a:r>
           </a:p>
           <a:p>
             <a:pPr lvl="3"/>
             <a:r>
-              <a:rPr lang="en-US" smtClean="0"/>
+              <a:rPr lang="en-US"/>
               <a:t>Fourth level</a:t>
             </a:r>
           </a:p>
           <a:p>
             <a:pPr lvl="4"/>
             <a:r>
-              <a:rPr lang="en-US" smtClean="0"/>
+              <a:rPr lang="en-US"/>
               <a:t>Fifth level</a:t>
             </a:r>
             <a:endParaRPr lang="en-US" dirty="0"/>
@@ -16487,35 +16205,35 @@
           <a:p>
             <a:pPr lvl="0"/>
             <a:r>
-              <a:rPr lang="en-US" smtClean="0"/>
+              <a:rPr lang="en-US"/>
               <a:t>Click to edit Master text styles</a:t>
             </a:r>
           </a:p>
           <a:p>
             <a:pPr lvl="1"/>
             <a:r>
-              <a:rPr lang="en-US" smtClean="0"/>
+              <a:rPr lang="en-US"/>
               <a:t>Second level</a:t>
             </a:r>
           </a:p>
           <a:p>
             <a:pPr lvl="2"/>
             <a:r>
-              <a:rPr lang="en-US" smtClean="0"/>
+              <a:rPr lang="en-US"/>
               <a:t>Third level</a:t>
             </a:r>
           </a:p>
           <a:p>
             <a:pPr lvl="3"/>
             <a:r>
-              <a:rPr lang="en-US" smtClean="0"/>
+              <a:rPr lang="en-US"/>
               <a:t>Fourth level</a:t>
             </a:r>
           </a:p>
           <a:p>
             <a:pPr lvl="4"/>
             <a:r>
-              <a:rPr lang="en-US" smtClean="0"/>
+              <a:rPr lang="en-US"/>
               <a:t>Fifth level</a:t>
             </a:r>
             <a:endParaRPr lang="en-US" dirty="0"/>
@@ -16539,7 +16257,7 @@
           <a:p>
             <a:fld id="{29D814BD-9B18-4EA5-94F4-F1600C017603}" type="datetime1">
               <a:rPr lang="en-US" smtClean="0"/>
-              <a:t>2/18/2016</a:t>
+              <a:t>2/24/2016</a:t>
             </a:fld>
             <a:endParaRPr lang="en-US" dirty="0"/>
           </a:p>
@@ -16637,7 +16355,7 @@
           </a:lstStyle>
           <a:p>
             <a:r>
-              <a:rPr lang="en-US" smtClean="0"/>
+              <a:rPr lang="en-US"/>
               <a:t>Click to edit Master title style</a:t>
             </a:r>
             <a:endParaRPr lang="en-US" dirty="0"/>
@@ -16705,7 +16423,7 @@
           <a:p>
             <a:pPr lvl="0"/>
             <a:r>
-              <a:rPr lang="en-US" smtClean="0"/>
+              <a:rPr lang="en-US"/>
               <a:t>Click to edit Master text styles</a:t>
             </a:r>
           </a:p>
@@ -16735,35 +16453,35 @@
           <a:p>
             <a:pPr lvl="0"/>
             <a:r>
-              <a:rPr lang="en-US" smtClean="0"/>
+              <a:rPr lang="en-US"/>
               <a:t>Click to edit Master text styles</a:t>
             </a:r>
           </a:p>
           <a:p>
             <a:pPr lvl="1"/>
             <a:r>
-              <a:rPr lang="en-US" smtClean="0"/>
+              <a:rPr lang="en-US"/>
               <a:t>Second level</a:t>
             </a:r>
           </a:p>
           <a:p>
             <a:pPr lvl="2"/>
             <a:r>
-              <a:rPr lang="en-US" smtClean="0"/>
+              <a:rPr lang="en-US"/>
               <a:t>Third level</a:t>
             </a:r>
           </a:p>
           <a:p>
             <a:pPr lvl="3"/>
             <a:r>
-              <a:rPr lang="en-US" smtClean="0"/>
+              <a:rPr lang="en-US"/>
               <a:t>Fourth level</a:t>
             </a:r>
           </a:p>
           <a:p>
             <a:pPr lvl="4"/>
             <a:r>
-              <a:rPr lang="en-US" smtClean="0"/>
+              <a:rPr lang="en-US"/>
               <a:t>Fifth level</a:t>
             </a:r>
             <a:endParaRPr lang="en-US" dirty="0"/>
@@ -16831,7 +16549,7 @@
           <a:p>
             <a:pPr lvl="0"/>
             <a:r>
-              <a:rPr lang="en-US" smtClean="0"/>
+              <a:rPr lang="en-US"/>
               <a:t>Click to edit Master text styles</a:t>
             </a:r>
           </a:p>
@@ -16861,35 +16579,35 @@
           <a:p>
             <a:pPr lvl="0"/>
             <a:r>
-              <a:rPr lang="en-US" smtClean="0"/>
+              <a:rPr lang="en-US"/>
               <a:t>Click to edit Master text styles</a:t>
             </a:r>
           </a:p>
           <a:p>
             <a:pPr lvl="1"/>
             <a:r>
-              <a:rPr lang="en-US" smtClean="0"/>
+              <a:rPr lang="en-US"/>
               <a:t>Second level</a:t>
             </a:r>
           </a:p>
           <a:p>
             <a:pPr lvl="2"/>
             <a:r>
-              <a:rPr lang="en-US" smtClean="0"/>
+              <a:rPr lang="en-US"/>
               <a:t>Third level</a:t>
             </a:r>
           </a:p>
           <a:p>
             <a:pPr lvl="3"/>
             <a:r>
-              <a:rPr lang="en-US" smtClean="0"/>
+              <a:rPr lang="en-US"/>
               <a:t>Fourth level</a:t>
             </a:r>
           </a:p>
           <a:p>
             <a:pPr lvl="4"/>
             <a:r>
-              <a:rPr lang="en-US" smtClean="0"/>
+              <a:rPr lang="en-US"/>
               <a:t>Fifth level</a:t>
             </a:r>
             <a:endParaRPr lang="en-US" dirty="0"/>
@@ -16913,7 +16631,7 @@
           <a:p>
             <a:fld id="{CE8DCA57-17F0-4F45-8BC0-620199D29CBA}" type="datetime1">
               <a:rPr lang="en-US" smtClean="0"/>
-              <a:t>2/18/2016</a:t>
+              <a:t>2/24/2016</a:t>
             </a:fld>
             <a:endParaRPr lang="en-US" dirty="0"/>
           </a:p>
@@ -17012,7 +16730,7 @@
           <a:lstStyle/>
           <a:p>
             <a:r>
-              <a:rPr lang="en-US" smtClean="0"/>
+              <a:rPr lang="en-US"/>
               <a:t>Click to edit Master title style</a:t>
             </a:r>
             <a:endParaRPr lang="en-US" dirty="0"/>
@@ -17036,7 +16754,7 @@
           <a:p>
             <a:fld id="{5507D437-E8BB-44EC-A888-137BD165F5EF}" type="datetime1">
               <a:rPr lang="en-US" smtClean="0"/>
-              <a:t>2/18/2016</a:t>
+              <a:t>2/24/2016</a:t>
             </a:fld>
             <a:endParaRPr lang="en-US" dirty="0"/>
           </a:p>
@@ -17131,7 +16849,7 @@
           <a:p>
             <a:fld id="{CBF48491-12CB-4315-A294-ECCB7042AE60}" type="datetime1">
               <a:rPr lang="en-US" smtClean="0"/>
-              <a:t>2/18/2016</a:t>
+              <a:t>2/24/2016</a:t>
             </a:fld>
             <a:endParaRPr lang="en-US" dirty="0"/>
           </a:p>
@@ -17236,7 +16954,7 @@
           </a:lstStyle>
           <a:p>
             <a:r>
-              <a:rPr lang="en-US" smtClean="0"/>
+              <a:rPr lang="en-US"/>
               <a:t>Click to edit Master title style</a:t>
             </a:r>
             <a:endParaRPr lang="en-US" dirty="0"/>
@@ -17267,35 +16985,35 @@
           <a:p>
             <a:pPr lvl="0"/>
             <a:r>
-              <a:rPr lang="en-US" smtClean="0"/>
+              <a:rPr lang="en-US"/>
               <a:t>Click to edit Master text styles</a:t>
             </a:r>
           </a:p>
           <a:p>
             <a:pPr lvl="1"/>
             <a:r>
-              <a:rPr lang="en-US" smtClean="0"/>
+              <a:rPr lang="en-US"/>
               <a:t>Second level</a:t>
             </a:r>
           </a:p>
           <a:p>
             <a:pPr lvl="2"/>
             <a:r>
-              <a:rPr lang="en-US" smtClean="0"/>
+              <a:rPr lang="en-US"/>
               <a:t>Third level</a:t>
             </a:r>
           </a:p>
           <a:p>
             <a:pPr lvl="3"/>
             <a:r>
-              <a:rPr lang="en-US" smtClean="0"/>
+              <a:rPr lang="en-US"/>
               <a:t>Fourth level</a:t>
             </a:r>
           </a:p>
           <a:p>
             <a:pPr lvl="4"/>
             <a:r>
-              <a:rPr lang="en-US" smtClean="0"/>
+              <a:rPr lang="en-US"/>
               <a:t>Fifth level</a:t>
             </a:r>
             <a:endParaRPr lang="en-US" dirty="0"/>
@@ -17363,7 +17081,7 @@
           <a:p>
             <a:pPr lvl="0"/>
             <a:r>
-              <a:rPr lang="en-US" smtClean="0"/>
+              <a:rPr lang="en-US"/>
               <a:t>Click to edit Master text styles</a:t>
             </a:r>
           </a:p>
@@ -17386,7 +17104,7 @@
           <a:p>
             <a:fld id="{71547693-6F8C-49B3-B3CF-B2F3832F2060}" type="datetime1">
               <a:rPr lang="en-US" smtClean="0"/>
-              <a:t>2/18/2016</a:t>
+              <a:t>2/24/2016</a:t>
             </a:fld>
             <a:endParaRPr lang="en-US" dirty="0"/>
           </a:p>
@@ -17491,7 +17209,7 @@
           </a:lstStyle>
           <a:p>
             <a:r>
-              <a:rPr lang="en-US" smtClean="0"/>
+              <a:rPr lang="en-US"/>
               <a:t>Click to edit Master title style</a:t>
             </a:r>
             <a:endParaRPr lang="en-US" dirty="0"/>
@@ -17558,10 +17276,9 @@
           </a:lstStyle>
           <a:p>
             <a:r>
-              <a:rPr lang="en-US" dirty="0" smtClean="0"/>
+              <a:rPr lang="en-US" dirty="0"/>
               <a:t>Click icon to add picture</a:t>
             </a:r>
-            <a:endParaRPr lang="en-US" dirty="0"/>
           </a:p>
         </p:txBody>
       </p:sp>
@@ -17626,7 +17343,7 @@
           <a:p>
             <a:pPr lvl="0"/>
             <a:r>
-              <a:rPr lang="en-US" smtClean="0"/>
+              <a:rPr lang="en-US"/>
               <a:t>Click to edit Master text styles</a:t>
             </a:r>
           </a:p>
@@ -17691,7 +17408,7 @@
           <a:p>
             <a:fld id="{891130D9-17AA-473C-8916-496E81563AE5}" type="datetime1">
               <a:rPr lang="en-US" smtClean="0"/>
-              <a:t>2/18/2016</a:t>
+              <a:t>2/24/2016</a:t>
             </a:fld>
             <a:endParaRPr lang="en-US" dirty="0"/>
           </a:p>
@@ -18289,7 +18006,7 @@
           <a:lstStyle/>
           <a:p>
             <a:r>
-              <a:rPr lang="en-US" smtClean="0"/>
+              <a:rPr lang="en-US"/>
               <a:t>Click to edit Master title style</a:t>
             </a:r>
             <a:endParaRPr lang="en-US" dirty="0"/>
@@ -18323,35 +18040,35 @@
           <a:p>
             <a:pPr lvl="0"/>
             <a:r>
-              <a:rPr lang="en-US" smtClean="0"/>
+              <a:rPr lang="en-US"/>
               <a:t>Click to edit Master text styles</a:t>
             </a:r>
           </a:p>
           <a:p>
             <a:pPr lvl="1"/>
             <a:r>
-              <a:rPr lang="en-US" smtClean="0"/>
+              <a:rPr lang="en-US"/>
               <a:t>Second level</a:t>
             </a:r>
           </a:p>
           <a:p>
             <a:pPr lvl="2"/>
             <a:r>
-              <a:rPr lang="en-US" smtClean="0"/>
+              <a:rPr lang="en-US"/>
               <a:t>Third level</a:t>
             </a:r>
           </a:p>
           <a:p>
             <a:pPr lvl="3"/>
             <a:r>
-              <a:rPr lang="en-US" smtClean="0"/>
+              <a:rPr lang="en-US"/>
               <a:t>Fourth level</a:t>
             </a:r>
           </a:p>
           <a:p>
             <a:pPr lvl="4"/>
             <a:r>
-              <a:rPr lang="en-US" smtClean="0"/>
+              <a:rPr lang="en-US"/>
               <a:t>Fifth level</a:t>
             </a:r>
             <a:endParaRPr lang="en-US" dirty="0"/>
@@ -18393,7 +18110,7 @@
           <a:p>
             <a:fld id="{D84A2DE9-5A38-4CE7-AE12-F8EA769E5C95}" type="datetime1">
               <a:rPr lang="en-US" smtClean="0"/>
-              <a:t>2/18/2016</a:t>
+              <a:t>2/24/2016</a:t>
             </a:fld>
             <a:endParaRPr lang="en-US" dirty="0"/>
           </a:p>
@@ -18934,10 +18651,9 @@
           <a:lstStyle/>
           <a:p>
             <a:r>
-              <a:rPr lang="en-US" dirty="0" smtClean="0"/>
+              <a:rPr lang="en-US" dirty="0"/>
               <a:t>Getting Started with ASP.NET Core in VS Code</a:t>
             </a:r>
-            <a:endParaRPr lang="en-US" dirty="0"/>
           </a:p>
         </p:txBody>
       </p:sp>
@@ -18959,7 +18675,7 @@
           <a:lstStyle/>
           <a:p>
             <a:r>
-              <a:rPr lang="en-US" sz="2000" dirty="0" smtClean="0"/>
+              <a:rPr lang="en-US" sz="2000" dirty="0"/>
               <a:t>@Scott_Addie</a:t>
             </a:r>
           </a:p>
@@ -19041,10 +18757,9 @@
           <a:lstStyle/>
           <a:p>
             <a:r>
-              <a:rPr lang="en-US" dirty="0" smtClean="0"/>
+              <a:rPr lang="en-US" dirty="0"/>
               <a:t>DNU – Publish App</a:t>
             </a:r>
-            <a:endParaRPr lang="en-US" dirty="0"/>
           </a:p>
         </p:txBody>
       </p:sp>
@@ -19067,16 +18782,12 @@
               <a:buNone/>
             </a:pPr>
             <a:r>
-              <a:rPr lang="en-US" b="1" dirty="0" smtClean="0">
+              <a:rPr lang="en-US" b="1" dirty="0">
                 <a:latin typeface="Consolas" panose="020B0609020204030204" pitchFamily="49" charset="0"/>
                 <a:cs typeface="Consolas" panose="020B0609020204030204" pitchFamily="49" charset="0"/>
               </a:rPr>
               <a:t>&gt; dnu publish</a:t>
             </a:r>
-            <a:endParaRPr lang="en-US" b="1" dirty="0">
-              <a:latin typeface="Consolas" panose="020B0609020204030204" pitchFamily="49" charset="0"/>
-              <a:cs typeface="Consolas" panose="020B0609020204030204" pitchFamily="49" charset="0"/>
-            </a:endParaRPr>
           </a:p>
         </p:txBody>
       </p:sp>
@@ -19192,10 +18903,9 @@
           <a:p>
             <a:pPr algn="ctr"/>
             <a:r>
-              <a:rPr lang="en-US" dirty="0" smtClean="0"/>
+              <a:rPr lang="en-US" dirty="0"/>
               <a:t>Execute</a:t>
             </a:r>
-            <a:endParaRPr lang="en-US" dirty="0"/>
           </a:p>
         </p:txBody>
       </p:sp>
@@ -19222,10 +18932,9 @@
           <a:lstStyle/>
           <a:p>
             <a:r>
-              <a:rPr lang="en-US" u="sng" dirty="0" smtClean="0"/>
+              <a:rPr lang="en-US" u="sng" dirty="0"/>
               <a:t>project.json</a:t>
             </a:r>
-            <a:endParaRPr lang="en-US" u="sng" dirty="0"/>
           </a:p>
         </p:txBody>
       </p:sp>
@@ -19264,10 +18973,9 @@
           <a:p>
             <a:pPr algn="ctr"/>
             <a:r>
-              <a:rPr lang="en-US" dirty="0" smtClean="0"/>
+              <a:rPr lang="en-US" dirty="0"/>
               <a:t>Publish</a:t>
             </a:r>
-            <a:endParaRPr lang="en-US" dirty="0"/>
           </a:p>
         </p:txBody>
       </p:sp>
@@ -19354,10 +19062,9 @@
           <a:p>
             <a:pPr algn="ctr"/>
             <a:r>
-              <a:rPr lang="en-US" dirty="0" smtClean="0"/>
+              <a:rPr lang="en-US" dirty="0"/>
               <a:t>Write</a:t>
             </a:r>
-            <a:endParaRPr lang="en-US" dirty="0"/>
           </a:p>
         </p:txBody>
       </p:sp>
@@ -19407,10 +19114,9 @@
           <a:lstStyle/>
           <a:p>
             <a:r>
-              <a:rPr lang="en-US" dirty="0" smtClean="0"/>
+              <a:rPr lang="en-US" dirty="0"/>
               <a:t>DN* Support in VS Code</a:t>
             </a:r>
-            <a:endParaRPr lang="en-US" dirty="0"/>
           </a:p>
         </p:txBody>
       </p:sp>
@@ -19500,10 +19206,9 @@
           <a:p>
             <a:pPr algn="ctr"/>
             <a:r>
-              <a:rPr lang="en-US" dirty="0" smtClean="0"/>
+              <a:rPr lang="en-US" dirty="0"/>
               <a:t>Command Palette (F1)</a:t>
             </a:r>
-            <a:endParaRPr lang="en-US" dirty="0"/>
           </a:p>
         </p:txBody>
       </p:sp>
@@ -19550,23 +19255,19 @@
           <a:lstStyle/>
           <a:p>
             <a:r>
-              <a:rPr lang="en-US" b="1" dirty="0" smtClean="0">
+              <a:rPr lang="en-US" b="1" dirty="0">
                 <a:latin typeface="Consolas" panose="020B0609020204030204" pitchFamily="49" charset="0"/>
                 <a:cs typeface="Consolas" panose="020B0609020204030204" pitchFamily="49" charset="0"/>
               </a:rPr>
               <a:t>&gt;</a:t>
             </a:r>
             <a:r>
-              <a:rPr lang="en-US" dirty="0" smtClean="0">
+              <a:rPr lang="en-US" dirty="0">
                 <a:latin typeface="Consolas" panose="020B0609020204030204" pitchFamily="49" charset="0"/>
                 <a:cs typeface="Consolas" panose="020B0609020204030204" pitchFamily="49" charset="0"/>
               </a:rPr>
               <a:t> dnu restore</a:t>
             </a:r>
-            <a:endParaRPr lang="en-US" dirty="0">
-              <a:latin typeface="Consolas" panose="020B0609020204030204" pitchFamily="49" charset="0"/>
-              <a:cs typeface="Consolas" panose="020B0609020204030204" pitchFamily="49" charset="0"/>
-            </a:endParaRPr>
           </a:p>
         </p:txBody>
       </p:sp>
@@ -19613,23 +19314,19 @@
           <a:lstStyle/>
           <a:p>
             <a:r>
-              <a:rPr lang="en-US" b="1" dirty="0" smtClean="0">
+              <a:rPr lang="en-US" b="1" dirty="0">
                 <a:latin typeface="Consolas" panose="020B0609020204030204" pitchFamily="49" charset="0"/>
                 <a:cs typeface="Consolas" panose="020B0609020204030204" pitchFamily="49" charset="0"/>
               </a:rPr>
               <a:t>&gt;</a:t>
             </a:r>
             <a:r>
-              <a:rPr lang="en-US" dirty="0" smtClean="0">
+              <a:rPr lang="en-US" dirty="0">
                 <a:latin typeface="Consolas" panose="020B0609020204030204" pitchFamily="49" charset="0"/>
                 <a:cs typeface="Consolas" panose="020B0609020204030204" pitchFamily="49" charset="0"/>
               </a:rPr>
               <a:t> dnx web</a:t>
             </a:r>
-            <a:endParaRPr lang="en-US" dirty="0">
-              <a:latin typeface="Consolas" panose="020B0609020204030204" pitchFamily="49" charset="0"/>
-              <a:cs typeface="Consolas" panose="020B0609020204030204" pitchFamily="49" charset="0"/>
-            </a:endParaRPr>
           </a:p>
         </p:txBody>
       </p:sp>
@@ -19873,10 +19570,9 @@
           <a:lstStyle/>
           <a:p>
             <a:r>
-              <a:rPr lang="en-US" dirty="0" smtClean="0"/>
+              <a:rPr lang="en-US" dirty="0"/>
               <a:t>C# Support in VS Code</a:t>
             </a:r>
-            <a:endParaRPr lang="en-US" dirty="0"/>
           </a:p>
         </p:txBody>
       </p:sp>
@@ -19946,14 +19642,11 @@
           <a:lstStyle/>
           <a:p>
             <a:r>
-              <a:rPr lang="en-US" dirty="0" smtClean="0">
+              <a:rPr lang="en-US" dirty="0">
                 <a:cs typeface="Consolas" panose="020B0609020204030204" pitchFamily="49" charset="0"/>
               </a:rPr>
               <a:t>Unused References</a:t>
             </a:r>
-            <a:endParaRPr lang="en-US" dirty="0">
-              <a:cs typeface="Consolas" panose="020B0609020204030204" pitchFamily="49" charset="0"/>
-            </a:endParaRPr>
           </a:p>
         </p:txBody>
       </p:sp>
@@ -20000,14 +19693,11 @@
           <a:lstStyle/>
           <a:p>
             <a:r>
-              <a:rPr lang="en-US" dirty="0" smtClean="0">
+              <a:rPr lang="en-US" dirty="0">
                 <a:cs typeface="Consolas" panose="020B0609020204030204" pitchFamily="49" charset="0"/>
               </a:rPr>
               <a:t>IntelliSense</a:t>
             </a:r>
-            <a:endParaRPr lang="en-US" dirty="0">
-              <a:cs typeface="Consolas" panose="020B0609020204030204" pitchFamily="49" charset="0"/>
-            </a:endParaRPr>
           </a:p>
         </p:txBody>
       </p:sp>
@@ -20048,10 +19738,9 @@
           <a:p>
             <a:pPr algn="ctr"/>
             <a:r>
-              <a:rPr lang="en-US" dirty="0" smtClean="0"/>
+              <a:rPr lang="en-US" dirty="0"/>
               <a:t>OmniSharp Integration</a:t>
             </a:r>
-            <a:endParaRPr lang="en-US" dirty="0"/>
           </a:p>
         </p:txBody>
       </p:sp>
@@ -20098,14 +19787,11 @@
           <a:lstStyle/>
           <a:p>
             <a:r>
-              <a:rPr lang="en-US" dirty="0" smtClean="0">
+              <a:rPr lang="en-US" dirty="0">
                 <a:cs typeface="Consolas" panose="020B0609020204030204" pitchFamily="49" charset="0"/>
               </a:rPr>
               <a:t>Code Lens</a:t>
             </a:r>
-            <a:endParaRPr lang="en-US" dirty="0">
-              <a:cs typeface="Consolas" panose="020B0609020204030204" pitchFamily="49" charset="0"/>
-            </a:endParaRPr>
           </a:p>
         </p:txBody>
       </p:sp>
@@ -20393,10 +20079,9 @@
           <a:lstStyle/>
           <a:p>
             <a:r>
-              <a:rPr lang="en-US" dirty="0" smtClean="0"/>
+              <a:rPr lang="en-US" dirty="0"/>
               <a:t>Scaffolding Support</a:t>
             </a:r>
-            <a:endParaRPr lang="en-US" dirty="0"/>
           </a:p>
         </p:txBody>
       </p:sp>
@@ -20558,10 +20243,9 @@
           <a:lstStyle/>
           <a:p>
             <a:r>
-              <a:rPr lang="en-US" dirty="0" smtClean="0"/>
+              <a:rPr lang="en-US" dirty="0"/>
               <a:t>Scaffolding via Command Shell</a:t>
             </a:r>
-            <a:endParaRPr lang="en-US" dirty="0"/>
           </a:p>
         </p:txBody>
       </p:sp>
@@ -20583,10 +20267,9 @@
           <a:lstStyle/>
           <a:p>
             <a:r>
-              <a:rPr lang="en-US" sz="2400" dirty="0" smtClean="0"/>
+              <a:rPr lang="en-US" sz="2400" dirty="0"/>
               <a:t>generator-aspnet</a:t>
             </a:r>
-            <a:endParaRPr lang="en-US" sz="2400" dirty="0"/>
           </a:p>
         </p:txBody>
       </p:sp>
@@ -20687,10 +20370,9 @@
           <a:lstStyle/>
           <a:p>
             <a:r>
-              <a:rPr lang="en-US" dirty="0" smtClean="0"/>
+              <a:rPr lang="en-US" dirty="0"/>
               <a:t>Scaffolding in Command Shell</a:t>
             </a:r>
-            <a:endParaRPr lang="en-US" dirty="0"/>
           </a:p>
         </p:txBody>
       </p:sp>
@@ -20770,10 +20452,9 @@
           <a:lstStyle/>
           <a:p>
             <a:r>
-              <a:rPr lang="en-US" dirty="0" smtClean="0"/>
+              <a:rPr lang="en-US" dirty="0"/>
               <a:t>Scaffolding in Editor</a:t>
             </a:r>
-            <a:endParaRPr lang="en-US" dirty="0"/>
           </a:p>
         </p:txBody>
       </p:sp>
@@ -20795,10 +20476,9 @@
           <a:lstStyle/>
           <a:p>
             <a:r>
-              <a:rPr lang="en-US" sz="2400" dirty="0" smtClean="0"/>
+              <a:rPr lang="en-US" sz="2400" dirty="0"/>
               <a:t>vscode-yo</a:t>
             </a:r>
-            <a:endParaRPr lang="en-US" sz="2400" dirty="0"/>
           </a:p>
         </p:txBody>
       </p:sp>
@@ -20954,24 +20634,23 @@
           <a:lstStyle/>
           <a:p>
             <a:r>
-              <a:rPr lang="en-US" b="1" dirty="0" smtClean="0">
+              <a:rPr lang="en-US" b="1" dirty="0">
                 <a:latin typeface="Consolas" panose="020B0609020204030204" pitchFamily="49" charset="0"/>
                 <a:cs typeface="Consolas" panose="020B0609020204030204" pitchFamily="49" charset="0"/>
               </a:rPr>
               <a:t>&gt;</a:t>
             </a:r>
             <a:r>
-              <a:rPr lang="en-US" dirty="0" smtClean="0">
+              <a:rPr lang="en-US" dirty="0">
                 <a:latin typeface="Consolas" panose="020B0609020204030204" pitchFamily="49" charset="0"/>
                 <a:cs typeface="Consolas" panose="020B0609020204030204" pitchFamily="49" charset="0"/>
               </a:rPr>
               <a:t> DN* Demo</a:t>
             </a:r>
             <a:r>
-              <a:rPr lang="en-US" dirty="0" smtClean="0"/>
+              <a:rPr lang="en-US" dirty="0"/>
               <a:t> </a:t>
             </a:r>
-            <a:endParaRPr lang="en-US" dirty="0"/>
           </a:p>
         </p:txBody>
       </p:sp>
@@ -20991,10 +20670,21 @@
           <a:lstStyle/>
           <a:p>
             <a:r>
-              <a:rPr lang="en-US" dirty="0" smtClean="0"/>
-              <a:t>ASP.NET Core Web Application in VS Code</a:t>
+              <a:rPr lang="en-US"/>
+              <a:t>ASP.NET </a:t>
             </a:r>
-            <a:endParaRPr lang="en-US" dirty="0"/>
+            <a:r>
+              <a:rPr lang="en-US"/>
+              <a:t>5</a:t>
+            </a:r>
+            <a:r>
+              <a:rPr lang="en-US"/>
+              <a:t> </a:t>
+            </a:r>
+            <a:r>
+              <a:rPr lang="en-US" dirty="0"/>
+              <a:t>Web Application in VS Code</a:t>
+            </a:r>
           </a:p>
         </p:txBody>
       </p:sp>
@@ -21151,10 +20841,9 @@
           <a:lstStyle/>
           <a:p>
             <a:r>
-              <a:rPr lang="en-US" dirty="0" smtClean="0"/>
+              <a:rPr lang="en-US" dirty="0"/>
               <a:t>Platform Evolution up to RC2</a:t>
             </a:r>
-            <a:endParaRPr lang="en-US" dirty="0"/>
           </a:p>
         </p:txBody>
       </p:sp>
@@ -21249,10 +20938,9 @@
           <a:lstStyle/>
           <a:p>
             <a:r>
-              <a:rPr lang="en-US" dirty="0" smtClean="0"/>
+              <a:rPr lang="en-US" dirty="0"/>
               <a:t>New Terminology (&lt;= RC1)</a:t>
             </a:r>
-            <a:endParaRPr lang="en-US" dirty="0"/>
           </a:p>
         </p:txBody>
       </p:sp>
@@ -21277,30 +20965,22 @@
           <a:lstStyle/>
           <a:p>
             <a:r>
-              <a:rPr lang="en-US" sz="2000" b="1" dirty="0" smtClean="0"/>
+              <a:rPr lang="en-US" sz="2000" b="1" dirty="0"/>
               <a:t>DNVM</a:t>
             </a:r>
             <a:r>
-              <a:rPr lang="en-US" sz="2000" dirty="0" smtClean="0"/>
+              <a:rPr lang="en-US" sz="2000" dirty="0"/>
               <a:t> (.NET Version Manager)</a:t>
             </a:r>
           </a:p>
           <a:p>
             <a:r>
-              <a:rPr lang="en-US" sz="2000" b="1" dirty="0" smtClean="0"/>
+              <a:rPr lang="en-US" sz="2000" b="1" dirty="0"/>
               <a:t>DNX</a:t>
             </a:r>
             <a:r>
-              <a:rPr lang="en-US" sz="2000" dirty="0" smtClean="0"/>
-              <a:t> </a:t>
-            </a:r>
-            <a:r>
-              <a:rPr lang="en-US" sz="2000" dirty="0" smtClean="0"/>
-              <a:t>(.</a:t>
-            </a:r>
-            <a:r>
-              <a:rPr lang="en-US" sz="2000" dirty="0" smtClean="0"/>
-              <a:t>NET Execution Environment)</a:t>
+              <a:rPr lang="en-US" sz="2000" dirty="0"/>
+              <a:t> (.NET Execution Environment)</a:t>
             </a:r>
           </a:p>
           <a:p>
@@ -21310,11 +20990,7 @@
             </a:r>
             <a:r>
               <a:rPr lang="en-US" sz="2000" dirty="0"/>
-              <a:t> (.NET Development </a:t>
-            </a:r>
-            <a:r>
-              <a:rPr lang="en-US" sz="2000" dirty="0" smtClean="0"/>
-              <a:t>Utility)</a:t>
+              <a:t> (.NET Development Utility)</a:t>
             </a:r>
           </a:p>
           <a:p>
@@ -21324,31 +21000,21 @@
             <a:endParaRPr lang="en-US" sz="2000" dirty="0"/>
           </a:p>
           <a:p>
-            <a:endParaRPr lang="en-US" sz="2000" dirty="0" smtClean="0"/>
+            <a:endParaRPr lang="en-US" sz="2000" dirty="0"/>
           </a:p>
           <a:p>
             <a:r>
-              <a:rPr lang="en-US" sz="2000" dirty="0" smtClean="0"/>
-              <a:t>Installation of DN* </a:t>
+              <a:rPr lang="en-US" sz="2000" dirty="0"/>
+              <a:t>Installation of DN* Tooling:</a:t>
             </a:r>
-            <a:r>
-              <a:rPr lang="en-US" sz="2000" dirty="0" smtClean="0"/>
-              <a:t>Tooling:</a:t>
-            </a:r>
           </a:p>
           <a:p>
             <a:pPr lvl="1"/>
-            <a:r>
-              <a:rPr lang="en-US" sz="1800" dirty="0" smtClean="0">
-                <a:hlinkClick r:id="rId2"/>
-              </a:rPr>
-              <a:t>https</a:t>
-            </a:r>
             <a:r>
               <a:rPr lang="en-US" sz="1800" dirty="0">
                 <a:hlinkClick r:id="rId2"/>
               </a:rPr>
-              <a:t>://get.asp.net/</a:t>
+              <a:t>https://get.asp.net/</a:t>
             </a:r>
             <a:endParaRPr lang="en-US" sz="1800" dirty="0"/>
           </a:p>
@@ -21429,10 +21095,9 @@
           <a:lstStyle/>
           <a:p>
             <a:r>
-              <a:rPr lang="en-US" dirty="0" smtClean="0"/>
+              <a:rPr lang="en-US" dirty="0"/>
               <a:t>CLI Evolution for RC2</a:t>
             </a:r>
-            <a:endParaRPr lang="en-US" dirty="0"/>
           </a:p>
         </p:txBody>
       </p:sp>
@@ -21454,7 +21119,7 @@
             <a:pPr marL="0" indent="0">
               <a:buNone/>
             </a:pPr>
-            <a:endParaRPr lang="en-US" dirty="0" smtClean="0"/>
+            <a:endParaRPr lang="en-US" dirty="0"/>
           </a:p>
           <a:p>
             <a:pPr marL="0" indent="0">
@@ -21585,10 +21250,9 @@
           <a:lstStyle/>
           <a:p>
             <a:r>
-              <a:rPr lang="en-US" dirty="0" smtClean="0"/>
+              <a:rPr lang="en-US" dirty="0"/>
               <a:t>DNX-to-dotnet Command Mappings</a:t>
             </a:r>
-            <a:endParaRPr lang="en-US" dirty="0"/>
           </a:p>
         </p:txBody>
       </p:sp>
@@ -21640,10 +21304,9 @@
                     <a:lstStyle/>
                     <a:p>
                       <a:r>
-                        <a:rPr lang="en-US" sz="2200" dirty="0" smtClean="0"/>
+                        <a:rPr lang="en-US" sz="2200" dirty="0"/>
                         <a:t>Old</a:t>
                       </a:r>
-                      <a:endParaRPr lang="en-US" sz="2200" dirty="0"/>
                     </a:p>
                   </a:txBody>
                   <a:tcPr/>
@@ -21654,10 +21317,9 @@
                     <a:lstStyle/>
                     <a:p>
                       <a:r>
-                        <a:rPr lang="en-US" sz="2200" dirty="0" smtClean="0"/>
+                        <a:rPr lang="en-US" sz="2200" dirty="0"/>
                         <a:t>New</a:t>
                       </a:r>
-                      <a:endParaRPr lang="en-US" sz="2200" dirty="0"/>
                     </a:p>
                   </a:txBody>
                   <a:tcPr/>
@@ -21675,14 +21337,11 @@
                     <a:lstStyle/>
                     <a:p>
                       <a:r>
-                        <a:rPr lang="en-US" sz="2200" dirty="0" smtClean="0">
+                        <a:rPr lang="en-US" sz="2200" dirty="0">
                           <a:latin typeface="Consolas" panose="020B0609020204030204" pitchFamily="49" charset="0"/>
                         </a:rPr>
                         <a:t>dnu restore</a:t>
                       </a:r>
-                      <a:endParaRPr lang="en-US" sz="2200" dirty="0">
-                        <a:latin typeface="Consolas" panose="020B0609020204030204" pitchFamily="49" charset="0"/>
-                      </a:endParaRPr>
                     </a:p>
                   </a:txBody>
                   <a:tcPr/>
@@ -21693,14 +21352,11 @@
                     <a:lstStyle/>
                     <a:p>
                       <a:r>
-                        <a:rPr lang="en-US" sz="2200" dirty="0" smtClean="0">
+                        <a:rPr lang="en-US" sz="2200" dirty="0">
                           <a:latin typeface="Consolas" panose="020B0609020204030204" pitchFamily="49" charset="0"/>
                         </a:rPr>
                         <a:t>dotnet restore</a:t>
                       </a:r>
-                      <a:endParaRPr lang="en-US" sz="2200" dirty="0">
-                        <a:latin typeface="Consolas" panose="020B0609020204030204" pitchFamily="49" charset="0"/>
-                      </a:endParaRPr>
                     </a:p>
                   </a:txBody>
                   <a:tcPr/>
@@ -21718,14 +21374,11 @@
                     <a:lstStyle/>
                     <a:p>
                       <a:r>
-                        <a:rPr lang="en-US" sz="2200" dirty="0" smtClean="0">
+                        <a:rPr lang="en-US" sz="2200" dirty="0">
                           <a:latin typeface="Consolas" panose="020B0609020204030204" pitchFamily="49" charset="0"/>
                         </a:rPr>
                         <a:t>dnu pack</a:t>
                       </a:r>
-                      <a:endParaRPr lang="en-US" sz="2200" dirty="0">
-                        <a:latin typeface="Consolas" panose="020B0609020204030204" pitchFamily="49" charset="0"/>
-                      </a:endParaRPr>
                     </a:p>
                   </a:txBody>
                   <a:tcPr/>
@@ -21736,14 +21389,11 @@
                     <a:lstStyle/>
                     <a:p>
                       <a:r>
-                        <a:rPr lang="en-US" sz="2200" dirty="0" smtClean="0">
+                        <a:rPr lang="en-US" sz="2200" dirty="0">
                           <a:latin typeface="Consolas" panose="020B0609020204030204" pitchFamily="49" charset="0"/>
                         </a:rPr>
                         <a:t>dotnet pack</a:t>
                       </a:r>
-                      <a:endParaRPr lang="en-US" sz="2200" dirty="0">
-                        <a:latin typeface="Consolas" panose="020B0609020204030204" pitchFamily="49" charset="0"/>
-                      </a:endParaRPr>
                     </a:p>
                   </a:txBody>
                   <a:tcPr/>
@@ -21761,14 +21411,11 @@
                     <a:lstStyle/>
                     <a:p>
                       <a:r>
-                        <a:rPr lang="en-US" sz="2200" dirty="0" smtClean="0">
+                        <a:rPr lang="en-US" sz="2200" dirty="0">
                           <a:latin typeface="Consolas" panose="020B0609020204030204" pitchFamily="49" charset="0"/>
                         </a:rPr>
                         <a:t>dnu build</a:t>
                       </a:r>
-                      <a:endParaRPr lang="en-US" sz="2200" dirty="0">
-                        <a:latin typeface="Consolas" panose="020B0609020204030204" pitchFamily="49" charset="0"/>
-                      </a:endParaRPr>
                     </a:p>
                   </a:txBody>
                   <a:tcPr/>
@@ -21779,14 +21426,11 @@
                     <a:lstStyle/>
                     <a:p>
                       <a:r>
-                        <a:rPr lang="en-US" sz="2200" dirty="0" smtClean="0">
+                        <a:rPr lang="en-US" sz="2200" dirty="0">
                           <a:latin typeface="Consolas" panose="020B0609020204030204" pitchFamily="49" charset="0"/>
                         </a:rPr>
                         <a:t>dotnet compile/build</a:t>
                       </a:r>
-                      <a:endParaRPr lang="en-US" sz="2200" dirty="0">
-                        <a:latin typeface="Consolas" panose="020B0609020204030204" pitchFamily="49" charset="0"/>
-                      </a:endParaRPr>
                     </a:p>
                   </a:txBody>
                   <a:tcPr/>
@@ -21804,14 +21448,11 @@
                     <a:lstStyle/>
                     <a:p>
                       <a:r>
-                        <a:rPr lang="en-US" sz="2200" dirty="0" smtClean="0">
+                        <a:rPr lang="en-US" sz="2200" dirty="0">
                           <a:latin typeface="Consolas" panose="020B0609020204030204" pitchFamily="49" charset="0"/>
                         </a:rPr>
                         <a:t>dnu publish</a:t>
                       </a:r>
-                      <a:endParaRPr lang="en-US" sz="2200" dirty="0">
-                        <a:latin typeface="Consolas" panose="020B0609020204030204" pitchFamily="49" charset="0"/>
-                      </a:endParaRPr>
                     </a:p>
                   </a:txBody>
                   <a:tcPr/>
@@ -21822,13 +21463,13 @@
                     <a:lstStyle/>
                     <a:p>
                       <a:r>
-                        <a:rPr lang="en-US" sz="2200" dirty="0" smtClean="0">
+                        <a:rPr lang="en-US" sz="2200" dirty="0">
                           <a:latin typeface="Consolas" panose="020B0609020204030204" pitchFamily="49" charset="0"/>
                         </a:rPr>
                         <a:t>dotnet</a:t>
                       </a:r>
                       <a:r>
-                        <a:rPr lang="en-US" sz="2200" baseline="0" dirty="0" smtClean="0">
+                        <a:rPr lang="en-US" sz="2200" baseline="0" dirty="0">
                           <a:latin typeface="Consolas" panose="020B0609020204030204" pitchFamily="49" charset="0"/>
                         </a:rPr>
                         <a:t> publish</a:t>
@@ -21853,14 +21494,11 @@
                     <a:lstStyle/>
                     <a:p>
                       <a:r>
-                        <a:rPr lang="en-US" sz="2200" dirty="0" smtClean="0">
+                        <a:rPr lang="en-US" sz="2200" dirty="0">
                           <a:latin typeface="Consolas" panose="020B0609020204030204" pitchFamily="49" charset="0"/>
                         </a:rPr>
                         <a:t>dnu run</a:t>
                       </a:r>
-                      <a:endParaRPr lang="en-US" sz="2200" dirty="0">
-                        <a:latin typeface="Consolas" panose="020B0609020204030204" pitchFamily="49" charset="0"/>
-                      </a:endParaRPr>
                     </a:p>
                   </a:txBody>
                   <a:tcPr/>
@@ -21871,14 +21509,11 @@
                     <a:lstStyle/>
                     <a:p>
                       <a:r>
-                        <a:rPr lang="en-US" sz="2200" dirty="0" smtClean="0">
+                        <a:rPr lang="en-US" sz="2200" dirty="0">
                           <a:latin typeface="Consolas" panose="020B0609020204030204" pitchFamily="49" charset="0"/>
                         </a:rPr>
                         <a:t>dotnet run</a:t>
                       </a:r>
-                      <a:endParaRPr lang="en-US" sz="2200" dirty="0">
-                        <a:latin typeface="Consolas" panose="020B0609020204030204" pitchFamily="49" charset="0"/>
-                      </a:endParaRPr>
                     </a:p>
                   </a:txBody>
                   <a:tcPr/>
@@ -21896,14 +21531,11 @@
                     <a:lstStyle/>
                     <a:p>
                       <a:r>
-                        <a:rPr lang="en-US" sz="2200" dirty="0" smtClean="0">
+                        <a:rPr lang="en-US" sz="2200" dirty="0">
                           <a:latin typeface="Consolas" panose="020B0609020204030204" pitchFamily="49" charset="0"/>
                         </a:rPr>
                         <a:t>dnx-watch</a:t>
                       </a:r>
-                      <a:endParaRPr lang="en-US" sz="2200" dirty="0">
-                        <a:latin typeface="Consolas" panose="020B0609020204030204" pitchFamily="49" charset="0"/>
-                      </a:endParaRPr>
                     </a:p>
                   </a:txBody>
                   <a:tcPr/>
@@ -21914,14 +21546,11 @@
                     <a:lstStyle/>
                     <a:p>
                       <a:r>
-                        <a:rPr lang="en-US" sz="2200" dirty="0" smtClean="0">
+                        <a:rPr lang="en-US" sz="2200" dirty="0">
                           <a:latin typeface="Consolas" panose="020B0609020204030204" pitchFamily="49" charset="0"/>
                         </a:rPr>
                         <a:t>dotnet watch</a:t>
                       </a:r>
-                      <a:endParaRPr lang="en-US" sz="2200" dirty="0">
-                        <a:latin typeface="Consolas" panose="020B0609020204030204" pitchFamily="49" charset="0"/>
-                      </a:endParaRPr>
                     </a:p>
                   </a:txBody>
                   <a:tcPr/>
@@ -21939,13 +21568,13 @@
                     <a:lstStyle/>
                     <a:p>
                       <a:r>
-                        <a:rPr lang="en-US" sz="2200" dirty="0" smtClean="0">
+                        <a:rPr lang="en-US" sz="2200" dirty="0">
                           <a:latin typeface="Consolas" panose="020B0609020204030204" pitchFamily="49" charset="0"/>
                         </a:rPr>
                         <a:t>dnx</a:t>
                       </a:r>
                       <a:r>
-                        <a:rPr lang="en-US" sz="2200" baseline="0" dirty="0" smtClean="0">
+                        <a:rPr lang="en-US" sz="2200" baseline="0" dirty="0">
                           <a:latin typeface="Consolas" panose="020B0609020204030204" pitchFamily="49" charset="0"/>
                         </a:rPr>
                         <a:t> ef</a:t>
@@ -21963,14 +21592,11 @@
                     <a:lstStyle/>
                     <a:p>
                       <a:r>
-                        <a:rPr lang="en-US" sz="2200" dirty="0" smtClean="0">
+                        <a:rPr lang="en-US" sz="2200" dirty="0">
                           <a:latin typeface="Consolas" panose="020B0609020204030204" pitchFamily="49" charset="0"/>
                         </a:rPr>
                         <a:t>dotnet ef</a:t>
                       </a:r>
-                      <a:endParaRPr lang="en-US" sz="2200" dirty="0">
-                        <a:latin typeface="Consolas" panose="020B0609020204030204" pitchFamily="49" charset="0"/>
-                      </a:endParaRPr>
                     </a:p>
                   </a:txBody>
                   <a:tcPr/>
@@ -21988,14 +21614,11 @@
                     <a:lstStyle/>
                     <a:p>
                       <a:r>
-                        <a:rPr lang="en-US" sz="2200" dirty="0" smtClean="0">
+                        <a:rPr lang="en-US" sz="2200" dirty="0">
                           <a:latin typeface="Consolas" panose="020B0609020204030204" pitchFamily="49" charset="0"/>
                         </a:rPr>
                         <a:t>dnx test</a:t>
                       </a:r>
-                      <a:endParaRPr lang="en-US" sz="2200" dirty="0">
-                        <a:latin typeface="Consolas" panose="020B0609020204030204" pitchFamily="49" charset="0"/>
-                      </a:endParaRPr>
                     </a:p>
                   </a:txBody>
                   <a:tcPr/>
@@ -22006,14 +21629,11 @@
                     <a:lstStyle/>
                     <a:p>
                       <a:r>
-                        <a:rPr lang="en-US" sz="2200" dirty="0" smtClean="0">
+                        <a:rPr lang="en-US" sz="2200" dirty="0">
                           <a:latin typeface="Consolas" panose="020B0609020204030204" pitchFamily="49" charset="0"/>
                         </a:rPr>
                         <a:t>dotnet test</a:t>
                       </a:r>
-                      <a:endParaRPr lang="en-US" sz="2200" dirty="0">
-                        <a:latin typeface="Consolas" panose="020B0609020204030204" pitchFamily="49" charset="0"/>
-                      </a:endParaRPr>
                     </a:p>
                   </a:txBody>
                   <a:tcPr/>
@@ -22031,14 +21651,11 @@
                     <a:lstStyle/>
                     <a:p>
                       <a:r>
-                        <a:rPr lang="en-US" sz="2200" dirty="0" smtClean="0">
+                        <a:rPr lang="en-US" sz="2200" dirty="0">
                           <a:latin typeface="Consolas" panose="020B0609020204030204" pitchFamily="49" charset="0"/>
                         </a:rPr>
                         <a:t>user-secrets</a:t>
                       </a:r>
-                      <a:endParaRPr lang="en-US" sz="2200" dirty="0">
-                        <a:latin typeface="Consolas" panose="020B0609020204030204" pitchFamily="49" charset="0"/>
-                      </a:endParaRPr>
                     </a:p>
                   </a:txBody>
                   <a:tcPr/>
@@ -22049,14 +21666,11 @@
                     <a:lstStyle/>
                     <a:p>
                       <a:r>
-                        <a:rPr lang="en-US" sz="2200" dirty="0" smtClean="0">
+                        <a:rPr lang="en-US" sz="2200" dirty="0">
                           <a:latin typeface="Consolas" panose="020B0609020204030204" pitchFamily="49" charset="0"/>
                         </a:rPr>
                         <a:t>dotnet user-secrets</a:t>
                       </a:r>
-                      <a:endParaRPr lang="en-US" sz="2200" dirty="0">
-                        <a:latin typeface="Consolas" panose="020B0609020204030204" pitchFamily="49" charset="0"/>
-                      </a:endParaRPr>
                     </a:p>
                   </a:txBody>
                   <a:tcPr/>
@@ -22140,45 +21754,37 @@
           <a:lstStyle/>
           <a:p>
             <a:r>
-              <a:rPr lang="en-US" b="1" dirty="0" smtClean="0">
+              <a:rPr lang="en-US" b="1" dirty="0">
                 <a:latin typeface="Consolas" panose="020B0609020204030204" pitchFamily="49" charset="0"/>
                 <a:cs typeface="Consolas" panose="020B0609020204030204" pitchFamily="49" charset="0"/>
               </a:rPr>
               <a:t>&gt;</a:t>
             </a:r>
             <a:r>
-              <a:rPr lang="en-US" dirty="0" smtClean="0">
+              <a:rPr lang="en-US" dirty="0">
                 <a:latin typeface="Consolas" panose="020B0609020204030204" pitchFamily="49" charset="0"/>
                 <a:cs typeface="Consolas" panose="020B0609020204030204" pitchFamily="49" charset="0"/>
               </a:rPr>
               <a:t> </a:t>
             </a:r>
             <a:r>
-              <a:rPr lang="en-US" dirty="0" err="1" smtClean="0">
+              <a:rPr lang="en-US" dirty="0" err="1">
                 <a:latin typeface="Consolas" panose="020B0609020204030204" pitchFamily="49" charset="0"/>
                 <a:cs typeface="Consolas" panose="020B0609020204030204" pitchFamily="49" charset="0"/>
               </a:rPr>
               <a:t>dotnet</a:t>
             </a:r>
             <a:r>
-              <a:rPr lang="en-US" dirty="0" smtClean="0">
+              <a:rPr lang="en-US" dirty="0">
                 <a:latin typeface="Consolas" panose="020B0609020204030204" pitchFamily="49" charset="0"/>
                 <a:cs typeface="Consolas" panose="020B0609020204030204" pitchFamily="49" charset="0"/>
               </a:rPr>
+              <a:t> Demo</a:t>
+            </a:r>
+            <a:r>
+              <a:rPr lang="en-US" dirty="0"/>
               <a:t> </a:t>
             </a:r>
-            <a:r>
-              <a:rPr lang="en-US" dirty="0" smtClean="0">
-                <a:latin typeface="Consolas" panose="020B0609020204030204" pitchFamily="49" charset="0"/>
-                <a:cs typeface="Consolas" panose="020B0609020204030204" pitchFamily="49" charset="0"/>
-              </a:rPr>
-              <a:t>Demo</a:t>
-            </a:r>
-            <a:r>
-              <a:rPr lang="en-US" dirty="0" smtClean="0"/>
-              <a:t> </a:t>
-            </a:r>
-            <a:endParaRPr lang="en-US" dirty="0"/>
           </a:p>
         </p:txBody>
       </p:sp>
@@ -22198,10 +21804,9 @@
           <a:lstStyle/>
           <a:p>
             <a:r>
-              <a:rPr lang="en-US" dirty="0" smtClean="0"/>
+              <a:rPr lang="en-US" dirty="0"/>
               <a:t>ASP.NET Core Web Application in VS Code</a:t>
             </a:r>
-            <a:endParaRPr lang="en-US" dirty="0"/>
           </a:p>
         </p:txBody>
       </p:sp>
@@ -22364,10 +21969,9 @@
           <a:lstStyle/>
           <a:p>
             <a:r>
-              <a:rPr lang="en-US" dirty="0" smtClean="0"/>
+              <a:rPr lang="en-US" dirty="0"/>
               <a:t>Thank you!</a:t>
             </a:r>
-            <a:endParaRPr lang="en-US" dirty="0"/>
           </a:p>
         </p:txBody>
       </p:sp>
@@ -22396,13 +22000,8 @@
             </a:pPr>
             <a:r>
               <a:rPr lang="en-US" sz="2000" b="1" dirty="0"/>
-              <a:t>Scan QR for </a:t>
+              <a:t>Scan QR for slides &amp; code:</a:t>
             </a:r>
-            <a:r>
-              <a:rPr lang="en-US" sz="2000" b="1" dirty="0" smtClean="0"/>
-              <a:t>slides &amp; code:</a:t>
-            </a:r>
-            <a:endParaRPr lang="en-US" sz="2000" b="1" dirty="0"/>
           </a:p>
           <a:p>
             <a:pPr marL="0" indent="0">
@@ -22715,7 +22314,7 @@
           <a:p>
             <a:pPr lvl="1"/>
             <a:r>
-              <a:rPr lang="en-US" sz="1800" dirty="0" smtClean="0">
+              <a:rPr lang="en-US" sz="1800" dirty="0">
                 <a:solidFill>
                   <a:srgbClr val="FF0000"/>
                 </a:solidFill>
@@ -22723,7 +22322,7 @@
               </a:rPr>
               <a:t>GitHub.com/scottaddie/vscode-aspnet5</a:t>
             </a:r>
-            <a:endParaRPr lang="en-US" sz="1800" dirty="0" smtClean="0">
+            <a:endParaRPr lang="en-US" sz="1800" dirty="0">
               <a:solidFill>
                 <a:srgbClr val="FF0000"/>
               </a:solidFill>
@@ -22731,21 +22330,21 @@
           </a:p>
           <a:p>
             <a:pPr lvl="1"/>
-            <a:endParaRPr lang="en-US" sz="1800" b="1" dirty="0" smtClean="0"/>
+            <a:endParaRPr lang="en-US" sz="1800" b="1" dirty="0"/>
           </a:p>
           <a:p>
             <a:pPr lvl="1"/>
             <a:r>
-              <a:rPr lang="en-US" sz="1800" dirty="0" smtClean="0">
+              <a:rPr lang="en-US" sz="1800" dirty="0">
                 <a:hlinkClick r:id="rId4"/>
               </a:rPr>
               <a:t>ScottAddie.com</a:t>
             </a:r>
-            <a:endParaRPr lang="en-US" sz="1800" dirty="0" smtClean="0"/>
+            <a:endParaRPr lang="en-US" sz="1800" dirty="0"/>
           </a:p>
           <a:p>
             <a:pPr lvl="1"/>
-            <a:endParaRPr lang="en-US" sz="1800" dirty="0" smtClean="0">
+            <a:endParaRPr lang="en-US" sz="1800" dirty="0">
               <a:solidFill>
                 <a:schemeClr val="bg1"/>
               </a:solidFill>
@@ -22755,28 +22354,28 @@
           <a:p>
             <a:pPr lvl="1"/>
             <a:r>
-              <a:rPr lang="en-US" sz="1800" dirty="0" smtClean="0">
+              <a:rPr lang="en-US" sz="1800" dirty="0">
                 <a:hlinkClick r:id="rId5"/>
               </a:rPr>
               <a:t>@Scott_Addie</a:t>
             </a:r>
-            <a:endParaRPr lang="en-US" sz="1800" dirty="0" smtClean="0"/>
+            <a:endParaRPr lang="en-US" sz="1800" dirty="0"/>
           </a:p>
           <a:p>
             <a:pPr lvl="1"/>
-            <a:endParaRPr lang="en-US" sz="1800" dirty="0" smtClean="0">
+            <a:endParaRPr lang="en-US" sz="1800" dirty="0">
               <a:hlinkClick r:id="rId6"/>
             </a:endParaRPr>
           </a:p>
           <a:p>
             <a:pPr lvl="1"/>
             <a:r>
-              <a:rPr lang="en-US" sz="1800" dirty="0" smtClean="0">
+              <a:rPr lang="en-US" sz="1800" dirty="0">
                 <a:hlinkClick r:id="rId6"/>
               </a:rPr>
               <a:t>LinkedIn.com/in/scottaddie</a:t>
             </a:r>
-            <a:endParaRPr lang="en-US" sz="1800" dirty="0" smtClean="0"/>
+            <a:endParaRPr lang="en-US" sz="1800" dirty="0"/>
           </a:p>
         </p:txBody>
       </p:sp>
@@ -22946,10 +22545,9 @@
           <a:lstStyle/>
           <a:p>
             <a:r>
-              <a:rPr lang="en-US" dirty="0" smtClean="0"/>
+              <a:rPr lang="en-US" dirty="0"/>
               <a:t>New Choices</a:t>
             </a:r>
-            <a:endParaRPr lang="en-US" dirty="0"/>
           </a:p>
         </p:txBody>
       </p:sp>
@@ -22986,7 +22584,7 @@
             <p:ph idx="1"/>
             <p:extLst>
               <p:ext uri="{D42A27DB-BD31-4B8C-83A1-F6EECF244321}">
-                <p14:modId xmlns:p14="http://schemas.microsoft.com/office/powerpoint/2010/main" val="1705936089"/>
+                <p14:modId xmlns:p14="http://schemas.microsoft.com/office/powerpoint/2010/main" val="4245232435"/>
               </p:ext>
             </p:extLst>
           </p:nvPr>
@@ -23244,18 +22842,13 @@
                 </a:spcAft>
               </a:pPr>
               <a:r>
-                <a:rPr lang="en-US" sz="2700" b="1" kern="1200" dirty="0" smtClean="0">
+                <a:rPr lang="en-US" sz="2700" b="1" kern="1200" dirty="0">
                   <a:solidFill>
                     <a:schemeClr val="bg1"/>
                   </a:solidFill>
                 </a:rPr>
                 <a:t>IIS</a:t>
               </a:r>
-              <a:endParaRPr lang="en-US" sz="2700" b="1" kern="1200" dirty="0">
-                <a:solidFill>
-                  <a:schemeClr val="bg1"/>
-                </a:solidFill>
-              </a:endParaRPr>
             </a:p>
           </p:txBody>
         </p:sp>
@@ -23381,7 +22974,7 @@
                 </a:spcAft>
               </a:pPr>
               <a:r>
-                <a:rPr lang="en-US" sz="2700" b="1" dirty="0" smtClean="0">
+                <a:rPr lang="en-US" sz="2700" b="1" dirty="0">
                   <a:solidFill>
                     <a:schemeClr val="bg1"/>
                   </a:solidFill>
@@ -23631,10 +23224,9 @@
           <a:lstStyle/>
           <a:p>
             <a:r>
-              <a:rPr lang="en-US" dirty="0" smtClean="0"/>
+              <a:rPr lang="en-US" dirty="0"/>
               <a:t>DNVM</a:t>
             </a:r>
-            <a:endParaRPr lang="en-US" dirty="0"/>
           </a:p>
         </p:txBody>
       </p:sp>
@@ -23661,37 +23253,30 @@
           <a:lstStyle/>
           <a:p>
             <a:r>
-              <a:rPr lang="en-US" sz="2000" dirty="0" smtClean="0"/>
+              <a:rPr lang="en-US" sz="2000" dirty="0"/>
               <a:t>Framework versioning manager</a:t>
             </a:r>
           </a:p>
           <a:p>
-            <a:endParaRPr lang="en-US" dirty="0" smtClean="0"/>
+            <a:endParaRPr lang="en-US" dirty="0"/>
           </a:p>
           <a:p>
             <a:r>
-              <a:rPr lang="en-US" sz="2000" dirty="0" smtClean="0"/>
+              <a:rPr lang="en-US" sz="2000" dirty="0"/>
               <a:t>Registers frameworks in user profile</a:t>
             </a:r>
           </a:p>
           <a:p>
             <a:pPr lvl="1"/>
             <a:r>
-              <a:rPr lang="en-US" sz="1800" dirty="0" smtClean="0">
+              <a:rPr lang="en-US" sz="1800" dirty="0">
                 <a:latin typeface="Consolas" panose="020B0609020204030204" pitchFamily="49" charset="0"/>
                 <a:cs typeface="Consolas" panose="020B0609020204030204" pitchFamily="49" charset="0"/>
               </a:rPr>
-              <a:t>%</a:t>
+              <a:t>%USERPROFILE%</a:t>
             </a:r>
             <a:r>
-              <a:rPr lang="en-US" sz="1800" dirty="0" smtClean="0">
-                <a:latin typeface="Consolas" panose="020B0609020204030204" pitchFamily="49" charset="0"/>
-                <a:cs typeface="Consolas" panose="020B0609020204030204" pitchFamily="49" charset="0"/>
-              </a:rPr>
-              <a:t>USERPROFILE%</a:t>
-            </a:r>
-            <a:r>
-              <a:rPr lang="en-US" sz="2000" b="1" dirty="0" smtClean="0">
+              <a:rPr lang="en-US" sz="2000" b="1" dirty="0">
                 <a:solidFill>
                   <a:schemeClr val="tx2">
                     <a:lumMod val="75000"/>
@@ -23703,14 +23288,14 @@
               <a:t>\</a:t>
             </a:r>
             <a:r>
-              <a:rPr lang="en-US" sz="1800" dirty="0" smtClean="0">
+              <a:rPr lang="en-US" sz="1800" dirty="0">
                 <a:latin typeface="Consolas" panose="020B0609020204030204" pitchFamily="49" charset="0"/>
                 <a:cs typeface="Consolas" panose="020B0609020204030204" pitchFamily="49" charset="0"/>
               </a:rPr>
               <a:t>.dnx</a:t>
             </a:r>
             <a:r>
-              <a:rPr lang="en-US" sz="2000" b="1" dirty="0" smtClean="0">
+              <a:rPr lang="en-US" sz="2000" b="1" dirty="0">
                 <a:solidFill>
                   <a:schemeClr val="tx2">
                     <a:lumMod val="75000"/>
@@ -23722,7 +23307,7 @@
               <a:t>\</a:t>
             </a:r>
             <a:r>
-              <a:rPr lang="en-US" sz="1800" dirty="0" smtClean="0">
+              <a:rPr lang="en-US" sz="1800" dirty="0">
                 <a:latin typeface="Consolas" panose="020B0609020204030204" pitchFamily="49" charset="0"/>
                 <a:cs typeface="Consolas" panose="020B0609020204030204" pitchFamily="49" charset="0"/>
               </a:rPr>
@@ -23733,16 +23318,12 @@
             <a:pPr marL="457200" lvl="1" indent="0">
               <a:buNone/>
             </a:pPr>
-            <a:endParaRPr lang="en-US" dirty="0" smtClean="0"/>
+            <a:endParaRPr lang="en-US" dirty="0"/>
           </a:p>
           <a:p>
             <a:r>
               <a:rPr lang="en-US" sz="2000" dirty="0"/>
-              <a:t>R</a:t>
-            </a:r>
-            <a:r>
-              <a:rPr lang="en-US" sz="2000" dirty="0" smtClean="0"/>
-              <a:t>untime types:</a:t>
+              <a:t>Runtime types:</a:t>
             </a:r>
           </a:p>
           <a:p>
@@ -23751,14 +23332,14 @@
               <a:buAutoNum type="arabicPeriod"/>
             </a:pPr>
             <a:r>
-              <a:rPr lang="en-US" sz="1800" i="1" dirty="0" smtClean="0"/>
+              <a:rPr lang="en-US" sz="1800" i="1" dirty="0"/>
               <a:t>Clr</a:t>
             </a:r>
           </a:p>
           <a:p>
             <a:pPr lvl="2"/>
             <a:r>
-              <a:rPr lang="en-US" sz="1600" dirty="0" smtClean="0"/>
+              <a:rPr lang="en-US" sz="1600" dirty="0"/>
               <a:t>rely on .NET being installed on machine</a:t>
             </a:r>
           </a:p>
@@ -23768,14 +23349,14 @@
               <a:buAutoNum type="arabicPeriod"/>
             </a:pPr>
             <a:r>
-              <a:rPr lang="en-US" sz="1800" i="1" dirty="0" smtClean="0"/>
+              <a:rPr lang="en-US" sz="1800" i="1" dirty="0"/>
               <a:t>CoreClr</a:t>
             </a:r>
           </a:p>
           <a:p>
             <a:pPr lvl="2"/>
             <a:r>
-              <a:rPr lang="en-US" sz="1600" dirty="0" smtClean="0"/>
+              <a:rPr lang="en-US" sz="1600" dirty="0"/>
               <a:t>can be deployed w/ app</a:t>
             </a:r>
           </a:p>
@@ -23915,10 +23496,9 @@
           <a:lstStyle/>
           <a:p>
             <a:r>
-              <a:rPr lang="en-US" dirty="0" smtClean="0"/>
+              <a:rPr lang="en-US" dirty="0"/>
               <a:t>DNVM – View Framework Inventory</a:t>
             </a:r>
-            <a:endParaRPr lang="en-US" dirty="0"/>
           </a:p>
         </p:txBody>
       </p:sp>
@@ -23950,19 +23530,8 @@
                 <a:latin typeface="Consolas" panose="020B0609020204030204" pitchFamily="49" charset="0"/>
                 <a:cs typeface="Consolas" panose="020B0609020204030204" pitchFamily="49" charset="0"/>
               </a:rPr>
-              <a:t>&gt;</a:t>
+              <a:t>&gt; dnvm list</a:t>
             </a:r>
-            <a:r>
-              <a:rPr lang="en-US" b="1" dirty="0" smtClean="0">
-                <a:latin typeface="Consolas" panose="020B0609020204030204" pitchFamily="49" charset="0"/>
-                <a:cs typeface="Consolas" panose="020B0609020204030204" pitchFamily="49" charset="0"/>
-              </a:rPr>
-              <a:t> dnvm list</a:t>
-            </a:r>
-            <a:endParaRPr lang="en-US" b="1" dirty="0">
-              <a:latin typeface="Consolas" panose="020B0609020204030204" pitchFamily="49" charset="0"/>
-              <a:cs typeface="Consolas" panose="020B0609020204030204" pitchFamily="49" charset="0"/>
-            </a:endParaRPr>
           </a:p>
         </p:txBody>
       </p:sp>
@@ -24183,10 +23752,9 @@
           <a:lstStyle/>
           <a:p>
             <a:r>
-              <a:rPr lang="en-US" dirty="0" smtClean="0"/>
+              <a:rPr lang="en-US" dirty="0"/>
               <a:t>DNVM – Set Default Runtime</a:t>
             </a:r>
-            <a:endParaRPr lang="en-US" dirty="0"/>
           </a:p>
         </p:txBody>
       </p:sp>
@@ -24214,7 +23782,7 @@
               <a:buNone/>
             </a:pPr>
             <a:r>
-              <a:rPr lang="en-US" b="1" dirty="0" smtClean="0">
+              <a:rPr lang="en-US" b="1" dirty="0">
                 <a:latin typeface="Consolas" panose="020B0609020204030204" pitchFamily="49" charset="0"/>
                 <a:cs typeface="Consolas" panose="020B0609020204030204" pitchFamily="49" charset="0"/>
               </a:rPr>
@@ -24236,7 +23804,7 @@
               <a:buFont typeface="Wingdings" panose="05000000000000000000" pitchFamily="2" charset="2"/>
               <a:buChar char="Ø"/>
             </a:pPr>
-            <a:endParaRPr lang="en-US" b="1" dirty="0" smtClean="0">
+            <a:endParaRPr lang="en-US" b="1" dirty="0">
               <a:latin typeface="Consolas" panose="020B0609020204030204" pitchFamily="49" charset="0"/>
               <a:cs typeface="Consolas" panose="020B0609020204030204" pitchFamily="49" charset="0"/>
             </a:endParaRPr>
@@ -24256,7 +23824,7 @@
               <a:buFont typeface="Wingdings" panose="05000000000000000000" pitchFamily="2" charset="2"/>
               <a:buChar char="Ø"/>
             </a:pPr>
-            <a:endParaRPr lang="en-US" b="1" dirty="0" smtClean="0">
+            <a:endParaRPr lang="en-US" b="1" dirty="0">
               <a:latin typeface="Consolas" panose="020B0609020204030204" pitchFamily="49" charset="0"/>
               <a:cs typeface="Consolas" panose="020B0609020204030204" pitchFamily="49" charset="0"/>
             </a:endParaRPr>
@@ -24266,16 +23834,12 @@
               <a:buNone/>
             </a:pPr>
             <a:r>
-              <a:rPr lang="en-US" b="1" dirty="0" smtClean="0">
+              <a:rPr lang="en-US" b="1" dirty="0">
                 <a:latin typeface="Consolas" panose="020B0609020204030204" pitchFamily="49" charset="0"/>
                 <a:cs typeface="Consolas" panose="020B0609020204030204" pitchFamily="49" charset="0"/>
               </a:rPr>
               <a:t>&gt; dnx --version</a:t>
             </a:r>
-            <a:endParaRPr lang="en-US" b="1" dirty="0">
-              <a:latin typeface="Consolas" panose="020B0609020204030204" pitchFamily="49" charset="0"/>
-              <a:cs typeface="Consolas" panose="020B0609020204030204" pitchFamily="49" charset="0"/>
-            </a:endParaRPr>
           </a:p>
         </p:txBody>
       </p:sp>
@@ -24614,10 +24178,9 @@
           <a:lstStyle/>
           <a:p>
             <a:r>
-              <a:rPr lang="en-US" dirty="0" smtClean="0"/>
+              <a:rPr lang="en-US" dirty="0"/>
               <a:t>DNX</a:t>
             </a:r>
-            <a:endParaRPr lang="en-US" dirty="0"/>
           </a:p>
         </p:txBody>
       </p:sp>
@@ -24644,23 +24207,18 @@
           <a:lstStyle/>
           <a:p>
             <a:r>
-              <a:rPr lang="en-US" sz="2200" dirty="0" smtClean="0"/>
+              <a:rPr lang="en-US" sz="2200" dirty="0"/>
               <a:t>SDK &amp; runtime environment</a:t>
             </a:r>
           </a:p>
           <a:p>
-            <a:endParaRPr lang="en-US" dirty="0" smtClean="0"/>
+            <a:endParaRPr lang="en-US" dirty="0"/>
           </a:p>
           <a:p>
             <a:r>
-              <a:rPr lang="en-US" sz="2200" dirty="0" smtClean="0"/>
-              <a:t>Built by ASP.NET team to make </a:t>
+              <a:rPr lang="en-US" sz="2200" dirty="0"/>
+              <a:t>Built by ASP.NET team to make framework…</a:t>
             </a:r>
-            <a:r>
-              <a:rPr lang="en-US" sz="2200" dirty="0" smtClean="0"/>
-              <a:t>framework…</a:t>
-            </a:r>
-            <a:endParaRPr lang="en-US" sz="2200" dirty="0" smtClean="0"/>
           </a:p>
           <a:p>
             <a:pPr marL="800100" lvl="1" indent="-342900">
@@ -24668,23 +24226,15 @@
               <a:buAutoNum type="arabicPeriod"/>
             </a:pPr>
             <a:r>
-              <a:rPr lang="en-US" sz="1900" dirty="0" smtClean="0"/>
+              <a:rPr lang="en-US" sz="1900" dirty="0"/>
               <a:t>X-plat</a:t>
             </a:r>
           </a:p>
           <a:p>
             <a:pPr lvl="2"/>
             <a:r>
-              <a:rPr lang="en-US" sz="1700" dirty="0" smtClean="0"/>
-              <a:t>Windows, Mac </a:t>
-            </a:r>
-            <a:r>
-              <a:rPr lang="en-US" sz="1700" dirty="0" smtClean="0"/>
-              <a:t>OS X</a:t>
-            </a:r>
-            <a:r>
-              <a:rPr lang="en-US" sz="1700" dirty="0" smtClean="0"/>
-              <a:t>, Linux</a:t>
+              <a:rPr lang="en-US" sz="1700" dirty="0"/>
+              <a:t>Windows, Mac OS X, Linux</a:t>
             </a:r>
           </a:p>
           <a:p>
@@ -24693,31 +24243,30 @@
               <a:buAutoNum type="arabicPeriod"/>
             </a:pPr>
             <a:r>
-              <a:rPr lang="en-US" sz="1900" dirty="0" smtClean="0"/>
+              <a:rPr lang="en-US" sz="1900" dirty="0"/>
               <a:t>Runtime agnostic</a:t>
             </a:r>
           </a:p>
           <a:p>
             <a:pPr lvl="2"/>
             <a:r>
-              <a:rPr lang="en-US" sz="1700" dirty="0" smtClean="0"/>
+              <a:rPr lang="en-US" sz="1700" dirty="0"/>
               <a:t>.NET Core, .NET Fx, Mono, etc.</a:t>
             </a:r>
-            <a:endParaRPr lang="en-US" sz="1700" dirty="0"/>
-          </a:p>
-          <a:p>
-            <a:endParaRPr lang="en-US" dirty="0" smtClean="0"/>
+          </a:p>
+          <a:p>
+            <a:endParaRPr lang="en-US" dirty="0"/>
           </a:p>
           <a:p>
             <a:r>
-              <a:rPr lang="en-US" sz="2200" dirty="0" smtClean="0"/>
+              <a:rPr lang="en-US" sz="2200" dirty="0"/>
               <a:t>Introduced a confusing new .NET application model</a:t>
             </a:r>
           </a:p>
           <a:p>
             <a:pPr lvl="1"/>
             <a:r>
-              <a:rPr lang="en-US" sz="1900" dirty="0" smtClean="0"/>
+              <a:rPr lang="en-US" sz="1900" dirty="0"/>
               <a:t>ASP.NET Console App</a:t>
             </a:r>
           </a:p>
@@ -24726,18 +24275,9 @@
           </a:p>
           <a:p>
             <a:r>
-              <a:rPr lang="en-US" sz="2200" dirty="0" smtClean="0"/>
-              <a:t>Not </a:t>
+              <a:rPr lang="en-US" sz="2200" dirty="0"/>
+              <a:t>Not a rapper from the late ‘90s</a:t>
             </a:r>
-            <a:r>
-              <a:rPr lang="en-US" sz="2200" dirty="0"/>
-              <a:t>a rapper from the late ‘</a:t>
-            </a:r>
-            <a:r>
-              <a:rPr lang="en-US" sz="2200" dirty="0" smtClean="0"/>
-              <a:t>90s</a:t>
-            </a:r>
-            <a:endParaRPr lang="en-US" sz="2200" dirty="0"/>
           </a:p>
         </p:txBody>
       </p:sp>
@@ -25370,10 +24910,9 @@
           <a:lstStyle/>
           <a:p>
             <a:r>
-              <a:rPr lang="en-US" dirty="0" smtClean="0"/>
+              <a:rPr lang="en-US" dirty="0"/>
               <a:t>DNX – Start Web Server</a:t>
             </a:r>
-            <a:endParaRPr lang="en-US" dirty="0"/>
           </a:p>
         </p:txBody>
       </p:sp>
@@ -25400,7 +24939,7 @@
             <a:pPr marL="0" indent="0">
               <a:buNone/>
             </a:pPr>
-            <a:endParaRPr lang="en-US" b="1" dirty="0" smtClean="0">
+            <a:endParaRPr lang="en-US" b="1" dirty="0">
               <a:latin typeface="Consolas" panose="020B0609020204030204" pitchFamily="49" charset="0"/>
               <a:cs typeface="Consolas" panose="020B0609020204030204" pitchFamily="49" charset="0"/>
             </a:endParaRPr>
@@ -25410,16 +24949,12 @@
               <a:buNone/>
             </a:pPr>
             <a:r>
-              <a:rPr lang="en-US" b="1" dirty="0" smtClean="0">
+              <a:rPr lang="en-US" b="1" dirty="0">
                 <a:latin typeface="Consolas" panose="020B0609020204030204" pitchFamily="49" charset="0"/>
                 <a:cs typeface="Consolas" panose="020B0609020204030204" pitchFamily="49" charset="0"/>
               </a:rPr>
               <a:t>&gt; dnx web</a:t>
             </a:r>
-            <a:endParaRPr lang="en-US" b="1" dirty="0">
-              <a:latin typeface="Consolas" panose="020B0609020204030204" pitchFamily="49" charset="0"/>
-              <a:cs typeface="Consolas" panose="020B0609020204030204" pitchFamily="49" charset="0"/>
-            </a:endParaRPr>
           </a:p>
         </p:txBody>
       </p:sp>
@@ -25559,10 +25094,9 @@
           <a:p>
             <a:pPr algn="ctr"/>
             <a:r>
-              <a:rPr lang="en-US" dirty="0" smtClean="0"/>
+              <a:rPr lang="en-US" dirty="0"/>
               <a:t>Execute</a:t>
             </a:r>
-            <a:endParaRPr lang="en-US" dirty="0"/>
           </a:p>
         </p:txBody>
       </p:sp>
@@ -25589,10 +25123,9 @@
           <a:lstStyle/>
           <a:p>
             <a:r>
-              <a:rPr lang="en-US" u="sng" dirty="0" smtClean="0"/>
+              <a:rPr lang="en-US" u="sng" dirty="0"/>
               <a:t>project.json</a:t>
             </a:r>
-            <a:endParaRPr lang="en-US" u="sng" dirty="0"/>
           </a:p>
         </p:txBody>
       </p:sp>
@@ -25631,10 +25164,9 @@
           <a:p>
             <a:pPr algn="ctr"/>
             <a:r>
-              <a:rPr lang="en-US" dirty="0" smtClean="0"/>
+              <a:rPr lang="en-US" dirty="0"/>
               <a:t>Start</a:t>
             </a:r>
-            <a:endParaRPr lang="en-US" dirty="0"/>
           </a:p>
         </p:txBody>
       </p:sp>
@@ -25697,10 +25229,9 @@
           <a:p>
             <a:pPr algn="ctr"/>
             <a:r>
-              <a:rPr lang="en-US" dirty="0" smtClean="0"/>
+              <a:rPr lang="en-US" dirty="0"/>
               <a:t>Browse</a:t>
             </a:r>
-            <a:endParaRPr lang="en-US" dirty="0"/>
           </a:p>
         </p:txBody>
       </p:sp>
@@ -25750,10 +25281,9 @@
           <a:lstStyle/>
           <a:p>
             <a:r>
-              <a:rPr lang="en-US" dirty="0" smtClean="0"/>
+              <a:rPr lang="en-US" dirty="0"/>
               <a:t>DNU</a:t>
             </a:r>
-            <a:endParaRPr lang="en-US" dirty="0"/>
           </a:p>
         </p:txBody>
       </p:sp>
@@ -25778,7 +25308,7 @@
           <a:lstStyle/>
           <a:p>
             <a:r>
-              <a:rPr lang="en-US" sz="2000" dirty="0" smtClean="0"/>
+              <a:rPr lang="en-US" sz="2000" dirty="0"/>
               <a:t>NuGet Package Restore</a:t>
             </a:r>
           </a:p>
@@ -25787,7 +25317,7 @@
               <a:buNone/>
             </a:pPr>
             <a:r>
-              <a:rPr lang="en-US" sz="1800" b="1" dirty="0" smtClean="0">
+              <a:rPr lang="en-US" sz="1800" b="1" dirty="0">
                 <a:latin typeface="Consolas" panose="020B0609020204030204" pitchFamily="49" charset="0"/>
                 <a:cs typeface="Consolas" panose="020B0609020204030204" pitchFamily="49" charset="0"/>
               </a:rPr>
@@ -25796,7 +25326,7 @@
           </a:p>
           <a:p>
             <a:r>
-              <a:rPr lang="en-US" sz="2000" dirty="0" smtClean="0"/>
+              <a:rPr lang="en-US" sz="2000" dirty="0"/>
               <a:t>Build App</a:t>
             </a:r>
           </a:p>
@@ -25805,21 +25335,21 @@
               <a:buNone/>
             </a:pPr>
             <a:r>
-              <a:rPr lang="en-US" sz="1800" b="1" dirty="0" smtClean="0">
+              <a:rPr lang="en-US" sz="1800" b="1" dirty="0">
                 <a:latin typeface="Consolas" panose="020B0609020204030204" pitchFamily="49" charset="0"/>
                 <a:cs typeface="Consolas" panose="020B0609020204030204" pitchFamily="49" charset="0"/>
               </a:rPr>
               <a:t>&gt;</a:t>
             </a:r>
             <a:r>
-              <a:rPr lang="en-US" sz="1800" dirty="0" smtClean="0">
+              <a:rPr lang="en-US" sz="1800" dirty="0">
                 <a:latin typeface="Consolas" panose="020B0609020204030204" pitchFamily="49" charset="0"/>
                 <a:cs typeface="Consolas" panose="020B0609020204030204" pitchFamily="49" charset="0"/>
               </a:rPr>
               <a:t> </a:t>
             </a:r>
             <a:r>
-              <a:rPr lang="en-US" sz="1800" b="1" dirty="0" smtClean="0">
+              <a:rPr lang="en-US" sz="1800" b="1" dirty="0">
                 <a:latin typeface="Consolas" panose="020B0609020204030204" pitchFamily="49" charset="0"/>
                 <a:cs typeface="Consolas" panose="020B0609020204030204" pitchFamily="49" charset="0"/>
               </a:rPr>
@@ -25828,7 +25358,7 @@
           </a:p>
           <a:p>
             <a:r>
-              <a:rPr lang="en-US" sz="2000" dirty="0" smtClean="0"/>
+              <a:rPr lang="en-US" sz="2000" dirty="0"/>
               <a:t>Commands Management</a:t>
             </a:r>
           </a:p>
@@ -25837,21 +25367,21 @@
               <a:buNone/>
             </a:pPr>
             <a:r>
-              <a:rPr lang="en-US" sz="1800" b="1" dirty="0" smtClean="0">
+              <a:rPr lang="en-US" sz="1800" b="1" dirty="0">
                 <a:latin typeface="Consolas" panose="020B0609020204030204" pitchFamily="49" charset="0"/>
                 <a:cs typeface="Consolas" panose="020B0609020204030204" pitchFamily="49" charset="0"/>
               </a:rPr>
               <a:t>&gt;</a:t>
             </a:r>
             <a:r>
-              <a:rPr lang="en-US" sz="1800" dirty="0" smtClean="0">
+              <a:rPr lang="en-US" sz="1800" dirty="0">
                 <a:latin typeface="Consolas" panose="020B0609020204030204" pitchFamily="49" charset="0"/>
                 <a:cs typeface="Consolas" panose="020B0609020204030204" pitchFamily="49" charset="0"/>
               </a:rPr>
               <a:t> </a:t>
             </a:r>
             <a:r>
-              <a:rPr lang="en-US" sz="1800" b="1" dirty="0" smtClean="0">
+              <a:rPr lang="en-US" sz="1800" b="1" dirty="0">
                 <a:latin typeface="Consolas" panose="020B0609020204030204" pitchFamily="49" charset="0"/>
                 <a:cs typeface="Consolas" panose="020B0609020204030204" pitchFamily="49" charset="0"/>
               </a:rPr>
@@ -25860,7 +25390,7 @@
           </a:p>
           <a:p>
             <a:r>
-              <a:rPr lang="en-US" sz="2000" dirty="0" smtClean="0"/>
+              <a:rPr lang="en-US" sz="2000" dirty="0"/>
               <a:t>Publish App</a:t>
             </a:r>
           </a:p>
@@ -25869,30 +25399,26 @@
               <a:buNone/>
             </a:pPr>
             <a:r>
-              <a:rPr lang="en-US" sz="1800" b="1" dirty="0" smtClean="0">
+              <a:rPr lang="en-US" sz="1800" b="1" dirty="0">
                 <a:latin typeface="Consolas" panose="020B0609020204030204" pitchFamily="49" charset="0"/>
                 <a:cs typeface="Consolas" panose="020B0609020204030204" pitchFamily="49" charset="0"/>
               </a:rPr>
               <a:t>&gt;</a:t>
             </a:r>
             <a:r>
-              <a:rPr lang="en-US" sz="1800" dirty="0" smtClean="0">
+              <a:rPr lang="en-US" sz="1800" dirty="0">
                 <a:latin typeface="Consolas" panose="020B0609020204030204" pitchFamily="49" charset="0"/>
                 <a:cs typeface="Consolas" panose="020B0609020204030204" pitchFamily="49" charset="0"/>
               </a:rPr>
               <a:t> </a:t>
             </a:r>
             <a:r>
-              <a:rPr lang="en-US" sz="1800" b="1" dirty="0" smtClean="0">
+              <a:rPr lang="en-US" sz="1800" b="1" dirty="0">
                 <a:latin typeface="Consolas" panose="020B0609020204030204" pitchFamily="49" charset="0"/>
                 <a:cs typeface="Consolas" panose="020B0609020204030204" pitchFamily="49" charset="0"/>
               </a:rPr>
               <a:t>dnu publish</a:t>
             </a:r>
-            <a:endParaRPr lang="en-US" sz="1800" b="1" dirty="0">
-              <a:latin typeface="Consolas" panose="020B0609020204030204" pitchFamily="49" charset="0"/>
-              <a:cs typeface="Consolas" panose="020B0609020204030204" pitchFamily="49" charset="0"/>
-            </a:endParaRPr>
           </a:p>
         </p:txBody>
       </p:sp>

</xml_diff>